<commit_message>
slides - 9 more extensions - map inline example
</commit_message>
<xml_diff>
--- a/slides/Kotlin - 9. More about Extensions.pptx
+++ b/slides/Kotlin - 9. More about Extensions.pptx
@@ -25,6 +25,7 @@
     <p:sldId id="269" r:id="rId18"/>
     <p:sldId id="270" r:id="rId19"/>
     <p:sldId id="271" r:id="rId20"/>
+    <p:sldId id="272" r:id="rId21"/>
   </p:sldIdLst>
   <p:sldSz cx="9144000" cy="6858000"/>
   <p:notesSz cx="6858000" cy="9144000"/>
@@ -108,7 +109,7 @@
               <a:rPr b="0" lang="en-US" sz="1400" spc="-1" strike="noStrike">
                 <a:latin typeface="Times New Roman"/>
               </a:rPr>
-              <a:t> </a:t>
+              <a:t>&lt;header&gt;</a:t>
             </a:r>
             <a:endParaRPr b="0" lang="en-US" sz="1400" spc="-1" strike="noStrike">
               <a:latin typeface="Times New Roman"/>
@@ -143,7 +144,7 @@
               <a:rPr b="0" lang="en-US" sz="1400" spc="-1" strike="noStrike">
                 <a:latin typeface="Times New Roman"/>
               </a:rPr>
-              <a:t> </a:t>
+              <a:t>&lt;date/time&gt;</a:t>
             </a:r>
             <a:endParaRPr b="0" lang="en-US" sz="1400" spc="-1" strike="noStrike">
               <a:latin typeface="Times New Roman"/>
@@ -177,7 +178,7 @@
               <a:rPr b="0" lang="en-US" sz="1400" spc="-1" strike="noStrike">
                 <a:latin typeface="Times New Roman"/>
               </a:rPr>
-              <a:t> </a:t>
+              <a:t>&lt;footer&gt;</a:t>
             </a:r>
             <a:endParaRPr b="0" lang="en-US" sz="1400" spc="-1" strike="noStrike">
               <a:latin typeface="Times New Roman"/>
@@ -208,11 +209,11 @@
           <a:bodyPr lIns="0" rIns="0" tIns="0" bIns="0" anchor="b"/>
           <a:p>
             <a:pPr algn="r"/>
-            <a:fld id="{D4F6399F-A0B4-4966-B5C0-D5F43DC3D365}" type="slidenum">
+            <a:fld id="{2150C7A3-8AC7-4F94-9E3A-A21EEEDFCA60}" type="slidenum">
               <a:rPr b="0" lang="en-US" sz="1400" spc="-1" strike="noStrike">
                 <a:latin typeface="Times New Roman"/>
               </a:rPr>
-              <a:t>1</a:t>
+              <a:t>&lt;number&gt;</a:t>
             </a:fld>
             <a:endParaRPr b="0" lang="en-US" sz="1400" spc="-1" strike="noStrike">
               <a:latin typeface="Times New Roman"/>
@@ -245,7 +246,7 @@
       </p:grpSpPr>
       <p:sp>
         <p:nvSpPr>
-          <p:cNvPr id="115" name="PlaceHolder 1"/>
+          <p:cNvPr id="118" name="PlaceHolder 1"/>
           <p:cNvSpPr>
             <a:spLocks noGrp="1"/>
           </p:cNvSpPr>
@@ -256,7 +257,7 @@
         <p:spPr>
           <a:xfrm>
             <a:off x="685800" y="4343400"/>
-            <a:ext cx="5484240" cy="4112640"/>
+            <a:ext cx="5483880" cy="4112280"/>
           </a:xfrm>
           <a:prstGeom prst="rect">
             <a:avLst/>
@@ -273,14 +274,14 @@
       </p:sp>
       <p:sp>
         <p:nvSpPr>
-          <p:cNvPr id="116" name="CustomShape 2"/>
+          <p:cNvPr id="119" name="CustomShape 2"/>
           <p:cNvSpPr/>
           <p:nvPr/>
         </p:nvSpPr>
         <p:spPr>
           <a:xfrm>
             <a:off x="3884760" y="8685360"/>
-            <a:ext cx="2969640" cy="455040"/>
+            <a:ext cx="2969280" cy="454680"/>
           </a:xfrm>
           <a:prstGeom prst="rect">
             <a:avLst/>
@@ -304,7 +305,7 @@
                 <a:spcPct val="100000"/>
               </a:lnSpc>
             </a:pPr>
-            <a:fld id="{AB14B942-7C5F-4315-AF75-9C7B28EEAF8C}" type="slidenum">
+            <a:fld id="{B28AB5A7-3971-469F-A621-E0D78153DBA1}" type="slidenum">
               <a:rPr b="0" lang="en-US" sz="1200" spc="-1" strike="noStrike">
                 <a:solidFill>
                   <a:srgbClr val="000000"/>
@@ -3021,13 +3022,13 @@
         </p:nvPicPr>
         <p:blipFill>
           <a:blip r:embed="rId2"/>
-          <a:srcRect l="90236" t="0" r="0" b="0"/>
+          <a:srcRect l="90248" t="0" r="0" b="0"/>
           <a:stretch/>
         </p:blipFill>
         <p:spPr>
           <a:xfrm>
             <a:off x="8244360" y="0"/>
-            <a:ext cx="897480" cy="6855840"/>
+            <a:ext cx="897120" cy="6855480"/>
           </a:xfrm>
           <a:prstGeom prst="rect">
             <a:avLst/>
@@ -3049,8 +3050,8 @@
         </p:blipFill>
         <p:spPr>
           <a:xfrm rot="16200000">
-            <a:off x="7976520" y="990360"/>
-            <a:ext cx="1482120" cy="226800"/>
+            <a:off x="7976520" y="990720"/>
+            <a:ext cx="1481760" cy="226440"/>
           </a:xfrm>
           <a:prstGeom prst="rect">
             <a:avLst/>
@@ -3073,7 +3074,7 @@
         <p:spPr>
           <a:xfrm>
             <a:off x="0" y="0"/>
-            <a:ext cx="9141840" cy="6855840"/>
+            <a:ext cx="9141480" cy="6855480"/>
           </a:xfrm>
           <a:prstGeom prst="rect">
             <a:avLst/>
@@ -3096,7 +3097,7 @@
         <p:spPr>
           <a:xfrm>
             <a:off x="709200" y="0"/>
-            <a:ext cx="1866240" cy="1908000"/>
+            <a:ext cx="1865880" cy="1907640"/>
           </a:xfrm>
           <a:prstGeom prst="rect">
             <a:avLst/>
@@ -3372,13 +3373,13 @@
         </p:nvPicPr>
         <p:blipFill>
           <a:blip r:embed="rId2"/>
-          <a:srcRect l="90236" t="0" r="0" b="0"/>
+          <a:srcRect l="90248" t="0" r="0" b="0"/>
           <a:stretch/>
         </p:blipFill>
         <p:spPr>
           <a:xfrm>
             <a:off x="8244360" y="0"/>
-            <a:ext cx="897480" cy="6855840"/>
+            <a:ext cx="897120" cy="6855480"/>
           </a:xfrm>
           <a:prstGeom prst="rect">
             <a:avLst/>
@@ -3400,8 +3401,8 @@
         </p:blipFill>
         <p:spPr>
           <a:xfrm rot="16200000">
-            <a:off x="7976520" y="990360"/>
-            <a:ext cx="1482120" cy="226800"/>
+            <a:off x="7976520" y="990720"/>
+            <a:ext cx="1481760" cy="226440"/>
           </a:xfrm>
           <a:prstGeom prst="rect">
             <a:avLst/>
@@ -3671,7 +3672,7 @@
         <p:spPr>
           <a:xfrm>
             <a:off x="6588360" y="5949360"/>
-            <a:ext cx="1870200" cy="213840"/>
+            <a:ext cx="1869840" cy="213480"/>
           </a:xfrm>
           <a:prstGeom prst="rect">
             <a:avLst/>
@@ -3690,7 +3691,7 @@
         <p:txBody>
           <a:bodyPr lIns="0" rIns="0" tIns="0" bIns="0" anchor="b"/>
           <a:p>
-            <a:pPr marL="343080" indent="-340920" algn="r">
+            <a:pPr marL="343080" indent="-340560" algn="r">
               <a:lnSpc>
                 <a:spcPct val="100000"/>
               </a:lnSpc>
@@ -3726,7 +3727,7 @@
         <p:spPr>
           <a:xfrm>
             <a:off x="709200" y="2709000"/>
-            <a:ext cx="6837840" cy="2374200"/>
+            <a:ext cx="6837480" cy="2373840"/>
           </a:xfrm>
           <a:prstGeom prst="rect">
             <a:avLst/>
@@ -3810,80 +3811,713 @@
           <a:chExt cx="0" cy="0"/>
         </a:xfrm>
       </p:grpSpPr>
-      <p:pic>
-        <p:nvPicPr>
-          <p:cNvPr id="107" name="" descr=""/>
-          <p:cNvPicPr/>
+      <p:sp>
+        <p:nvSpPr>
+          <p:cNvPr id="108" name="CustomShape 1"/>
+          <p:cNvSpPr/>
           <p:nvPr/>
-        </p:nvPicPr>
-        <p:blipFill>
-          <a:blip r:embed="rId1"/>
-          <a:stretch/>
-        </p:blipFill>
-        <p:spPr>
-          <a:xfrm>
-            <a:off x="474840" y="731520"/>
-            <a:ext cx="7023240" cy="2743200"/>
-          </a:xfrm>
-          <a:prstGeom prst="rect">
-            <a:avLst/>
-          </a:prstGeom>
+        </p:nvSpPr>
+        <p:spPr>
+          <a:xfrm>
+            <a:off x="366840" y="276840"/>
+            <a:ext cx="6856560" cy="545760"/>
+          </a:xfrm>
+          <a:prstGeom prst="rect">
+            <a:avLst/>
+          </a:prstGeom>
+          <a:solidFill>
+            <a:srgbClr val="ffffff"/>
+          </a:solidFill>
           <a:ln>
             <a:noFill/>
           </a:ln>
         </p:spPr>
-      </p:pic>
+        <p:style>
+          <a:lnRef idx="0"/>
+          <a:fillRef idx="0"/>
+          <a:effectRef idx="0"/>
+          <a:fontRef idx="minor"/>
+        </p:style>
+        <p:txBody>
+          <a:bodyPr wrap="none" lIns="90000" rIns="90000" tIns="45000" bIns="45000" anchor="ctr"/>
+          <a:p>
+            <a:pPr>
+              <a:lnSpc>
+                <a:spcPct val="100000"/>
+              </a:lnSpc>
+            </a:pPr>
+            <a:r>
+              <a:rPr b="0" lang="en-US" sz="1800" spc="-1" strike="noStrike">
+                <a:solidFill>
+                  <a:srgbClr val="000000"/>
+                </a:solidFill>
+                <a:latin typeface="Consolas"/>
+                <a:ea typeface="DejaVu Sans"/>
+              </a:rPr>
+              <a:t>Inlining</a:t>
+            </a:r>
+            <a:endParaRPr b="0" lang="en-US" sz="1800" spc="-1" strike="noStrike">
+              <a:latin typeface="Arial"/>
+            </a:endParaRPr>
+          </a:p>
+        </p:txBody>
+      </p:sp>
       <p:sp>
         <p:nvSpPr>
-          <p:cNvPr id="108" name="TextShape 1"/>
-          <p:cNvSpPr txBox="1"/>
+          <p:cNvPr id="109" name="CustomShape 2"/>
+          <p:cNvSpPr/>
           <p:nvPr/>
         </p:nvSpPr>
         <p:spPr>
           <a:xfrm>
-            <a:off x="1005840" y="4206240"/>
-            <a:ext cx="3657600" cy="1645920"/>
-          </a:xfrm>
-          <a:prstGeom prst="rect">
-            <a:avLst/>
-          </a:prstGeom>
-          <a:noFill/>
+            <a:off x="549720" y="1005840"/>
+            <a:ext cx="6856560" cy="5303160"/>
+          </a:xfrm>
+          <a:prstGeom prst="rect">
+            <a:avLst/>
+          </a:prstGeom>
+          <a:solidFill>
+            <a:srgbClr val="ffffff"/>
+          </a:solidFill>
           <a:ln>
             <a:noFill/>
           </a:ln>
         </p:spPr>
+        <p:style>
+          <a:lnRef idx="0"/>
+          <a:fillRef idx="0"/>
+          <a:effectRef idx="0"/>
+          <a:fontRef idx="minor"/>
+        </p:style>
         <p:txBody>
-          <a:bodyPr lIns="90000" rIns="90000" tIns="45000" bIns="45000"/>
-          <a:p>
-            <a:r>
-              <a:rPr b="0" lang="en-US" sz="2200" spc="-1" strike="noStrike">
-                <a:latin typeface="Arial"/>
-              </a:rPr>
-              <a:t>1. [ [3, 3], [ ], [5, 5] ]</a:t>
-            </a:r>
-            <a:endParaRPr b="0" lang="en-US" sz="2200" spc="-1" strike="noStrike">
-              <a:latin typeface="Arial"/>
-            </a:endParaRPr>
-          </a:p>
-          <a:p>
-            <a:r>
-              <a:rPr b="0" lang="en-US" sz="2200" spc="-1" strike="noStrike">
-                <a:latin typeface="Arial"/>
-              </a:rPr>
-              <a:t>2. [3, 3, 5, 5]</a:t>
-            </a:r>
-            <a:endParaRPr b="0" lang="en-US" sz="2200" spc="-1" strike="noStrike">
-              <a:latin typeface="Arial"/>
-            </a:endParaRPr>
-          </a:p>
-          <a:p>
-            <a:r>
-              <a:rPr b="0" lang="en-US" sz="2200" spc="-1" strike="noStrike">
-                <a:latin typeface="Arial"/>
-              </a:rPr>
-              <a:t>3. [ ]</a:t>
-            </a:r>
-            <a:endParaRPr b="0" lang="en-US" sz="2200" spc="-1" strike="noStrike">
+          <a:bodyPr wrap="none" lIns="90000" rIns="90000" tIns="45000" bIns="45000" anchor="ctr"/>
+          <a:p>
+            <a:pPr>
+              <a:lnSpc>
+                <a:spcPct val="100000"/>
+              </a:lnSpc>
+            </a:pPr>
+            <a:r>
+              <a:rPr b="0" lang="en-US" sz="1800" spc="-1" strike="noStrike">
+                <a:solidFill>
+                  <a:srgbClr val="000000"/>
+                </a:solidFill>
+                <a:latin typeface="Arial"/>
+                <a:ea typeface="DejaVu Sans"/>
+              </a:rPr>
+              <a:t>class Controller {</a:t>
+            </a:r>
+            <a:endParaRPr b="0" lang="en-US" sz="1800" spc="-1" strike="noStrike">
+              <a:latin typeface="Arial"/>
+            </a:endParaRPr>
+          </a:p>
+          <a:p>
+            <a:pPr>
+              <a:lnSpc>
+                <a:spcPct val="100000"/>
+              </a:lnSpc>
+            </a:pPr>
+            <a:endParaRPr b="0" lang="en-US" sz="1800" spc="-1" strike="noStrike">
+              <a:latin typeface="Arial"/>
+            </a:endParaRPr>
+          </a:p>
+          <a:p>
+            <a:pPr>
+              <a:lnSpc>
+                <a:spcPct val="100000"/>
+              </a:lnSpc>
+            </a:pPr>
+            <a:r>
+              <a:rPr b="0" lang="en-US" sz="1800" spc="-1" strike="noStrike">
+                <a:solidFill>
+                  <a:srgbClr val="000000"/>
+                </a:solidFill>
+                <a:latin typeface="Arial"/>
+                <a:ea typeface="DejaVu Sans"/>
+              </a:rPr>
+              <a:t>    </a:t>
+            </a:r>
+            <a:r>
+              <a:rPr b="0" lang="en-US" sz="1800" spc="-1" strike="noStrike">
+                <a:solidFill>
+                  <a:srgbClr val="000000"/>
+                </a:solidFill>
+                <a:latin typeface="Arial"/>
+                <a:ea typeface="DejaVu Sans"/>
+              </a:rPr>
+              <a:t>private </a:t>
+            </a:r>
+            <a:r>
+              <a:rPr b="1" lang="en-US" sz="1800" spc="-1" strike="noStrike">
+                <a:solidFill>
+                  <a:srgbClr val="ed1c24"/>
+                </a:solidFill>
+                <a:latin typeface="Arial"/>
+                <a:ea typeface="DejaVu Sans"/>
+              </a:rPr>
+              <a:t>inline</a:t>
+            </a:r>
+            <a:r>
+              <a:rPr b="0" lang="en-US" sz="1800" spc="-1" strike="noStrike">
+                <a:solidFill>
+                  <a:srgbClr val="000000"/>
+                </a:solidFill>
+                <a:latin typeface="Arial"/>
+                <a:ea typeface="DejaVu Sans"/>
+              </a:rPr>
+              <a:t> </a:t>
+            </a:r>
+            <a:r>
+              <a:rPr b="1" lang="en-US" sz="1800" spc="-1" strike="noStrike">
+                <a:solidFill>
+                  <a:srgbClr val="182f7c"/>
+                </a:solidFill>
+                <a:latin typeface="Arial"/>
+                <a:ea typeface="DejaVu Sans"/>
+              </a:rPr>
+              <a:t>fun</a:t>
+            </a:r>
+            <a:r>
+              <a:rPr b="0" lang="en-US" sz="1800" spc="-1" strike="noStrike">
+                <a:solidFill>
+                  <a:srgbClr val="000000"/>
+                </a:solidFill>
+                <a:latin typeface="Arial"/>
+                <a:ea typeface="DejaVu Sans"/>
+              </a:rPr>
+              <a:t> withAccess(request: Request, action: () -&gt; Int): Int {</a:t>
+            </a:r>
+            <a:endParaRPr b="0" lang="en-US" sz="1800" spc="-1" strike="noStrike">
+              <a:latin typeface="Arial"/>
+            </a:endParaRPr>
+          </a:p>
+          <a:p>
+            <a:pPr>
+              <a:lnSpc>
+                <a:spcPct val="100000"/>
+              </a:lnSpc>
+            </a:pPr>
+            <a:r>
+              <a:rPr b="0" lang="en-US" sz="1800" spc="-1" strike="noStrike">
+                <a:solidFill>
+                  <a:srgbClr val="000000"/>
+                </a:solidFill>
+                <a:latin typeface="Arial"/>
+                <a:ea typeface="DejaVu Sans"/>
+              </a:rPr>
+              <a:t>        </a:t>
+            </a:r>
+            <a:r>
+              <a:rPr b="0" lang="en-US" sz="1800" spc="-1" strike="noStrike">
+                <a:solidFill>
+                  <a:srgbClr val="000000"/>
+                </a:solidFill>
+                <a:latin typeface="Arial"/>
+                <a:ea typeface="DejaVu Sans"/>
+              </a:rPr>
+              <a:t>if (!request.hasAccess()) {</a:t>
+            </a:r>
+            <a:endParaRPr b="0" lang="en-US" sz="1800" spc="-1" strike="noStrike">
+              <a:latin typeface="Arial"/>
+            </a:endParaRPr>
+          </a:p>
+          <a:p>
+            <a:pPr>
+              <a:lnSpc>
+                <a:spcPct val="100000"/>
+              </a:lnSpc>
+            </a:pPr>
+            <a:r>
+              <a:rPr b="0" lang="en-US" sz="1800" spc="-1" strike="noStrike">
+                <a:solidFill>
+                  <a:srgbClr val="000000"/>
+                </a:solidFill>
+                <a:latin typeface="Arial"/>
+                <a:ea typeface="DejaVu Sans"/>
+              </a:rPr>
+              <a:t>            </a:t>
+            </a:r>
+            <a:r>
+              <a:rPr b="0" lang="en-US" sz="1800" spc="-1" strike="noStrike">
+                <a:solidFill>
+                  <a:srgbClr val="000000"/>
+                </a:solidFill>
+                <a:latin typeface="Arial"/>
+                <a:ea typeface="DejaVu Sans"/>
+              </a:rPr>
+              <a:t>println("No access")</a:t>
+            </a:r>
+            <a:endParaRPr b="0" lang="en-US" sz="1800" spc="-1" strike="noStrike">
+              <a:latin typeface="Arial"/>
+            </a:endParaRPr>
+          </a:p>
+          <a:p>
+            <a:pPr>
+              <a:lnSpc>
+                <a:spcPct val="100000"/>
+              </a:lnSpc>
+            </a:pPr>
+            <a:r>
+              <a:rPr b="0" lang="en-US" sz="1800" spc="-1" strike="noStrike">
+                <a:solidFill>
+                  <a:srgbClr val="000000"/>
+                </a:solidFill>
+                <a:latin typeface="Arial"/>
+                <a:ea typeface="DejaVu Sans"/>
+              </a:rPr>
+              <a:t>            </a:t>
+            </a:r>
+            <a:r>
+              <a:rPr b="1" lang="en-US" sz="1800" spc="-1" strike="noStrike">
+                <a:solidFill>
+                  <a:srgbClr val="000000"/>
+                </a:solidFill>
+                <a:latin typeface="Arial"/>
+                <a:ea typeface="DejaVu Sans"/>
+              </a:rPr>
+              <a:t>return -1</a:t>
+            </a:r>
+            <a:endParaRPr b="0" lang="en-US" sz="1800" spc="-1" strike="noStrike">
+              <a:latin typeface="Arial"/>
+            </a:endParaRPr>
+          </a:p>
+          <a:p>
+            <a:pPr>
+              <a:lnSpc>
+                <a:spcPct val="100000"/>
+              </a:lnSpc>
+            </a:pPr>
+            <a:r>
+              <a:rPr b="0" lang="en-US" sz="1800" spc="-1" strike="noStrike">
+                <a:solidFill>
+                  <a:srgbClr val="000000"/>
+                </a:solidFill>
+                <a:latin typeface="Arial"/>
+                <a:ea typeface="DejaVu Sans"/>
+              </a:rPr>
+              <a:t>        </a:t>
+            </a:r>
+            <a:r>
+              <a:rPr b="0" lang="en-US" sz="1800" spc="-1" strike="noStrike">
+                <a:solidFill>
+                  <a:srgbClr val="000000"/>
+                </a:solidFill>
+                <a:latin typeface="Arial"/>
+                <a:ea typeface="DejaVu Sans"/>
+              </a:rPr>
+              <a:t>}</a:t>
+            </a:r>
+            <a:endParaRPr b="0" lang="en-US" sz="1800" spc="-1" strike="noStrike">
+              <a:latin typeface="Arial"/>
+            </a:endParaRPr>
+          </a:p>
+          <a:p>
+            <a:pPr>
+              <a:lnSpc>
+                <a:spcPct val="100000"/>
+              </a:lnSpc>
+            </a:pPr>
+            <a:r>
+              <a:rPr b="0" lang="en-US" sz="1800" spc="-1" strike="noStrike">
+                <a:solidFill>
+                  <a:srgbClr val="000000"/>
+                </a:solidFill>
+                <a:latin typeface="Arial"/>
+                <a:ea typeface="DejaVu Sans"/>
+              </a:rPr>
+              <a:t>        </a:t>
+            </a:r>
+            <a:r>
+              <a:rPr b="1" lang="en-US" sz="1800" spc="-1" strike="noStrike">
+                <a:solidFill>
+                  <a:srgbClr val="000000"/>
+                </a:solidFill>
+                <a:latin typeface="Arial"/>
+                <a:ea typeface="DejaVu Sans"/>
+              </a:rPr>
+              <a:t>return</a:t>
+            </a:r>
+            <a:r>
+              <a:rPr b="0" lang="en-US" sz="1800" spc="-1" strike="noStrike">
+                <a:solidFill>
+                  <a:srgbClr val="000000"/>
+                </a:solidFill>
+                <a:latin typeface="Arial"/>
+                <a:ea typeface="DejaVu Sans"/>
+              </a:rPr>
+              <a:t> action()</a:t>
+            </a:r>
+            <a:endParaRPr b="0" lang="en-US" sz="1800" spc="-1" strike="noStrike">
+              <a:latin typeface="Arial"/>
+            </a:endParaRPr>
+          </a:p>
+          <a:p>
+            <a:pPr>
+              <a:lnSpc>
+                <a:spcPct val="100000"/>
+              </a:lnSpc>
+            </a:pPr>
+            <a:r>
+              <a:rPr b="0" lang="en-US" sz="1800" spc="-1" strike="noStrike">
+                <a:solidFill>
+                  <a:srgbClr val="000000"/>
+                </a:solidFill>
+                <a:latin typeface="Arial"/>
+                <a:ea typeface="DejaVu Sans"/>
+              </a:rPr>
+              <a:t>    </a:t>
+            </a:r>
+            <a:r>
+              <a:rPr b="0" lang="en-US" sz="1800" spc="-1" strike="noStrike">
+                <a:solidFill>
+                  <a:srgbClr val="000000"/>
+                </a:solidFill>
+                <a:latin typeface="Arial"/>
+                <a:ea typeface="DejaVu Sans"/>
+              </a:rPr>
+              <a:t>}</a:t>
+            </a:r>
+            <a:endParaRPr b="0" lang="en-US" sz="1800" spc="-1" strike="noStrike">
+              <a:latin typeface="Arial"/>
+            </a:endParaRPr>
+          </a:p>
+          <a:p>
+            <a:pPr>
+              <a:lnSpc>
+                <a:spcPct val="100000"/>
+              </a:lnSpc>
+            </a:pPr>
+            <a:endParaRPr b="0" lang="en-US" sz="1800" spc="-1" strike="noStrike">
+              <a:latin typeface="Arial"/>
+            </a:endParaRPr>
+          </a:p>
+          <a:p>
+            <a:pPr>
+              <a:lnSpc>
+                <a:spcPct val="100000"/>
+              </a:lnSpc>
+            </a:pPr>
+            <a:r>
+              <a:rPr b="0" lang="en-US" sz="1800" spc="-1" strike="noStrike">
+                <a:solidFill>
+                  <a:srgbClr val="000000"/>
+                </a:solidFill>
+                <a:latin typeface="Arial"/>
+                <a:ea typeface="DejaVu Sans"/>
+              </a:rPr>
+              <a:t>    </a:t>
+            </a:r>
+            <a:r>
+              <a:rPr b="1" lang="en-US" sz="1800" spc="-1" strike="noStrike">
+                <a:solidFill>
+                  <a:srgbClr val="182f7c"/>
+                </a:solidFill>
+                <a:latin typeface="Arial"/>
+                <a:ea typeface="DejaVu Sans"/>
+              </a:rPr>
+              <a:t>fun</a:t>
+            </a:r>
+            <a:r>
+              <a:rPr b="0" lang="en-US" sz="1800" spc="-1" strike="noStrike">
+                <a:solidFill>
+                  <a:srgbClr val="000000"/>
+                </a:solidFill>
+                <a:latin typeface="Arial"/>
+                <a:ea typeface="DejaVu Sans"/>
+              </a:rPr>
+              <a:t> blockUser(request: Request) = </a:t>
+            </a:r>
+            <a:r>
+              <a:rPr b="1" lang="en-US" sz="1800" spc="-1" strike="noStrike">
+                <a:solidFill>
+                  <a:srgbClr val="000000"/>
+                </a:solidFill>
+                <a:latin typeface="Arial"/>
+                <a:ea typeface="DejaVu Sans"/>
+              </a:rPr>
+              <a:t>withAccess</a:t>
+            </a:r>
+            <a:r>
+              <a:rPr b="0" lang="en-US" sz="1800" spc="-1" strike="noStrike">
+                <a:solidFill>
+                  <a:srgbClr val="000000"/>
+                </a:solidFill>
+                <a:latin typeface="Arial"/>
+                <a:ea typeface="DejaVu Sans"/>
+              </a:rPr>
+              <a:t>(request) {</a:t>
+            </a:r>
+            <a:endParaRPr b="0" lang="en-US" sz="1800" spc="-1" strike="noStrike">
+              <a:latin typeface="Arial"/>
+            </a:endParaRPr>
+          </a:p>
+          <a:p>
+            <a:pPr>
+              <a:lnSpc>
+                <a:spcPct val="100000"/>
+              </a:lnSpc>
+            </a:pPr>
+            <a:r>
+              <a:rPr b="0" lang="en-US" sz="1800" spc="-1" strike="noStrike">
+                <a:solidFill>
+                  <a:srgbClr val="000000"/>
+                </a:solidFill>
+                <a:latin typeface="Arial"/>
+                <a:ea typeface="DejaVu Sans"/>
+              </a:rPr>
+              <a:t>        </a:t>
+            </a:r>
+            <a:r>
+              <a:rPr b="0" lang="en-US" sz="1800" spc="-1" strike="noStrike">
+                <a:solidFill>
+                  <a:srgbClr val="000000"/>
+                </a:solidFill>
+                <a:latin typeface="Arial"/>
+                <a:ea typeface="DejaVu Sans"/>
+              </a:rPr>
+              <a:t>...</a:t>
+            </a:r>
+            <a:endParaRPr b="0" lang="en-US" sz="1800" spc="-1" strike="noStrike">
+              <a:latin typeface="Arial"/>
+            </a:endParaRPr>
+          </a:p>
+          <a:p>
+            <a:pPr>
+              <a:lnSpc>
+                <a:spcPct val="100000"/>
+              </a:lnSpc>
+            </a:pPr>
+            <a:r>
+              <a:rPr b="0" lang="en-US" sz="1800" spc="-1" strike="noStrike">
+                <a:solidFill>
+                  <a:srgbClr val="000000"/>
+                </a:solidFill>
+                <a:latin typeface="Arial"/>
+                <a:ea typeface="DejaVu Sans"/>
+              </a:rPr>
+              <a:t>        </a:t>
+            </a:r>
+            <a:r>
+              <a:rPr b="0" lang="en-US" sz="1800" spc="-1" strike="noStrike">
+                <a:solidFill>
+                  <a:srgbClr val="000000"/>
+                </a:solidFill>
+                <a:latin typeface="Arial"/>
+                <a:ea typeface="DejaVu Sans"/>
+              </a:rPr>
+              <a:t>return 0</a:t>
+            </a:r>
+            <a:endParaRPr b="0" lang="en-US" sz="1800" spc="-1" strike="noStrike">
+              <a:latin typeface="Arial"/>
+            </a:endParaRPr>
+          </a:p>
+          <a:p>
+            <a:pPr>
+              <a:lnSpc>
+                <a:spcPct val="100000"/>
+              </a:lnSpc>
+            </a:pPr>
+            <a:r>
+              <a:rPr b="0" lang="en-US" sz="1800" spc="-1" strike="noStrike">
+                <a:solidFill>
+                  <a:srgbClr val="000000"/>
+                </a:solidFill>
+                <a:latin typeface="Arial"/>
+                <a:ea typeface="DejaVu Sans"/>
+              </a:rPr>
+              <a:t>    </a:t>
+            </a:r>
+            <a:r>
+              <a:rPr b="0" lang="en-US" sz="1800" spc="-1" strike="noStrike">
+                <a:solidFill>
+                  <a:srgbClr val="000000"/>
+                </a:solidFill>
+                <a:latin typeface="Arial"/>
+                <a:ea typeface="DejaVu Sans"/>
+              </a:rPr>
+              <a:t>}</a:t>
+            </a:r>
+            <a:endParaRPr b="0" lang="en-US" sz="1800" spc="-1" strike="noStrike">
+              <a:latin typeface="Arial"/>
+            </a:endParaRPr>
+          </a:p>
+          <a:p>
+            <a:pPr>
+              <a:lnSpc>
+                <a:spcPct val="100000"/>
+              </a:lnSpc>
+            </a:pPr>
+            <a:endParaRPr b="0" lang="en-US" sz="1800" spc="-1" strike="noStrike">
+              <a:latin typeface="Arial"/>
+            </a:endParaRPr>
+          </a:p>
+          <a:p>
+            <a:pPr>
+              <a:lnSpc>
+                <a:spcPct val="100000"/>
+              </a:lnSpc>
+            </a:pPr>
+            <a:r>
+              <a:rPr b="0" lang="en-US" sz="1800" spc="-1" strike="noStrike">
+                <a:solidFill>
+                  <a:srgbClr val="000000"/>
+                </a:solidFill>
+                <a:latin typeface="Arial"/>
+                <a:ea typeface="DejaVu Sans"/>
+              </a:rPr>
+              <a:t>    </a:t>
+            </a:r>
+            <a:r>
+              <a:rPr b="1" lang="en-US" sz="1800" spc="-1" strike="noStrike">
+                <a:solidFill>
+                  <a:srgbClr val="182f7c"/>
+                </a:solidFill>
+                <a:latin typeface="Arial"/>
+                <a:ea typeface="DejaVu Sans"/>
+              </a:rPr>
+              <a:t>fun</a:t>
+            </a:r>
+            <a:r>
+              <a:rPr b="0" lang="en-US" sz="1800" spc="-1" strike="noStrike">
+                <a:solidFill>
+                  <a:srgbClr val="000000"/>
+                </a:solidFill>
+                <a:latin typeface="Arial"/>
+                <a:ea typeface="DejaVu Sans"/>
+              </a:rPr>
+              <a:t> deleteUser(request: Request) = </a:t>
+            </a:r>
+            <a:r>
+              <a:rPr b="1" lang="en-US" sz="1800" spc="-1" strike="noStrike">
+                <a:solidFill>
+                  <a:srgbClr val="000000"/>
+                </a:solidFill>
+                <a:latin typeface="Arial"/>
+                <a:ea typeface="DejaVu Sans"/>
+              </a:rPr>
+              <a:t>withAccess</a:t>
+            </a:r>
+            <a:r>
+              <a:rPr b="0" lang="en-US" sz="1800" spc="-1" strike="noStrike">
+                <a:solidFill>
+                  <a:srgbClr val="000000"/>
+                </a:solidFill>
+                <a:latin typeface="Arial"/>
+                <a:ea typeface="DejaVu Sans"/>
+              </a:rPr>
+              <a:t>(request) {</a:t>
+            </a:r>
+            <a:endParaRPr b="0" lang="en-US" sz="1800" spc="-1" strike="noStrike">
+              <a:latin typeface="Arial"/>
+            </a:endParaRPr>
+          </a:p>
+          <a:p>
+            <a:pPr>
+              <a:lnSpc>
+                <a:spcPct val="100000"/>
+              </a:lnSpc>
+            </a:pPr>
+            <a:r>
+              <a:rPr b="0" lang="en-US" sz="1800" spc="-1" strike="noStrike">
+                <a:solidFill>
+                  <a:srgbClr val="000000"/>
+                </a:solidFill>
+                <a:latin typeface="Arial"/>
+                <a:ea typeface="DejaVu Sans"/>
+              </a:rPr>
+              <a:t>        </a:t>
+            </a:r>
+            <a:r>
+              <a:rPr b="0" lang="en-US" sz="1800" spc="-1" strike="noStrike">
+                <a:solidFill>
+                  <a:srgbClr val="000000"/>
+                </a:solidFill>
+                <a:latin typeface="Arial"/>
+                <a:ea typeface="DejaVu Sans"/>
+              </a:rPr>
+              <a:t>...</a:t>
+            </a:r>
+            <a:endParaRPr b="0" lang="en-US" sz="1800" spc="-1" strike="noStrike">
+              <a:latin typeface="Arial"/>
+            </a:endParaRPr>
+          </a:p>
+          <a:p>
+            <a:pPr>
+              <a:lnSpc>
+                <a:spcPct val="100000"/>
+              </a:lnSpc>
+            </a:pPr>
+            <a:r>
+              <a:rPr b="0" lang="en-US" sz="1800" spc="-1" strike="noStrike">
+                <a:solidFill>
+                  <a:srgbClr val="000000"/>
+                </a:solidFill>
+                <a:latin typeface="Arial"/>
+                <a:ea typeface="DejaVu Sans"/>
+              </a:rPr>
+              <a:t>        </a:t>
+            </a:r>
+            <a:r>
+              <a:rPr b="0" lang="en-US" sz="1800" spc="-1" strike="noStrike">
+                <a:solidFill>
+                  <a:srgbClr val="000000"/>
+                </a:solidFill>
+                <a:latin typeface="Arial"/>
+                <a:ea typeface="DejaVu Sans"/>
+              </a:rPr>
+              <a:t>return 0</a:t>
+            </a:r>
+            <a:endParaRPr b="0" lang="en-US" sz="1800" spc="-1" strike="noStrike">
+              <a:latin typeface="Arial"/>
+            </a:endParaRPr>
+          </a:p>
+          <a:p>
+            <a:pPr>
+              <a:lnSpc>
+                <a:spcPct val="100000"/>
+              </a:lnSpc>
+            </a:pPr>
+            <a:r>
+              <a:rPr b="0" lang="en-US" sz="1800" spc="-1" strike="noStrike">
+                <a:solidFill>
+                  <a:srgbClr val="000000"/>
+                </a:solidFill>
+                <a:latin typeface="Arial"/>
+                <a:ea typeface="DejaVu Sans"/>
+              </a:rPr>
+              <a:t>    </a:t>
+            </a:r>
+            <a:r>
+              <a:rPr b="0" lang="en-US" sz="1800" spc="-1" strike="noStrike">
+                <a:solidFill>
+                  <a:srgbClr val="000000"/>
+                </a:solidFill>
+                <a:latin typeface="Arial"/>
+                <a:ea typeface="DejaVu Sans"/>
+              </a:rPr>
+              <a:t>}</a:t>
+            </a:r>
+            <a:endParaRPr b="0" lang="en-US" sz="1800" spc="-1" strike="noStrike">
+              <a:latin typeface="Arial"/>
+            </a:endParaRPr>
+          </a:p>
+          <a:p>
+            <a:pPr>
+              <a:lnSpc>
+                <a:spcPct val="100000"/>
+              </a:lnSpc>
+            </a:pPr>
+            <a:r>
+              <a:rPr b="0" lang="en-US" sz="1800" spc="-1" strike="noStrike">
+                <a:solidFill>
+                  <a:srgbClr val="000000"/>
+                </a:solidFill>
+                <a:latin typeface="Arial"/>
+                <a:ea typeface="DejaVu Sans"/>
+              </a:rPr>
+              <a:t>}</a:t>
+            </a:r>
+            <a:endParaRPr b="0" lang="en-US" sz="1800" spc="-1" strike="noStrike">
               <a:latin typeface="Arial"/>
             </a:endParaRPr>
           </a:p>
@@ -3940,7 +4574,7 @@
       </p:grpSpPr>
       <p:pic>
         <p:nvPicPr>
-          <p:cNvPr id="109" name="" descr=""/>
+          <p:cNvPr id="110" name="" descr=""/>
           <p:cNvPicPr/>
           <p:nvPr/>
         </p:nvPicPr>
@@ -3950,8 +4584,8 @@
         </p:blipFill>
         <p:spPr>
           <a:xfrm>
-            <a:off x="297720" y="1235520"/>
-            <a:ext cx="7474680" cy="3976560"/>
+            <a:off x="474840" y="731520"/>
+            <a:ext cx="7022880" cy="2742840"/>
           </a:xfrm>
           <a:prstGeom prst="rect">
             <a:avLst/>
@@ -3961,6 +4595,68 @@
           </a:ln>
         </p:spPr>
       </p:pic>
+      <p:sp>
+        <p:nvSpPr>
+          <p:cNvPr id="111" name="CustomShape 1"/>
+          <p:cNvSpPr/>
+          <p:nvPr/>
+        </p:nvSpPr>
+        <p:spPr>
+          <a:xfrm>
+            <a:off x="1005840" y="4206240"/>
+            <a:ext cx="3657240" cy="1645560"/>
+          </a:xfrm>
+          <a:prstGeom prst="rect">
+            <a:avLst/>
+          </a:prstGeom>
+          <a:noFill/>
+          <a:ln>
+            <a:noFill/>
+          </a:ln>
+        </p:spPr>
+        <p:style>
+          <a:lnRef idx="0"/>
+          <a:fillRef idx="0"/>
+          <a:effectRef idx="0"/>
+          <a:fontRef idx="minor"/>
+        </p:style>
+        <p:txBody>
+          <a:bodyPr lIns="90000" rIns="90000" tIns="45000" bIns="45000"/>
+          <a:p>
+            <a:r>
+              <a:rPr b="0" lang="en-US" sz="2200" spc="-1" strike="noStrike">
+                <a:latin typeface="Arial"/>
+              </a:rPr>
+              <a:t>1. [ [3, 3], [ ], [5, 5] ]</a:t>
+            </a:r>
+            <a:endParaRPr b="0" lang="en-US" sz="2200" spc="-1" strike="noStrike">
+              <a:latin typeface="Arial"/>
+            </a:endParaRPr>
+          </a:p>
+          <a:p>
+            <a:r>
+              <a:rPr b="0" lang="en-US" sz="2200" spc="-1" strike="noStrike">
+                <a:latin typeface="Arial"/>
+              </a:rPr>
+              <a:t>2. [3, 3, 5, 5]</a:t>
+            </a:r>
+            <a:endParaRPr b="0" lang="en-US" sz="2200" spc="-1" strike="noStrike">
+              <a:latin typeface="Arial"/>
+            </a:endParaRPr>
+          </a:p>
+          <a:p>
+            <a:r>
+              <a:rPr b="0" lang="en-US" sz="2200" spc="-1" strike="noStrike">
+                <a:latin typeface="Arial"/>
+              </a:rPr>
+              <a:t>3. [ ]</a:t>
+            </a:r>
+            <a:endParaRPr b="0" lang="en-US" sz="2200" spc="-1" strike="noStrike">
+              <a:latin typeface="Arial"/>
+            </a:endParaRPr>
+          </a:p>
+        </p:txBody>
+      </p:sp>
     </p:spTree>
   </p:cSld>
   <p:timing>
@@ -4012,7 +4708,7 @@
       </p:grpSpPr>
       <p:pic>
         <p:nvPicPr>
-          <p:cNvPr id="110" name="" descr=""/>
+          <p:cNvPr id="112" name="" descr=""/>
           <p:cNvPicPr/>
           <p:nvPr/>
         </p:nvPicPr>
@@ -4022,8 +4718,8 @@
         </p:blipFill>
         <p:spPr>
           <a:xfrm>
-            <a:off x="412920" y="1463040"/>
-            <a:ext cx="6993720" cy="3565080"/>
+            <a:off x="297720" y="1235520"/>
+            <a:ext cx="7474320" cy="3976200"/>
           </a:xfrm>
           <a:prstGeom prst="rect">
             <a:avLst/>
@@ -4084,7 +4780,7 @@
       </p:grpSpPr>
       <p:pic>
         <p:nvPicPr>
-          <p:cNvPr id="111" name="" descr=""/>
+          <p:cNvPr id="113" name="" descr=""/>
           <p:cNvPicPr/>
           <p:nvPr/>
         </p:nvPicPr>
@@ -4094,8 +4790,8 @@
         </p:blipFill>
         <p:spPr>
           <a:xfrm>
-            <a:off x="487440" y="1445040"/>
-            <a:ext cx="7543440" cy="3675600"/>
+            <a:off x="412920" y="1463040"/>
+            <a:ext cx="6993360" cy="3564720"/>
           </a:xfrm>
           <a:prstGeom prst="rect">
             <a:avLst/>
@@ -4156,7 +4852,7 @@
       </p:grpSpPr>
       <p:pic>
         <p:nvPicPr>
-          <p:cNvPr id="112" name="" descr=""/>
+          <p:cNvPr id="114" name="" descr=""/>
           <p:cNvPicPr/>
           <p:nvPr/>
         </p:nvPicPr>
@@ -4166,8 +4862,8 @@
         </p:blipFill>
         <p:spPr>
           <a:xfrm>
-            <a:off x="217440" y="1361160"/>
-            <a:ext cx="7737840" cy="4033800"/>
+            <a:off x="487440" y="1445040"/>
+            <a:ext cx="7543080" cy="3675240"/>
           </a:xfrm>
           <a:prstGeom prst="rect">
             <a:avLst/>
@@ -4228,7 +4924,7 @@
       </p:grpSpPr>
       <p:pic>
         <p:nvPicPr>
-          <p:cNvPr id="113" name="" descr=""/>
+          <p:cNvPr id="115" name="" descr=""/>
           <p:cNvPicPr/>
           <p:nvPr/>
         </p:nvPicPr>
@@ -4238,8 +4934,8 @@
         </p:blipFill>
         <p:spPr>
           <a:xfrm>
-            <a:off x="91440" y="1188720"/>
-            <a:ext cx="7988040" cy="4235760"/>
+            <a:off x="217440" y="1361160"/>
+            <a:ext cx="7737480" cy="4033440"/>
           </a:xfrm>
           <a:prstGeom prst="rect">
             <a:avLst/>
@@ -4300,7 +4996,7 @@
       </p:grpSpPr>
       <p:pic>
         <p:nvPicPr>
-          <p:cNvPr id="114" name="" descr=""/>
+          <p:cNvPr id="116" name="" descr=""/>
           <p:cNvPicPr/>
           <p:nvPr/>
         </p:nvPicPr>
@@ -4310,8 +5006,8 @@
         </p:blipFill>
         <p:spPr>
           <a:xfrm>
-            <a:off x="235080" y="1182960"/>
-            <a:ext cx="7762320" cy="4029120"/>
+            <a:off x="91440" y="1188720"/>
+            <a:ext cx="7987680" cy="4235400"/>
           </a:xfrm>
           <a:prstGeom prst="rect">
             <a:avLst/>
@@ -4330,6 +5026,78 @@
           <p:childTnLst>
             <p:seq>
               <p:cTn id="48" nodeType="mainSeq"/>
+              <p:prevCondLst>
+                <p:cond delay="0" evt="onPrev">
+                  <p:tgtEl>
+                    <p:sldTgt/>
+                  </p:tgtEl>
+                </p:cond>
+              </p:prevCondLst>
+              <p:nextCondLst>
+                <p:cond delay="0" evt="onNext">
+                  <p:tgtEl>
+                    <p:sldTgt/>
+                  </p:tgtEl>
+                </p:cond>
+              </p:nextCondLst>
+            </p:seq>
+          </p:childTnLst>
+        </p:cTn>
+      </p:par>
+    </p:tnLst>
+  </p:timing>
+</p:sld>
+</file>
+
+<file path=ppt/slides/slide17.xml><?xml version="1.0" encoding="utf-8"?>
+<p:sld xmlns:a="http://schemas.openxmlformats.org/drawingml/2006/main" xmlns:p="http://schemas.openxmlformats.org/presentationml/2006/main" xmlns:r="http://schemas.openxmlformats.org/officeDocument/2006/relationships" xmlns:p14="http://schemas.microsoft.com/office/powerpoint/2010/main" xmlns:p15="http://schemas.microsoft.com/office/powerpoint/2012/main" xmlns:mc="http://schemas.openxmlformats.org/markup-compatibility/2006">
+  <p:cSld>
+    <p:spTree>
+      <p:nvGrpSpPr>
+        <p:cNvPr id="1" name=""/>
+        <p:cNvGrpSpPr/>
+        <p:nvPr/>
+      </p:nvGrpSpPr>
+      <p:grpSpPr>
+        <a:xfrm>
+          <a:off x="0" y="0"/>
+          <a:ext cx="0" cy="0"/>
+          <a:chOff x="0" y="0"/>
+          <a:chExt cx="0" cy="0"/>
+        </a:xfrm>
+      </p:grpSpPr>
+      <p:pic>
+        <p:nvPicPr>
+          <p:cNvPr id="117" name="" descr=""/>
+          <p:cNvPicPr/>
+          <p:nvPr/>
+        </p:nvPicPr>
+        <p:blipFill>
+          <a:blip r:embed="rId1"/>
+          <a:stretch/>
+        </p:blipFill>
+        <p:spPr>
+          <a:xfrm>
+            <a:off x="235080" y="1182960"/>
+            <a:ext cx="7761960" cy="4028760"/>
+          </a:xfrm>
+          <a:prstGeom prst="rect">
+            <a:avLst/>
+          </a:prstGeom>
+          <a:ln>
+            <a:noFill/>
+          </a:ln>
+        </p:spPr>
+      </p:pic>
+    </p:spTree>
+  </p:cSld>
+  <p:timing>
+    <p:tnLst>
+      <p:par>
+        <p:cTn id="49" dur="indefinite" restart="never" nodeType="tmRoot">
+          <p:childTnLst>
+            <p:seq>
+              <p:cTn id="50" nodeType="mainSeq"/>
               <p:prevCondLst>
                 <p:cond delay="0" evt="onPrev">
                   <p:tgtEl>
@@ -4379,7 +5147,7 @@
         <p:spPr>
           <a:xfrm>
             <a:off x="457200" y="457200"/>
-            <a:ext cx="6856920" cy="546120"/>
+            <a:ext cx="6856560" cy="545760"/>
           </a:xfrm>
           <a:prstGeom prst="rect">
             <a:avLst/>
@@ -4430,7 +5198,7 @@
         <p:spPr>
           <a:xfrm>
             <a:off x="548640" y="1098000"/>
-            <a:ext cx="6856920" cy="1370520"/>
+            <a:ext cx="6856560" cy="1370160"/>
           </a:xfrm>
           <a:prstGeom prst="rect">
             <a:avLst/>
@@ -4521,6 +5289,11 @@
             </a:endParaRPr>
           </a:p>
           <a:p>
+            <a:pPr>
+              <a:lnSpc>
+                <a:spcPct val="100000"/>
+              </a:lnSpc>
+            </a:pPr>
             <a:r>
               <a:rPr b="1" lang="en-US" sz="1800" spc="-1" strike="noStrike">
                 <a:solidFill>
@@ -4529,17 +5302,7 @@
                 <a:latin typeface="Arial"/>
                 <a:ea typeface="DejaVu Sans"/>
               </a:rPr>
-              <a:t>internal </a:t>
-            </a:r>
-            <a:r>
-              <a:rPr b="1" lang="en-US" sz="1800" spc="-1" strike="noStrike">
-                <a:solidFill>
-                  <a:srgbClr val="182f7c"/>
-                </a:solidFill>
-                <a:latin typeface="Arial"/>
-                <a:ea typeface="DejaVu Sans"/>
-              </a:rPr>
-              <a:t>fun</a:t>
+              <a:t>internal fun</a:t>
             </a:r>
             <a:r>
               <a:rPr b="0" lang="en-US" sz="1800" spc="-1" strike="noStrike">
@@ -4586,7 +5349,7 @@
         <p:spPr>
           <a:xfrm>
             <a:off x="548640" y="3109680"/>
-            <a:ext cx="6856920" cy="1644840"/>
+            <a:ext cx="6856560" cy="1644480"/>
           </a:xfrm>
           <a:prstGeom prst="rect">
             <a:avLst/>
@@ -4914,7 +5677,7 @@
         <p:spPr>
           <a:xfrm>
             <a:off x="457200" y="457200"/>
-            <a:ext cx="6856920" cy="546120"/>
+            <a:ext cx="6856560" cy="545760"/>
           </a:xfrm>
           <a:prstGeom prst="rect">
             <a:avLst/>
@@ -4965,7 +5728,7 @@
         <p:spPr>
           <a:xfrm>
             <a:off x="548640" y="1188720"/>
-            <a:ext cx="6856920" cy="2377440"/>
+            <a:ext cx="6856560" cy="2377080"/>
           </a:xfrm>
           <a:prstGeom prst="rect">
             <a:avLst/>
@@ -5026,6 +5789,11 @@
             </a:endParaRPr>
           </a:p>
           <a:p>
+            <a:pPr>
+              <a:lnSpc>
+                <a:spcPct val="100000"/>
+              </a:lnSpc>
+            </a:pPr>
             <a:r>
               <a:rPr b="0" lang="en-US" sz="1800" spc="-1" strike="noStrike">
                 <a:solidFill>
@@ -5081,6 +5849,11 @@
             </a:endParaRPr>
           </a:p>
           <a:p>
+            <a:pPr>
+              <a:lnSpc>
+                <a:spcPct val="100000"/>
+              </a:lnSpc>
+            </a:pPr>
             <a:r>
               <a:rPr b="1" lang="en-US" sz="1800" spc="-1" strike="noStrike">
                 <a:solidFill>
@@ -5149,7 +5922,17 @@
                 <a:latin typeface="Arial"/>
                 <a:ea typeface="DejaVu Sans"/>
               </a:rPr>
-              <a:t>number.hoursInMillis</a:t>
+              <a:t>number.hoursInMillis()</a:t>
+            </a:r>
+            <a:r>
+              <a:rPr b="0" lang="en-US" sz="1800" spc="-1" strike="noStrike">
+                <a:solidFill>
+                  <a:srgbClr val="000000"/>
+                </a:solidFill>
+                <a:latin typeface="Arial"/>
+                <a:ea typeface="DejaVu Sans"/>
+              </a:rPr>
+              <a:t> </a:t>
             </a:r>
             <a:r>
               <a:rPr b="0" lang="en-US" sz="1800" spc="-1" strike="noStrike">
@@ -5159,7 +5942,17 @@
                 <a:latin typeface="Arial"/>
                 <a:ea typeface="DejaVu Sans"/>
               </a:rPr>
-              <a:t>(</a:t>
+              <a:t>*</a:t>
+            </a:r>
+            <a:r>
+              <a:rPr b="0" lang="en-US" sz="1800" spc="-1" strike="noStrike">
+                <a:solidFill>
+                  <a:srgbClr val="000000"/>
+                </a:solidFill>
+                <a:latin typeface="Arial"/>
+                <a:ea typeface="DejaVu Sans"/>
+              </a:rPr>
+              <a:t> </a:t>
             </a:r>
             <a:r>
               <a:rPr b="0" lang="en-US" sz="1800" spc="-1" strike="noStrike">
@@ -5169,7 +5962,57 @@
                 <a:latin typeface="Arial"/>
                 <a:ea typeface="DejaVu Sans"/>
               </a:rPr>
-              <a:t>)</a:t>
+              <a:t>getSomething()</a:t>
+            </a:r>
+            <a:endParaRPr b="0" lang="en-US" sz="1800" spc="-1" strike="noStrike">
+              <a:latin typeface="Arial"/>
+            </a:endParaRPr>
+          </a:p>
+          <a:p>
+            <a:pPr>
+              <a:lnSpc>
+                <a:spcPct val="100000"/>
+              </a:lnSpc>
+            </a:pPr>
+            <a:endParaRPr b="0" lang="en-US" sz="1800" spc="-1" strike="noStrike">
+              <a:latin typeface="Arial"/>
+            </a:endParaRPr>
+          </a:p>
+          <a:p>
+            <a:pPr>
+              <a:lnSpc>
+                <a:spcPct val="100000"/>
+              </a:lnSpc>
+            </a:pPr>
+            <a:r>
+              <a:rPr b="1" lang="en-US" sz="1800" spc="-1" strike="noStrike">
+                <a:solidFill>
+                  <a:srgbClr val="182f7c"/>
+                </a:solidFill>
+                <a:latin typeface="Arial"/>
+                <a:ea typeface="DejaVu Sans"/>
+              </a:rPr>
+              <a:t>	</a:t>
+            </a:r>
+            <a:r>
+              <a:rPr b="0" lang="en-US" sz="1800" spc="-1" strike="noStrike">
+                <a:solidFill>
+                  <a:srgbClr val="000000"/>
+                </a:solidFill>
+                <a:latin typeface="Arial"/>
+                <a:ea typeface="DejaVu Sans"/>
+              </a:rPr>
+              <a:t>private</a:t>
+            </a:r>
+            <a:r>
+              <a:rPr b="1" lang="en-US" sz="1800" spc="-1" strike="noStrike">
+                <a:solidFill>
+                  <a:srgbClr val="182f7c"/>
+                </a:solidFill>
+                <a:latin typeface="Arial"/>
+                <a:ea typeface="DejaVu Sans"/>
+              </a:rPr>
+              <a:t> fun</a:t>
             </a:r>
             <a:r>
               <a:rPr b="0" lang="en-US" sz="1800" spc="-1" strike="noStrike">
@@ -5184,132 +6027,22 @@
             <a:r>
               <a:rPr b="0" lang="en-US" sz="1800" spc="-1" strike="noStrike">
                 <a:solidFill>
-                  <a:srgbClr val="616365"/>
-                </a:solidFill>
-                <a:latin typeface="Arial"/>
-                <a:ea typeface="DejaVu Sans"/>
-              </a:rPr>
-              <a:t>*</a:t>
-            </a:r>
-            <a:r>
-              <a:rPr b="0" lang="en-US" sz="1800" spc="-1" strike="noStrike">
-                <a:solidFill>
-                  <a:srgbClr val="000000"/>
-                </a:solidFill>
-                <a:latin typeface="Arial"/>
-                <a:ea typeface="DejaVu Sans"/>
-              </a:rPr>
-              <a:t> </a:t>
-            </a:r>
-            <a:r>
-              <a:rPr b="0" lang="en-US" sz="1800" spc="-1" strike="noStrike">
-                <a:solidFill>
-                  <a:srgbClr val="616365"/>
-                </a:solidFill>
-                <a:latin typeface="Arial"/>
-                <a:ea typeface="DejaVu Sans"/>
-              </a:rPr>
-              <a:t>getSomething</a:t>
-            </a:r>
-            <a:r>
-              <a:rPr b="0" lang="en-US" sz="1800" spc="-1" strike="noStrike">
-                <a:solidFill>
-                  <a:srgbClr val="616365"/>
-                </a:solidFill>
-                <a:latin typeface="Arial"/>
-                <a:ea typeface="DejaVu Sans"/>
-              </a:rPr>
-              <a:t>(</a:t>
-            </a:r>
-            <a:r>
-              <a:rPr b="0" lang="en-US" sz="1800" spc="-1" strike="noStrike">
-                <a:solidFill>
-                  <a:srgbClr val="616365"/>
-                </a:solidFill>
-                <a:latin typeface="Arial"/>
-                <a:ea typeface="DejaVu Sans"/>
-              </a:rPr>
-              <a:t>)</a:t>
-            </a:r>
-            <a:endParaRPr b="0" lang="en-US" sz="1800" spc="-1" strike="noStrike">
-              <a:latin typeface="Arial"/>
-            </a:endParaRPr>
-          </a:p>
-          <a:p>
-            <a:pPr>
-              <a:lnSpc>
-                <a:spcPct val="100000"/>
-              </a:lnSpc>
-            </a:pPr>
-            <a:endParaRPr b="0" lang="en-US" sz="1800" spc="-1" strike="noStrike">
-              <a:latin typeface="Arial"/>
-            </a:endParaRPr>
-          </a:p>
-          <a:p>
-            <a:r>
-              <a:rPr b="1" lang="en-US" sz="1800" spc="-1" strike="noStrike">
-                <a:solidFill>
-                  <a:srgbClr val="182f7c"/>
-                </a:solidFill>
-                <a:latin typeface="Arial"/>
-                <a:ea typeface="DejaVu Sans"/>
-              </a:rPr>
-              <a:t>	</a:t>
-            </a:r>
-            <a:r>
-              <a:rPr b="0" lang="en-US" sz="1800" spc="-1" strike="noStrike">
-                <a:solidFill>
-                  <a:srgbClr val="000000"/>
-                </a:solidFill>
-                <a:latin typeface="Arial"/>
-                <a:ea typeface="DejaVu Sans"/>
-              </a:rPr>
-              <a:t>private</a:t>
-            </a:r>
-            <a:r>
-              <a:rPr b="1" lang="en-US" sz="1800" spc="-1" strike="noStrike">
-                <a:solidFill>
-                  <a:srgbClr val="182f7c"/>
-                </a:solidFill>
-                <a:latin typeface="Arial"/>
-                <a:ea typeface="DejaVu Sans"/>
-              </a:rPr>
-              <a:t> fun</a:t>
-            </a:r>
-            <a:r>
-              <a:rPr b="0" lang="en-US" sz="1800" spc="-1" strike="noStrike">
-                <a:solidFill>
-                  <a:srgbClr val="000000"/>
-                </a:solidFill>
-                <a:latin typeface="Arial"/>
-                <a:ea typeface="DejaVu Sans"/>
-              </a:rPr>
-              <a:t> </a:t>
-            </a:r>
-            <a:r>
-              <a:rPr b="0" lang="en-US" sz="1800" spc="-1" strike="noStrike">
-                <a:solidFill>
                   <a:srgbClr val="820f71"/>
                 </a:solidFill>
                 <a:latin typeface="Arial"/>
+                <a:ea typeface="DejaVu Sans"/>
               </a:rPr>
               <a:t>Int</a:t>
             </a:r>
             <a:r>
               <a:rPr b="0" lang="en-US" sz="1800" spc="-1" strike="noStrike">
-                <a:latin typeface="Arial"/>
-              </a:rPr>
-              <a:t>.hoursInMillis</a:t>
-            </a:r>
-            <a:r>
-              <a:rPr b="0" lang="en-US" sz="1800" spc="-1" strike="noStrike">
-                <a:solidFill>
-                  <a:srgbClr val="000000"/>
-                </a:solidFill>
-                <a:latin typeface="Arial"/>
-                <a:ea typeface="DejaVu Sans"/>
-              </a:rPr>
-              <a:t>() = TimeUnit.HOURS.toMillis(this)</a:t>
+                <a:solidFill>
+                  <a:srgbClr val="000000"/>
+                </a:solidFill>
+                <a:latin typeface="Arial"/>
+                <a:ea typeface="DejaVu Sans"/>
+              </a:rPr>
+              <a:t>.hoursInMillis() = TimeUnit.HOURS.toMillis(this)</a:t>
             </a:r>
             <a:endParaRPr b="0" lang="en-US" sz="1800" spc="-1" strike="noStrike">
               <a:latin typeface="Arial"/>
@@ -5356,7 +6089,7 @@
         <p:spPr>
           <a:xfrm>
             <a:off x="458280" y="3567240"/>
-            <a:ext cx="6856920" cy="3016440"/>
+            <a:ext cx="6856560" cy="3016080"/>
           </a:xfrm>
           <a:prstGeom prst="rect">
             <a:avLst/>
@@ -5424,7 +6157,11 @@
             </a:pPr>
             <a:r>
               <a:rPr b="0" lang="en-US" sz="1800" spc="-1" strike="noStrike">
-                <a:latin typeface="Arial"/>
+                <a:solidFill>
+                  <a:srgbClr val="000000"/>
+                </a:solidFill>
+                <a:latin typeface="Arial"/>
+                <a:ea typeface="DejaVu Sans"/>
               </a:rPr>
               <a:t>public final </a:t>
             </a:r>
@@ -5434,12 +6171,17 @@
                   <a:srgbClr val="820f71"/>
                 </a:solidFill>
                 <a:latin typeface="Arial"/>
+                <a:ea typeface="DejaVu Sans"/>
               </a:rPr>
               <a:t>class</a:t>
             </a:r>
             <a:r>
               <a:rPr b="0" lang="en-US" sz="1800" spc="-1" strike="noStrike">
-                <a:latin typeface="Arial"/>
+                <a:solidFill>
+                  <a:srgbClr val="000000"/>
+                </a:solidFill>
+                <a:latin typeface="Arial"/>
+                <a:ea typeface="DejaVu Sans"/>
               </a:rPr>
               <a:t> Calculator {</a:t>
             </a:r>
@@ -5455,13 +6197,21 @@
             </a:pPr>
             <a:r>
               <a:rPr b="0" lang="en-US" sz="1800" spc="-1" strike="noStrike">
-                <a:latin typeface="Arial"/>
+                <a:solidFill>
+                  <a:srgbClr val="000000"/>
+                </a:solidFill>
+                <a:latin typeface="Arial"/>
+                <a:ea typeface="DejaVu Sans"/>
               </a:rPr>
               <a:t>   </a:t>
             </a:r>
             <a:r>
               <a:rPr b="0" lang="en-US" sz="1800" spc="-1" strike="noStrike">
-                <a:latin typeface="Arial"/>
+                <a:solidFill>
+                  <a:srgbClr val="000000"/>
+                </a:solidFill>
+                <a:latin typeface="Arial"/>
+                <a:ea typeface="DejaVu Sans"/>
               </a:rPr>
               <a:t>public final long calculate(int number) {</a:t>
             </a:r>
@@ -5477,13 +6227,21 @@
             </a:pPr>
             <a:r>
               <a:rPr b="0" lang="en-US" sz="1800" spc="-1" strike="noStrike">
-                <a:latin typeface="Arial"/>
+                <a:solidFill>
+                  <a:srgbClr val="000000"/>
+                </a:solidFill>
+                <a:latin typeface="Arial"/>
+                <a:ea typeface="DejaVu Sans"/>
               </a:rPr>
               <a:t>      </a:t>
             </a:r>
             <a:r>
               <a:rPr b="0" lang="en-US" sz="1800" spc="-1" strike="noStrike">
-                <a:latin typeface="Arial"/>
+                <a:solidFill>
+                  <a:srgbClr val="000000"/>
+                </a:solidFill>
+                <a:latin typeface="Arial"/>
+                <a:ea typeface="DejaVu Sans"/>
               </a:rPr>
               <a:t>return this.hoursInMillis(number) * getSomething();</a:t>
             </a:r>
@@ -5499,13 +6257,21 @@
             </a:pPr>
             <a:r>
               <a:rPr b="0" lang="en-US" sz="1800" spc="-1" strike="noStrike">
-                <a:latin typeface="Arial"/>
+                <a:solidFill>
+                  <a:srgbClr val="000000"/>
+                </a:solidFill>
+                <a:latin typeface="Arial"/>
+                <a:ea typeface="DejaVu Sans"/>
               </a:rPr>
               <a:t>   </a:t>
             </a:r>
             <a:r>
               <a:rPr b="0" lang="en-US" sz="1800" spc="-1" strike="noStrike">
-                <a:latin typeface="Arial"/>
+                <a:solidFill>
+                  <a:srgbClr val="000000"/>
+                </a:solidFill>
+                <a:latin typeface="Arial"/>
+                <a:ea typeface="DejaVu Sans"/>
               </a:rPr>
               <a:t>}</a:t>
             </a:r>
@@ -5531,19 +6297,31 @@
             </a:pPr>
             <a:r>
               <a:rPr b="0" lang="en-US" sz="1800" spc="-1" strike="noStrike">
-                <a:latin typeface="Arial"/>
+                <a:solidFill>
+                  <a:srgbClr val="000000"/>
+                </a:solidFill>
+                <a:latin typeface="Arial"/>
+                <a:ea typeface="DejaVu Sans"/>
               </a:rPr>
               <a:t>   </a:t>
             </a:r>
             <a:r>
               <a:rPr b="1" lang="en-US" sz="1800" spc="-1" strike="noStrike">
-                <a:latin typeface="Arial"/>
+                <a:solidFill>
+                  <a:srgbClr val="000000"/>
+                </a:solidFill>
+                <a:latin typeface="Arial"/>
+                <a:ea typeface="DejaVu Sans"/>
               </a:rPr>
               <a:t>private final long</a:t>
             </a:r>
             <a:r>
               <a:rPr b="0" lang="en-US" sz="1800" spc="-1" strike="noStrike">
-                <a:latin typeface="Arial"/>
+                <a:solidFill>
+                  <a:srgbClr val="000000"/>
+                </a:solidFill>
+                <a:latin typeface="Arial"/>
+                <a:ea typeface="DejaVu Sans"/>
               </a:rPr>
               <a:t> hoursInMillis(int $receiver) {</a:t>
             </a:r>
@@ -5559,13 +6337,21 @@
             </a:pPr>
             <a:r>
               <a:rPr b="0" lang="en-US" sz="1800" spc="-1" strike="noStrike">
-                <a:latin typeface="Arial"/>
+                <a:solidFill>
+                  <a:srgbClr val="000000"/>
+                </a:solidFill>
+                <a:latin typeface="Arial"/>
+                <a:ea typeface="DejaVu Sans"/>
               </a:rPr>
               <a:t>      </a:t>
             </a:r>
             <a:r>
               <a:rPr b="0" lang="en-US" sz="1800" spc="-1" strike="noStrike">
-                <a:latin typeface="Arial"/>
+                <a:solidFill>
+                  <a:srgbClr val="000000"/>
+                </a:solidFill>
+                <a:latin typeface="Arial"/>
+                <a:ea typeface="DejaVu Sans"/>
               </a:rPr>
               <a:t>return TimeUnit.HOURS.toMillis((long)$receiver);</a:t>
             </a:r>
@@ -5581,13 +6367,21 @@
             </a:pPr>
             <a:r>
               <a:rPr b="0" lang="en-US" sz="1800" spc="-1" strike="noStrike">
-                <a:latin typeface="Arial"/>
+                <a:solidFill>
+                  <a:srgbClr val="000000"/>
+                </a:solidFill>
+                <a:latin typeface="Arial"/>
+                <a:ea typeface="DejaVu Sans"/>
               </a:rPr>
               <a:t>   </a:t>
             </a:r>
             <a:r>
               <a:rPr b="0" lang="en-US" sz="1800" spc="-1" strike="noStrike">
-                <a:latin typeface="Arial"/>
+                <a:solidFill>
+                  <a:srgbClr val="000000"/>
+                </a:solidFill>
+                <a:latin typeface="Arial"/>
+                <a:ea typeface="DejaVu Sans"/>
               </a:rPr>
               <a:t>}</a:t>
             </a:r>
@@ -5603,7 +6397,11 @@
             </a:pPr>
             <a:r>
               <a:rPr b="0" lang="en-US" sz="1800" spc="-1" strike="noStrike">
-                <a:latin typeface="Arial"/>
+                <a:solidFill>
+                  <a:srgbClr val="000000"/>
+                </a:solidFill>
+                <a:latin typeface="Arial"/>
+                <a:ea typeface="DejaVu Sans"/>
               </a:rPr>
               <a:t>}</a:t>
             </a:r>
@@ -5729,7 +6527,7 @@
         <p:spPr>
           <a:xfrm>
             <a:off x="457200" y="457200"/>
-            <a:ext cx="6856920" cy="546120"/>
+            <a:ext cx="6856560" cy="545760"/>
           </a:xfrm>
           <a:prstGeom prst="rect">
             <a:avLst/>
@@ -5780,7 +6578,7 @@
         <p:spPr>
           <a:xfrm>
             <a:off x="548640" y="1188720"/>
-            <a:ext cx="6856920" cy="2377440"/>
+            <a:ext cx="6856560" cy="2377080"/>
           </a:xfrm>
           <a:prstGeom prst="rect">
             <a:avLst/>
@@ -5841,6 +6639,11 @@
             </a:endParaRPr>
           </a:p>
           <a:p>
+            <a:pPr>
+              <a:lnSpc>
+                <a:spcPct val="100000"/>
+              </a:lnSpc>
+            </a:pPr>
             <a:r>
               <a:rPr b="0" lang="en-US" sz="1800" spc="-1" strike="noStrike">
                 <a:solidFill>
@@ -5896,6 +6699,11 @@
             </a:endParaRPr>
           </a:p>
           <a:p>
+            <a:pPr>
+              <a:lnSpc>
+                <a:spcPct val="100000"/>
+              </a:lnSpc>
+            </a:pPr>
             <a:r>
               <a:rPr b="1" lang="en-US" sz="1800" spc="-1" strike="noStrike">
                 <a:solidFill>
@@ -5964,7 +6772,17 @@
                 <a:latin typeface="Arial"/>
                 <a:ea typeface="DejaVu Sans"/>
               </a:rPr>
-              <a:t>number.hoursInMillis</a:t>
+              <a:t>number.hoursInMillis()</a:t>
+            </a:r>
+            <a:r>
+              <a:rPr b="0" lang="en-US" sz="1800" spc="-1" strike="noStrike">
+                <a:solidFill>
+                  <a:srgbClr val="000000"/>
+                </a:solidFill>
+                <a:latin typeface="Arial"/>
+                <a:ea typeface="DejaVu Sans"/>
+              </a:rPr>
+              <a:t> </a:t>
             </a:r>
             <a:r>
               <a:rPr b="0" lang="en-US" sz="1800" spc="-1" strike="noStrike">
@@ -5974,7 +6792,17 @@
                 <a:latin typeface="Arial"/>
                 <a:ea typeface="DejaVu Sans"/>
               </a:rPr>
-              <a:t>(</a:t>
+              <a:t>*</a:t>
+            </a:r>
+            <a:r>
+              <a:rPr b="0" lang="en-US" sz="1800" spc="-1" strike="noStrike">
+                <a:solidFill>
+                  <a:srgbClr val="000000"/>
+                </a:solidFill>
+                <a:latin typeface="Arial"/>
+                <a:ea typeface="DejaVu Sans"/>
+              </a:rPr>
+              <a:t> </a:t>
             </a:r>
             <a:r>
               <a:rPr b="0" lang="en-US" sz="1800" spc="-1" strike="noStrike">
@@ -5984,7 +6812,57 @@
                 <a:latin typeface="Arial"/>
                 <a:ea typeface="DejaVu Sans"/>
               </a:rPr>
-              <a:t>)</a:t>
+              <a:t>getSomething()</a:t>
+            </a:r>
+            <a:endParaRPr b="0" lang="en-US" sz="1800" spc="-1" strike="noStrike">
+              <a:latin typeface="Arial"/>
+            </a:endParaRPr>
+          </a:p>
+          <a:p>
+            <a:pPr>
+              <a:lnSpc>
+                <a:spcPct val="100000"/>
+              </a:lnSpc>
+            </a:pPr>
+            <a:endParaRPr b="0" lang="en-US" sz="1800" spc="-1" strike="noStrike">
+              <a:latin typeface="Arial"/>
+            </a:endParaRPr>
+          </a:p>
+          <a:p>
+            <a:pPr>
+              <a:lnSpc>
+                <a:spcPct val="100000"/>
+              </a:lnSpc>
+            </a:pPr>
+            <a:r>
+              <a:rPr b="1" lang="en-US" sz="1800" spc="-1" strike="noStrike">
+                <a:solidFill>
+                  <a:srgbClr val="182f7c"/>
+                </a:solidFill>
+                <a:latin typeface="Arial"/>
+                <a:ea typeface="DejaVu Sans"/>
+              </a:rPr>
+              <a:t>	</a:t>
+            </a:r>
+            <a:r>
+              <a:rPr b="0" lang="en-US" sz="1800" spc="-1" strike="noStrike">
+                <a:solidFill>
+                  <a:srgbClr val="000000"/>
+                </a:solidFill>
+                <a:latin typeface="Arial"/>
+                <a:ea typeface="DejaVu Sans"/>
+              </a:rPr>
+              <a:t>private</a:t>
+            </a:r>
+            <a:r>
+              <a:rPr b="1" lang="en-US" sz="1800" spc="-1" strike="noStrike">
+                <a:solidFill>
+                  <a:srgbClr val="182f7c"/>
+                </a:solidFill>
+                <a:latin typeface="Arial"/>
+                <a:ea typeface="DejaVu Sans"/>
+              </a:rPr>
+              <a:t> fun</a:t>
             </a:r>
             <a:r>
               <a:rPr b="0" lang="en-US" sz="1800" spc="-1" strike="noStrike">
@@ -5999,132 +6877,22 @@
             <a:r>
               <a:rPr b="0" lang="en-US" sz="1800" spc="-1" strike="noStrike">
                 <a:solidFill>
-                  <a:srgbClr val="616365"/>
-                </a:solidFill>
-                <a:latin typeface="Arial"/>
-                <a:ea typeface="DejaVu Sans"/>
-              </a:rPr>
-              <a:t>*</a:t>
-            </a:r>
-            <a:r>
-              <a:rPr b="0" lang="en-US" sz="1800" spc="-1" strike="noStrike">
-                <a:solidFill>
-                  <a:srgbClr val="000000"/>
-                </a:solidFill>
-                <a:latin typeface="Arial"/>
-                <a:ea typeface="DejaVu Sans"/>
-              </a:rPr>
-              <a:t> </a:t>
-            </a:r>
-            <a:r>
-              <a:rPr b="0" lang="en-US" sz="1800" spc="-1" strike="noStrike">
-                <a:solidFill>
-                  <a:srgbClr val="616365"/>
-                </a:solidFill>
-                <a:latin typeface="Arial"/>
-                <a:ea typeface="DejaVu Sans"/>
-              </a:rPr>
-              <a:t>getSomething</a:t>
-            </a:r>
-            <a:r>
-              <a:rPr b="0" lang="en-US" sz="1800" spc="-1" strike="noStrike">
-                <a:solidFill>
-                  <a:srgbClr val="616365"/>
-                </a:solidFill>
-                <a:latin typeface="Arial"/>
-                <a:ea typeface="DejaVu Sans"/>
-              </a:rPr>
-              <a:t>(</a:t>
-            </a:r>
-            <a:r>
-              <a:rPr b="0" lang="en-US" sz="1800" spc="-1" strike="noStrike">
-                <a:solidFill>
-                  <a:srgbClr val="616365"/>
-                </a:solidFill>
-                <a:latin typeface="Arial"/>
-                <a:ea typeface="DejaVu Sans"/>
-              </a:rPr>
-              <a:t>)</a:t>
-            </a:r>
-            <a:endParaRPr b="0" lang="en-US" sz="1800" spc="-1" strike="noStrike">
-              <a:latin typeface="Arial"/>
-            </a:endParaRPr>
-          </a:p>
-          <a:p>
-            <a:pPr>
-              <a:lnSpc>
-                <a:spcPct val="100000"/>
-              </a:lnSpc>
-            </a:pPr>
-            <a:endParaRPr b="0" lang="en-US" sz="1800" spc="-1" strike="noStrike">
-              <a:latin typeface="Arial"/>
-            </a:endParaRPr>
-          </a:p>
-          <a:p>
-            <a:r>
-              <a:rPr b="1" lang="en-US" sz="1800" spc="-1" strike="noStrike">
-                <a:solidFill>
-                  <a:srgbClr val="182f7c"/>
-                </a:solidFill>
-                <a:latin typeface="Arial"/>
-                <a:ea typeface="DejaVu Sans"/>
-              </a:rPr>
-              <a:t>	</a:t>
-            </a:r>
-            <a:r>
-              <a:rPr b="0" lang="en-US" sz="1800" spc="-1" strike="noStrike">
-                <a:solidFill>
-                  <a:srgbClr val="000000"/>
-                </a:solidFill>
-                <a:latin typeface="Arial"/>
-                <a:ea typeface="DejaVu Sans"/>
-              </a:rPr>
-              <a:t>private</a:t>
-            </a:r>
-            <a:r>
-              <a:rPr b="1" lang="en-US" sz="1800" spc="-1" strike="noStrike">
-                <a:solidFill>
-                  <a:srgbClr val="182f7c"/>
-                </a:solidFill>
-                <a:latin typeface="Arial"/>
-                <a:ea typeface="DejaVu Sans"/>
-              </a:rPr>
-              <a:t> fun</a:t>
-            </a:r>
-            <a:r>
-              <a:rPr b="0" lang="en-US" sz="1800" spc="-1" strike="noStrike">
-                <a:solidFill>
-                  <a:srgbClr val="000000"/>
-                </a:solidFill>
-                <a:latin typeface="Arial"/>
-                <a:ea typeface="DejaVu Sans"/>
-              </a:rPr>
-              <a:t> </a:t>
-            </a:r>
-            <a:r>
-              <a:rPr b="0" lang="en-US" sz="1800" spc="-1" strike="noStrike">
-                <a:solidFill>
                   <a:srgbClr val="820f71"/>
                 </a:solidFill>
                 <a:latin typeface="Arial"/>
+                <a:ea typeface="DejaVu Sans"/>
               </a:rPr>
               <a:t>Int</a:t>
             </a:r>
             <a:r>
               <a:rPr b="0" lang="en-US" sz="1800" spc="-1" strike="noStrike">
-                <a:latin typeface="Arial"/>
-              </a:rPr>
-              <a:t>.hoursInMillis</a:t>
-            </a:r>
-            <a:r>
-              <a:rPr b="0" lang="en-US" sz="1800" spc="-1" strike="noStrike">
-                <a:solidFill>
-                  <a:srgbClr val="000000"/>
-                </a:solidFill>
-                <a:latin typeface="Arial"/>
-                <a:ea typeface="DejaVu Sans"/>
-              </a:rPr>
-              <a:t>() = TimeUnit.HOURS.toMillis(this)</a:t>
+                <a:solidFill>
+                  <a:srgbClr val="000000"/>
+                </a:solidFill>
+                <a:latin typeface="Arial"/>
+                <a:ea typeface="DejaVu Sans"/>
+              </a:rPr>
+              <a:t>.hoursInMillis() = TimeUnit.HOURS.toMillis(this)</a:t>
             </a:r>
             <a:endParaRPr b="0" lang="en-US" sz="1800" spc="-1" strike="noStrike">
               <a:latin typeface="Arial"/>
@@ -6268,7 +7036,7 @@
         <p:spPr>
           <a:xfrm>
             <a:off x="366840" y="276840"/>
-            <a:ext cx="6856920" cy="546120"/>
+            <a:ext cx="6856560" cy="545760"/>
           </a:xfrm>
           <a:prstGeom prst="rect">
             <a:avLst/>
@@ -6319,7 +7087,7 @@
         <p:spPr>
           <a:xfrm>
             <a:off x="548640" y="1005840"/>
-            <a:ext cx="6856920" cy="4663440"/>
+            <a:ext cx="6856560" cy="4663080"/>
           </a:xfrm>
           <a:prstGeom prst="rect">
             <a:avLst/>
@@ -6380,6 +7148,11 @@
             </a:endParaRPr>
           </a:p>
           <a:p>
+            <a:pPr>
+              <a:lnSpc>
+                <a:spcPct val="100000"/>
+              </a:lnSpc>
+            </a:pPr>
             <a:r>
               <a:rPr b="0" lang="en-US" sz="1800" spc="-1" strike="noStrike">
                 <a:solidFill>
@@ -6425,11 +7198,21 @@
             </a:endParaRPr>
           </a:p>
           <a:p>
-            <a:endParaRPr b="0" lang="en-US" sz="1800" spc="-1" strike="noStrike">
-              <a:latin typeface="Arial"/>
-            </a:endParaRPr>
-          </a:p>
-          <a:p>
+            <a:pPr>
+              <a:lnSpc>
+                <a:spcPct val="100000"/>
+              </a:lnSpc>
+            </a:pPr>
+            <a:endParaRPr b="0" lang="en-US" sz="1800" spc="-1" strike="noStrike">
+              <a:latin typeface="Arial"/>
+            </a:endParaRPr>
+          </a:p>
+          <a:p>
+            <a:pPr>
+              <a:lnSpc>
+                <a:spcPct val="100000"/>
+              </a:lnSpc>
+            </a:pPr>
             <a:r>
               <a:rPr b="1" lang="en-US" sz="1800" spc="-1" strike="noStrike">
                 <a:solidFill>
@@ -6475,6 +7258,11 @@
             </a:endParaRPr>
           </a:p>
           <a:p>
+            <a:pPr>
+              <a:lnSpc>
+                <a:spcPct val="100000"/>
+              </a:lnSpc>
+            </a:pPr>
             <a:r>
               <a:rPr b="0" lang="en-US" sz="1800" spc="-1" strike="noStrike">
                 <a:solidFill>
@@ -6520,6 +7308,11 @@
             </a:endParaRPr>
           </a:p>
           <a:p>
+            <a:pPr>
+              <a:lnSpc>
+                <a:spcPct val="100000"/>
+              </a:lnSpc>
+            </a:pPr>
             <a:r>
               <a:rPr b="0" lang="en-US" sz="1800" spc="-1" strike="noStrike">
                 <a:solidFill>
@@ -6565,6 +7358,11 @@
             </a:endParaRPr>
           </a:p>
           <a:p>
+            <a:pPr>
+              <a:lnSpc>
+                <a:spcPct val="100000"/>
+              </a:lnSpc>
+            </a:pPr>
             <a:r>
               <a:rPr b="0" lang="en-US" sz="1800" spc="-1" strike="noStrike">
                 <a:solidFill>
@@ -6590,6 +7388,11 @@
             </a:endParaRPr>
           </a:p>
           <a:p>
+            <a:pPr>
+              <a:lnSpc>
+                <a:spcPct val="100000"/>
+              </a:lnSpc>
+            </a:pPr>
             <a:r>
               <a:rPr b="0" lang="en-US" sz="1800" spc="-1" strike="noStrike">
                 <a:solidFill>
@@ -6615,6 +7418,11 @@
             </a:endParaRPr>
           </a:p>
           <a:p>
+            <a:pPr>
+              <a:lnSpc>
+                <a:spcPct val="100000"/>
+              </a:lnSpc>
+            </a:pPr>
             <a:r>
               <a:rPr b="0" lang="en-US" sz="1800" spc="-1" strike="noStrike">
                 <a:solidFill>
@@ -6630,11 +7438,21 @@
             </a:endParaRPr>
           </a:p>
           <a:p>
-            <a:endParaRPr b="0" lang="en-US" sz="1800" spc="-1" strike="noStrike">
-              <a:latin typeface="Arial"/>
-            </a:endParaRPr>
-          </a:p>
-          <a:p>
+            <a:pPr>
+              <a:lnSpc>
+                <a:spcPct val="100000"/>
+              </a:lnSpc>
+            </a:pPr>
+            <a:endParaRPr b="0" lang="en-US" sz="1800" spc="-1" strike="noStrike">
+              <a:latin typeface="Arial"/>
+            </a:endParaRPr>
+          </a:p>
+          <a:p>
+            <a:pPr>
+              <a:lnSpc>
+                <a:spcPct val="100000"/>
+              </a:lnSpc>
+            </a:pPr>
             <a:r>
               <a:rPr b="0" lang="en-US" sz="1800" spc="-1" strike="noStrike">
                 <a:solidFill>
@@ -6680,6 +7498,11 @@
             </a:endParaRPr>
           </a:p>
           <a:p>
+            <a:pPr>
+              <a:lnSpc>
+                <a:spcPct val="100000"/>
+              </a:lnSpc>
+            </a:pPr>
             <a:r>
               <a:rPr b="0" lang="en-US" sz="1800" spc="-1" strike="noStrike">
                 <a:solidFill>
@@ -6725,6 +7548,11 @@
             </a:endParaRPr>
           </a:p>
           <a:p>
+            <a:pPr>
+              <a:lnSpc>
+                <a:spcPct val="100000"/>
+              </a:lnSpc>
+            </a:pPr>
             <a:r>
               <a:rPr b="0" lang="en-US" sz="1800" spc="-1" strike="noStrike">
                 <a:solidFill>
@@ -6760,6 +7588,11 @@
             </a:endParaRPr>
           </a:p>
           <a:p>
+            <a:pPr>
+              <a:lnSpc>
+                <a:spcPct val="100000"/>
+              </a:lnSpc>
+            </a:pPr>
             <a:r>
               <a:rPr b="0" lang="en-US" sz="1800" spc="-1" strike="noStrike">
                 <a:solidFill>
@@ -6795,6 +7628,11 @@
             </a:endParaRPr>
           </a:p>
           <a:p>
+            <a:pPr>
+              <a:lnSpc>
+                <a:spcPct val="100000"/>
+              </a:lnSpc>
+            </a:pPr>
             <a:r>
               <a:rPr b="0" lang="en-US" sz="1800" spc="-1" strike="noStrike">
                 <a:solidFill>
@@ -6820,6 +7658,11 @@
             </a:endParaRPr>
           </a:p>
           <a:p>
+            <a:pPr>
+              <a:lnSpc>
+                <a:spcPct val="100000"/>
+              </a:lnSpc>
+            </a:pPr>
             <a:r>
               <a:rPr b="0" lang="en-US" sz="1800" spc="-1" strike="noStrike">
                 <a:solidFill>
@@ -6942,7 +7785,7 @@
         <p:spPr>
           <a:xfrm>
             <a:off x="366840" y="276840"/>
-            <a:ext cx="6856920" cy="546120"/>
+            <a:ext cx="6856560" cy="545760"/>
           </a:xfrm>
           <a:prstGeom prst="rect">
             <a:avLst/>
@@ -6992,8 +7835,8 @@
         </p:nvSpPr>
         <p:spPr>
           <a:xfrm>
-            <a:off x="549720" y="1005840"/>
-            <a:ext cx="6856920" cy="4937760"/>
+            <a:off x="457200" y="1097280"/>
+            <a:ext cx="6856560" cy="1463040"/>
           </a:xfrm>
           <a:prstGeom prst="rect">
             <a:avLst/>
@@ -7014,508 +7857,510 @@
         <p:txBody>
           <a:bodyPr wrap="none" lIns="90000" rIns="90000" tIns="45000" bIns="45000" anchor="ctr"/>
           <a:p>
-            <a:pPr>
-              <a:lnSpc>
-                <a:spcPct val="100000"/>
-              </a:lnSpc>
-            </a:pPr>
-            <a:endParaRPr b="0" lang="en-US" sz="1800" spc="-1" strike="noStrike">
-              <a:latin typeface="Arial"/>
-            </a:endParaRPr>
-          </a:p>
-          <a:p>
-            <a:pPr>
-              <a:lnSpc>
-                <a:spcPct val="100000"/>
-              </a:lnSpc>
-            </a:pPr>
-            <a:r>
-              <a:rPr b="0" lang="en-US" sz="1800" spc="-1" strike="noStrike">
-                <a:solidFill>
-                  <a:srgbClr val="000000"/>
-                </a:solidFill>
-                <a:latin typeface="Arial"/>
-                <a:ea typeface="DejaVu Sans"/>
-              </a:rPr>
-              <a:t>class Controller {</a:t>
-            </a:r>
-            <a:endParaRPr b="0" lang="en-US" sz="1800" spc="-1" strike="noStrike">
-              <a:latin typeface="Arial"/>
-            </a:endParaRPr>
-          </a:p>
-          <a:p>
-            <a:pPr>
-              <a:lnSpc>
-                <a:spcPct val="100000"/>
-              </a:lnSpc>
-            </a:pPr>
-            <a:endParaRPr b="0" lang="en-US" sz="1800" spc="-1" strike="noStrike">
-              <a:latin typeface="Arial"/>
-            </a:endParaRPr>
-          </a:p>
-          <a:p>
-            <a:pPr>
-              <a:lnSpc>
-                <a:spcPct val="100000"/>
-              </a:lnSpc>
-            </a:pPr>
-            <a:r>
-              <a:rPr b="0" lang="en-US" sz="1800" spc="-1" strike="noStrike">
-                <a:solidFill>
-                  <a:srgbClr val="000000"/>
-                </a:solidFill>
-                <a:latin typeface="Arial"/>
-                <a:ea typeface="DejaVu Sans"/>
-              </a:rPr>
-              <a:t>    </a:t>
-            </a:r>
-            <a:r>
-              <a:rPr b="1" lang="en-US" sz="1800" spc="-1" strike="noStrike">
-                <a:solidFill>
-                  <a:srgbClr val="182f7c"/>
-                </a:solidFill>
-                <a:latin typeface="Arial"/>
-                <a:ea typeface="DejaVu Sans"/>
-              </a:rPr>
-              <a:t>fun</a:t>
-            </a:r>
-            <a:r>
-              <a:rPr b="0" lang="en-US" sz="1800" spc="-1" strike="noStrike">
-                <a:solidFill>
-                  <a:srgbClr val="000000"/>
-                </a:solidFill>
-                <a:latin typeface="Arial"/>
-                <a:ea typeface="DejaVu Sans"/>
-              </a:rPr>
-              <a:t> blockUser(request: Request): Int {</a:t>
-            </a:r>
-            <a:endParaRPr b="0" lang="en-US" sz="1800" spc="-1" strike="noStrike">
-              <a:latin typeface="Arial"/>
-            </a:endParaRPr>
-          </a:p>
-          <a:p>
-            <a:pPr>
-              <a:lnSpc>
-                <a:spcPct val="100000"/>
-              </a:lnSpc>
-            </a:pPr>
-            <a:r>
-              <a:rPr b="1" i="1" lang="en-US" sz="1800" spc="-1" strike="noStrike">
-                <a:solidFill>
-                  <a:srgbClr val="000000"/>
-                </a:solidFill>
-                <a:latin typeface="Arial"/>
-                <a:ea typeface="DejaVu Sans"/>
-              </a:rPr>
-              <a:t>        </a:t>
-            </a:r>
-            <a:r>
-              <a:rPr b="1" i="1" lang="en-US" sz="1800" spc="-1" strike="noStrike">
-                <a:solidFill>
-                  <a:srgbClr val="000000"/>
-                </a:solidFill>
-                <a:latin typeface="Arial"/>
-                <a:ea typeface="DejaVu Sans"/>
-              </a:rPr>
-              <a:t>if (!request.hasAccess()) {</a:t>
-            </a:r>
-            <a:endParaRPr b="0" lang="en-US" sz="1800" spc="-1" strike="noStrike">
-              <a:latin typeface="Arial"/>
-            </a:endParaRPr>
-          </a:p>
-          <a:p>
-            <a:pPr>
-              <a:lnSpc>
-                <a:spcPct val="100000"/>
-              </a:lnSpc>
-            </a:pPr>
-            <a:r>
-              <a:rPr b="1" i="1" lang="en-US" sz="1800" spc="-1" strike="noStrike">
-                <a:solidFill>
-                  <a:srgbClr val="000000"/>
-                </a:solidFill>
-                <a:latin typeface="Arial"/>
-                <a:ea typeface="DejaVu Sans"/>
-              </a:rPr>
-              <a:t>            </a:t>
-            </a:r>
-            <a:r>
-              <a:rPr b="1" i="1" lang="en-US" sz="1800" spc="-1" strike="noStrike">
-                <a:solidFill>
-                  <a:srgbClr val="000000"/>
-                </a:solidFill>
-                <a:latin typeface="Arial"/>
-                <a:ea typeface="DejaVu Sans"/>
-              </a:rPr>
-              <a:t>println("No access")</a:t>
-            </a:r>
-            <a:endParaRPr b="0" lang="en-US" sz="1800" spc="-1" strike="noStrike">
-              <a:latin typeface="Arial"/>
-            </a:endParaRPr>
-          </a:p>
-          <a:p>
-            <a:pPr>
-              <a:lnSpc>
-                <a:spcPct val="100000"/>
-              </a:lnSpc>
-            </a:pPr>
-            <a:r>
-              <a:rPr b="1" i="1" lang="en-US" sz="1800" spc="-1" strike="noStrike">
-                <a:solidFill>
-                  <a:srgbClr val="000000"/>
-                </a:solidFill>
-                <a:latin typeface="Arial"/>
-                <a:ea typeface="DejaVu Sans"/>
-              </a:rPr>
-              <a:t>            </a:t>
-            </a:r>
-            <a:r>
-              <a:rPr b="1" i="1" lang="en-US" sz="1800" spc="-1" strike="noStrike">
-                <a:solidFill>
-                  <a:srgbClr val="000000"/>
-                </a:solidFill>
-                <a:latin typeface="Arial"/>
-                <a:ea typeface="DejaVu Sans"/>
-              </a:rPr>
-              <a:t>return -1</a:t>
-            </a:r>
-            <a:endParaRPr b="0" lang="en-US" sz="1800" spc="-1" strike="noStrike">
-              <a:latin typeface="Arial"/>
-            </a:endParaRPr>
-          </a:p>
-          <a:p>
-            <a:pPr>
-              <a:lnSpc>
-                <a:spcPct val="100000"/>
-              </a:lnSpc>
-            </a:pPr>
-            <a:r>
-              <a:rPr b="1" i="1" lang="en-US" sz="1800" spc="-1" strike="noStrike">
-                <a:solidFill>
-                  <a:srgbClr val="000000"/>
-                </a:solidFill>
-                <a:latin typeface="Arial"/>
-                <a:ea typeface="DejaVu Sans"/>
-              </a:rPr>
-              <a:t>        </a:t>
-            </a:r>
-            <a:r>
-              <a:rPr b="1" i="1" lang="en-US" sz="1800" spc="-1" strike="noStrike">
-                <a:solidFill>
-                  <a:srgbClr val="000000"/>
-                </a:solidFill>
-                <a:latin typeface="Arial"/>
-                <a:ea typeface="DejaVu Sans"/>
+            <a:endParaRPr b="1" lang="en-US" sz="1400" spc="-1" strike="noStrike">
+              <a:latin typeface="Arial"/>
+            </a:endParaRPr>
+          </a:p>
+          <a:p>
+            <a:r>
+              <a:rPr b="1" lang="en-US" sz="1400" spc="-1" strike="noStrike">
+                <a:solidFill>
+                  <a:srgbClr val="cc7832"/>
+                </a:solidFill>
+                <a:latin typeface="DejaVu Sans Mono"/>
+                <a:ea typeface="DejaVu Sans Mono"/>
+              </a:rPr>
+              <a:t>inline</a:t>
+            </a:r>
+            <a:r>
+              <a:rPr b="1" lang="en-US" sz="1400" spc="-1" strike="noStrike">
+                <a:solidFill>
+                  <a:srgbClr val="cc7832"/>
+                </a:solidFill>
+                <a:latin typeface="DejaVu Sans Mono"/>
+                <a:ea typeface="DejaVu Sans Mono"/>
+              </a:rPr>
+              <a:t> fun </a:t>
+            </a:r>
+            <a:r>
+              <a:rPr b="1" lang="en-US" sz="1400" spc="-1" strike="noStrike">
+                <a:solidFill>
+                  <a:srgbClr val="a9b7c6"/>
+                </a:solidFill>
+                <a:latin typeface="DejaVu Sans Mono"/>
+                <a:ea typeface="DejaVu Sans Mono"/>
+              </a:rPr>
+              <a:t>&lt;</a:t>
+            </a:r>
+            <a:r>
+              <a:rPr b="1" lang="en-US" sz="1400" spc="-1" strike="noStrike">
+                <a:solidFill>
+                  <a:srgbClr val="20999d"/>
+                </a:solidFill>
+                <a:latin typeface="DejaVu Sans Mono"/>
+                <a:ea typeface="DejaVu Sans Mono"/>
+              </a:rPr>
+              <a:t>T</a:t>
+            </a:r>
+            <a:r>
+              <a:rPr b="1" lang="en-US" sz="1400" spc="-1" strike="noStrike">
+                <a:solidFill>
+                  <a:srgbClr val="cc7832"/>
+                </a:solidFill>
+                <a:latin typeface="DejaVu Sans Mono"/>
+                <a:ea typeface="DejaVu Sans Mono"/>
+              </a:rPr>
+              <a:t>, </a:t>
+            </a:r>
+            <a:r>
+              <a:rPr b="1" lang="en-US" sz="1400" spc="-1" strike="noStrike">
+                <a:solidFill>
+                  <a:srgbClr val="20999d"/>
+                </a:solidFill>
+                <a:latin typeface="DejaVu Sans Mono"/>
+                <a:ea typeface="DejaVu Sans Mono"/>
+              </a:rPr>
+              <a:t>R</a:t>
+            </a:r>
+            <a:r>
+              <a:rPr b="1" lang="en-US" sz="1400" spc="-1" strike="noStrike">
+                <a:solidFill>
+                  <a:srgbClr val="a9b7c6"/>
+                </a:solidFill>
+                <a:latin typeface="DejaVu Sans Mono"/>
+                <a:ea typeface="DejaVu Sans Mono"/>
+              </a:rPr>
+              <a:t>&gt; </a:t>
+            </a:r>
+            <a:r>
+              <a:rPr b="1" lang="en-US" sz="1400" spc="-1" strike="noStrike">
+                <a:solidFill>
+                  <a:srgbClr val="666666"/>
+                </a:solidFill>
+                <a:latin typeface="DejaVu Sans Mono"/>
+                <a:ea typeface="DejaVu Sans Mono"/>
+              </a:rPr>
+              <a:t>Iterable</a:t>
+            </a:r>
+            <a:r>
+              <a:rPr b="1" lang="en-US" sz="1400" spc="-1" strike="noStrike">
+                <a:solidFill>
+                  <a:srgbClr val="a9b7c6"/>
+                </a:solidFill>
+                <a:latin typeface="DejaVu Sans Mono"/>
+                <a:ea typeface="DejaVu Sans Mono"/>
+              </a:rPr>
+              <a:t>&lt;</a:t>
+            </a:r>
+            <a:r>
+              <a:rPr b="1" lang="en-US" sz="1400" spc="-1" strike="noStrike">
+                <a:solidFill>
+                  <a:srgbClr val="20999d"/>
+                </a:solidFill>
+                <a:latin typeface="DejaVu Sans Mono"/>
+                <a:ea typeface="DejaVu Sans Mono"/>
+              </a:rPr>
+              <a:t>T</a:t>
+            </a:r>
+            <a:r>
+              <a:rPr b="1" lang="en-US" sz="1400" spc="-1" strike="noStrike">
+                <a:solidFill>
+                  <a:srgbClr val="a9b7c6"/>
+                </a:solidFill>
+                <a:latin typeface="DejaVu Sans Mono"/>
+                <a:ea typeface="DejaVu Sans Mono"/>
+              </a:rPr>
+              <a:t>&gt;.</a:t>
+            </a:r>
+            <a:r>
+              <a:rPr b="1" lang="en-US" sz="1400" spc="-1" strike="noStrike">
+                <a:solidFill>
+                  <a:srgbClr val="000000"/>
+                </a:solidFill>
+                <a:latin typeface="DejaVu Sans Mono"/>
+                <a:ea typeface="DejaVu Sans Mono"/>
+              </a:rPr>
+              <a:t>map</a:t>
+            </a:r>
+            <a:r>
+              <a:rPr b="1" lang="en-US" sz="1400" spc="-1" strike="noStrike">
+                <a:solidFill>
+                  <a:srgbClr val="a9b7c6"/>
+                </a:solidFill>
+                <a:latin typeface="DejaVu Sans Mono"/>
+                <a:ea typeface="DejaVu Sans Mono"/>
+              </a:rPr>
+              <a:t>(</a:t>
+            </a:r>
+            <a:r>
+              <a:rPr b="1" lang="en-US" sz="1400" spc="-1" strike="noStrike">
+                <a:solidFill>
+                  <a:srgbClr val="666666"/>
+                </a:solidFill>
+                <a:latin typeface="DejaVu Sans Mono"/>
+                <a:ea typeface="DejaVu Sans Mono"/>
+              </a:rPr>
+              <a:t>transform</a:t>
+            </a:r>
+            <a:r>
+              <a:rPr b="1" lang="en-US" sz="1400" spc="-1" strike="noStrike">
+                <a:solidFill>
+                  <a:srgbClr val="a9b7c6"/>
+                </a:solidFill>
+                <a:latin typeface="DejaVu Sans Mono"/>
+                <a:ea typeface="DejaVu Sans Mono"/>
+              </a:rPr>
+              <a:t>: (</a:t>
+            </a:r>
+            <a:r>
+              <a:rPr b="1" lang="en-US" sz="1400" spc="-1" strike="noStrike">
+                <a:solidFill>
+                  <a:srgbClr val="20999d"/>
+                </a:solidFill>
+                <a:latin typeface="DejaVu Sans Mono"/>
+                <a:ea typeface="DejaVu Sans Mono"/>
+              </a:rPr>
+              <a:t>T</a:t>
+            </a:r>
+            <a:r>
+              <a:rPr b="1" lang="en-US" sz="1400" spc="-1" strike="noStrike">
+                <a:solidFill>
+                  <a:srgbClr val="a9b7c6"/>
+                </a:solidFill>
+                <a:latin typeface="DejaVu Sans Mono"/>
+                <a:ea typeface="DejaVu Sans Mono"/>
+              </a:rPr>
+              <a:t>) -&gt; </a:t>
+            </a:r>
+            <a:r>
+              <a:rPr b="1" lang="en-US" sz="1400" spc="-1" strike="noStrike">
+                <a:solidFill>
+                  <a:srgbClr val="20999d"/>
+                </a:solidFill>
+                <a:latin typeface="DejaVu Sans Mono"/>
+                <a:ea typeface="DejaVu Sans Mono"/>
+              </a:rPr>
+              <a:t>R</a:t>
+            </a:r>
+            <a:r>
+              <a:rPr b="1" lang="en-US" sz="1400" spc="-1" strike="noStrike">
+                <a:solidFill>
+                  <a:srgbClr val="a9b7c6"/>
+                </a:solidFill>
+                <a:latin typeface="DejaVu Sans Mono"/>
+                <a:ea typeface="DejaVu Sans Mono"/>
+              </a:rPr>
+              <a:t>): List&lt;</a:t>
+            </a:r>
+            <a:r>
+              <a:rPr b="1" lang="en-US" sz="1400" spc="-1" strike="noStrike">
+                <a:solidFill>
+                  <a:srgbClr val="20999d"/>
+                </a:solidFill>
+                <a:latin typeface="DejaVu Sans Mono"/>
+                <a:ea typeface="DejaVu Sans Mono"/>
+              </a:rPr>
+              <a:t>R</a:t>
+            </a:r>
+            <a:r>
+              <a:rPr b="1" lang="en-US" sz="1400" spc="-1" strike="noStrike">
+                <a:solidFill>
+                  <a:srgbClr val="a9b7c6"/>
+                </a:solidFill>
+                <a:latin typeface="DejaVu Sans Mono"/>
+                <a:ea typeface="DejaVu Sans Mono"/>
+              </a:rPr>
+              <a:t>&gt;</a:t>
+            </a:r>
+            <a:endParaRPr b="0" lang="en-US" sz="1400" spc="-1" strike="noStrike">
+              <a:latin typeface="Arial"/>
+            </a:endParaRPr>
+          </a:p>
+          <a:p>
+            <a:endParaRPr b="1" lang="en-US" sz="1400" spc="-1" strike="noStrike">
+              <a:latin typeface="Arial"/>
+            </a:endParaRPr>
+          </a:p>
+          <a:p>
+            <a:endParaRPr b="1" lang="en-US" sz="1400" spc="-1" strike="noStrike">
+              <a:latin typeface="Arial"/>
+            </a:endParaRPr>
+          </a:p>
+          <a:p>
+            <a:r>
+              <a:rPr b="1" lang="en-US" sz="1400" spc="-1" strike="noStrike">
+                <a:solidFill>
+                  <a:srgbClr val="a9b7c6"/>
+                </a:solidFill>
+                <a:latin typeface="DejaVu Sans Mono"/>
+                <a:ea typeface="DejaVu Sans Mono"/>
+              </a:rPr>
+              <a:t>// kotlin</a:t>
+            </a:r>
+            <a:endParaRPr b="1" lang="en-US" sz="1400" spc="-1" strike="noStrike">
+              <a:latin typeface="Arial"/>
+            </a:endParaRPr>
+          </a:p>
+          <a:p>
+            <a:endParaRPr b="1" lang="en-US" sz="1400" spc="-1" strike="noStrike">
+              <a:latin typeface="Arial"/>
+            </a:endParaRPr>
+          </a:p>
+          <a:p>
+            <a:r>
+              <a:rPr b="1" i="1" lang="en-US" sz="1400" spc="-1" strike="noStrike">
+                <a:solidFill>
+                  <a:srgbClr val="666666"/>
+                </a:solidFill>
+                <a:latin typeface="DejaVu Sans Mono"/>
+                <a:ea typeface="DejaVu Sans Mono"/>
+              </a:rPr>
+              <a:t>listOf</a:t>
+            </a:r>
+            <a:r>
+              <a:rPr b="1" lang="en-US" sz="1400" spc="-1" strike="noStrike">
+                <a:solidFill>
+                  <a:srgbClr val="a9b7c6"/>
+                </a:solidFill>
+                <a:latin typeface="DejaVu Sans Mono"/>
+                <a:ea typeface="DejaVu Sans Mono"/>
+              </a:rPr>
+              <a:t>(</a:t>
+            </a:r>
+            <a:r>
+              <a:rPr b="1" lang="en-US" sz="1400" spc="-1" strike="noStrike">
+                <a:solidFill>
+                  <a:srgbClr val="6897bb"/>
+                </a:solidFill>
+                <a:latin typeface="DejaVu Sans Mono"/>
+                <a:ea typeface="DejaVu Sans Mono"/>
+              </a:rPr>
+              <a:t>1</a:t>
+            </a:r>
+            <a:r>
+              <a:rPr b="1" lang="en-US" sz="1400" spc="-1" strike="noStrike">
+                <a:solidFill>
+                  <a:srgbClr val="cc7832"/>
+                </a:solidFill>
+                <a:latin typeface="DejaVu Sans Mono"/>
+                <a:ea typeface="DejaVu Sans Mono"/>
+              </a:rPr>
+              <a:t>,</a:t>
+            </a:r>
+            <a:r>
+              <a:rPr b="1" lang="en-US" sz="1400" spc="-1" strike="noStrike">
+                <a:solidFill>
+                  <a:srgbClr val="6897bb"/>
+                </a:solidFill>
+                <a:latin typeface="DejaVu Sans Mono"/>
+                <a:ea typeface="DejaVu Sans Mono"/>
+              </a:rPr>
+              <a:t>2</a:t>
+            </a:r>
+            <a:r>
+              <a:rPr b="1" lang="en-US" sz="1400" spc="-1" strike="noStrike">
+                <a:solidFill>
+                  <a:srgbClr val="a9b7c6"/>
+                </a:solidFill>
+                <a:latin typeface="DejaVu Sans Mono"/>
+                <a:ea typeface="DejaVu Sans Mono"/>
+              </a:rPr>
+              <a:t>).</a:t>
+            </a:r>
+            <a:r>
+              <a:rPr b="1" i="1" lang="en-US" sz="1400" spc="-1" strike="noStrike">
+                <a:solidFill>
+                  <a:srgbClr val="000000"/>
+                </a:solidFill>
+                <a:latin typeface="DejaVu Sans Mono"/>
+                <a:ea typeface="DejaVu Sans Mono"/>
+              </a:rPr>
+              <a:t>map</a:t>
+            </a:r>
+            <a:r>
+              <a:rPr b="1" i="1" lang="en-US" sz="1400" spc="-1" strike="noStrike">
+                <a:solidFill>
+                  <a:srgbClr val="ffc66d"/>
+                </a:solidFill>
+                <a:latin typeface="DejaVu Sans Mono"/>
+                <a:ea typeface="DejaVu Sans Mono"/>
+              </a:rPr>
+              <a:t> </a:t>
+            </a:r>
+            <a:r>
+              <a:rPr b="1" lang="en-US" sz="1400" spc="-1" strike="noStrike">
+                <a:solidFill>
+                  <a:srgbClr val="666666"/>
+                </a:solidFill>
+                <a:latin typeface="DejaVu Sans Mono"/>
+                <a:ea typeface="DejaVu Sans Mono"/>
+              </a:rPr>
+              <a:t>{ it + it }</a:t>
+            </a:r>
+            <a:endParaRPr b="1" lang="en-US" sz="1400" spc="-1" strike="noStrike">
+              <a:latin typeface="Arial"/>
+            </a:endParaRPr>
+          </a:p>
+          <a:p>
+            <a:endParaRPr b="1" lang="en-US" sz="1400" spc="-1" strike="noStrike">
+              <a:latin typeface="Arial"/>
+            </a:endParaRPr>
+          </a:p>
+        </p:txBody>
+      </p:sp>
+      <p:sp>
+        <p:nvSpPr>
+          <p:cNvPr id="101" name="CustomShape 3"/>
+          <p:cNvSpPr/>
+          <p:nvPr/>
+        </p:nvSpPr>
+        <p:spPr>
+          <a:xfrm>
+            <a:off x="609840" y="3137400"/>
+            <a:ext cx="6613920" cy="2714760"/>
+          </a:xfrm>
+          <a:prstGeom prst="rect">
+            <a:avLst/>
+          </a:prstGeom>
+          <a:solidFill>
+            <a:srgbClr val="ffffff"/>
+          </a:solidFill>
+          <a:ln>
+            <a:noFill/>
+          </a:ln>
+        </p:spPr>
+        <p:style>
+          <a:lnRef idx="0"/>
+          <a:fillRef idx="0"/>
+          <a:effectRef idx="0"/>
+          <a:fontRef idx="minor"/>
+        </p:style>
+        <p:txBody>
+          <a:bodyPr wrap="none" lIns="0" rIns="0" tIns="0" bIns="0"/>
+          <a:p>
+            <a:endParaRPr b="1" lang="en-US" sz="1400" spc="-1" strike="noStrike">
+              <a:solidFill>
+                <a:srgbClr val="666666"/>
+              </a:solidFill>
+              <a:latin typeface="DejaVu Sans Mono"/>
+              <a:ea typeface="DejaVu Sans Mono"/>
+            </a:endParaRPr>
+          </a:p>
+          <a:p>
+            <a:r>
+              <a:rPr b="1" lang="en-US" sz="1400" spc="-1" strike="noStrike">
+                <a:solidFill>
+                  <a:srgbClr val="666666"/>
+                </a:solidFill>
+                <a:latin typeface="DejaVu Sans Mono"/>
+              </a:rPr>
+              <a:t>// decompiled java</a:t>
+            </a:r>
+            <a:endParaRPr b="1" lang="en-US" sz="1400" spc="-1" strike="noStrike">
+              <a:solidFill>
+                <a:srgbClr val="666666"/>
+              </a:solidFill>
+              <a:latin typeface="DejaVu Sans Mono"/>
+              <a:ea typeface="DejaVu Sans Mono"/>
+            </a:endParaRPr>
+          </a:p>
+          <a:p>
+            <a:endParaRPr b="1" lang="en-US" sz="1400" spc="-1" strike="noStrike">
+              <a:solidFill>
+                <a:srgbClr val="666666"/>
+              </a:solidFill>
+              <a:latin typeface="DejaVu Sans Mono"/>
+              <a:ea typeface="DejaVu Sans Mono"/>
+            </a:endParaRPr>
+          </a:p>
+          <a:p>
+            <a:r>
+              <a:rPr b="1" lang="en-US" sz="1400" spc="-1" strike="noStrike">
+                <a:solidFill>
+                  <a:srgbClr val="666666"/>
+                </a:solidFill>
+                <a:latin typeface="DejaVu Sans Mono"/>
+              </a:rPr>
+              <a:t>Iterable receiver = CollectionsKt.listOf(new Integer[]{1, 2});</a:t>
+            </a:r>
+            <a:br/>
+            <a:r>
+              <a:rPr b="1" lang="en-US" sz="1400" spc="-1" strike="noStrike">
+                <a:solidFill>
+                  <a:srgbClr val="666666"/>
+                </a:solidFill>
+                <a:latin typeface="DejaVu Sans Mono"/>
+              </a:rPr>
+              <a:t>Collection destination = new ArrayList(...);</a:t>
+            </a:r>
+            <a:br/>
+            <a:r>
+              <a:rPr b="1" lang="en-US" sz="1400" spc="-1" strike="noStrike">
+                <a:solidFill>
+                  <a:srgbClr val="666666"/>
+                </a:solidFill>
+                <a:latin typeface="DejaVu Sans Mono"/>
+              </a:rPr>
+              <a:t>Iterator iterator = receiver.iterator();</a:t>
+            </a:r>
+            <a:br/>
+            <a:br/>
+            <a:r>
+              <a:rPr b="1" lang="en-US" sz="1400" spc="-1" strike="noStrike">
+                <a:solidFill>
+                  <a:srgbClr val="666666"/>
+                </a:solidFill>
+                <a:latin typeface="DejaVu Sans Mono"/>
+              </a:rPr>
+              <a:t>while(iterator.hasNext()) {</a:t>
+            </a:r>
+            <a:br/>
+            <a:r>
+              <a:rPr b="1" lang="en-US" sz="1400" spc="-1" strike="noStrike">
+                <a:solidFill>
+                  <a:srgbClr val="666666"/>
+                </a:solidFill>
+                <a:latin typeface="DejaVu Sans Mono"/>
+              </a:rPr>
+              <a:t>   Object item = iterator.next();</a:t>
+            </a:r>
+            <a:br/>
+            <a:r>
+              <a:rPr b="1" lang="en-US" sz="1400" spc="-1" strike="noStrike">
+                <a:solidFill>
+                  <a:srgbClr val="666666"/>
+                </a:solidFill>
+                <a:latin typeface="DejaVu Sans Mono"/>
+              </a:rPr>
+              <a:t>   int it = ((Number)item).intValue();</a:t>
+            </a:r>
+            <a:br/>
+            <a:r>
+              <a:rPr b="1" lang="en-US" sz="1400" spc="-1" strike="noStrike">
+                <a:solidFill>
+                  <a:srgbClr val="666666"/>
+                </a:solidFill>
+                <a:latin typeface="DejaVu Sans Mono"/>
+              </a:rPr>
+              <a:t>   destination.add(it + it);</a:t>
+            </a:r>
+            <a:br/>
+            <a:r>
+              <a:rPr b="1" lang="en-US" sz="1400" spc="-1" strike="noStrike">
+                <a:solidFill>
+                  <a:srgbClr val="666666"/>
+                </a:solidFill>
+                <a:latin typeface="DejaVu Sans Mono"/>
               </a:rPr>
               <a:t>}</a:t>
             </a:r>
-            <a:endParaRPr b="0" lang="en-US" sz="1800" spc="-1" strike="noStrike">
-              <a:latin typeface="Arial"/>
-            </a:endParaRPr>
-          </a:p>
-          <a:p>
-            <a:pPr>
-              <a:lnSpc>
-                <a:spcPct val="100000"/>
-              </a:lnSpc>
-            </a:pPr>
-            <a:r>
-              <a:rPr b="0" lang="en-US" sz="1800" spc="-1" strike="noStrike">
-                <a:solidFill>
-                  <a:srgbClr val="000000"/>
-                </a:solidFill>
-                <a:latin typeface="Arial"/>
-                <a:ea typeface="DejaVu Sans"/>
-              </a:rPr>
-              <a:t>        </a:t>
-            </a:r>
-            <a:r>
-              <a:rPr b="0" lang="en-US" sz="1800" spc="-1" strike="noStrike">
-                <a:solidFill>
-                  <a:srgbClr val="000000"/>
-                </a:solidFill>
-                <a:latin typeface="Arial"/>
-                <a:ea typeface="DejaVu Sans"/>
-              </a:rPr>
-              <a:t>...</a:t>
-            </a:r>
-            <a:endParaRPr b="0" lang="en-US" sz="1800" spc="-1" strike="noStrike">
-              <a:latin typeface="Arial"/>
-            </a:endParaRPr>
-          </a:p>
-          <a:p>
-            <a:pPr>
-              <a:lnSpc>
-                <a:spcPct val="100000"/>
-              </a:lnSpc>
-            </a:pPr>
-            <a:r>
-              <a:rPr b="0" lang="en-US" sz="1800" spc="-1" strike="noStrike">
-                <a:solidFill>
-                  <a:srgbClr val="000000"/>
-                </a:solidFill>
-                <a:latin typeface="Arial"/>
-                <a:ea typeface="DejaVu Sans"/>
-              </a:rPr>
-              <a:t>    </a:t>
-            </a:r>
-            <a:r>
-              <a:rPr b="0" lang="en-US" sz="1800" spc="-1" strike="noStrike">
-                <a:solidFill>
-                  <a:srgbClr val="000000"/>
-                </a:solidFill>
-                <a:latin typeface="Arial"/>
-                <a:ea typeface="DejaVu Sans"/>
-              </a:rPr>
-              <a:t>}</a:t>
-            </a:r>
-            <a:endParaRPr b="0" lang="en-US" sz="1800" spc="-1" strike="noStrike">
-              <a:latin typeface="Arial"/>
-            </a:endParaRPr>
-          </a:p>
-          <a:p>
-            <a:pPr>
-              <a:lnSpc>
-                <a:spcPct val="100000"/>
-              </a:lnSpc>
-            </a:pPr>
-            <a:endParaRPr b="0" lang="en-US" sz="1800" spc="-1" strike="noStrike">
-              <a:latin typeface="Arial"/>
-            </a:endParaRPr>
-          </a:p>
-          <a:p>
-            <a:r>
-              <a:rPr b="0" lang="en-US" sz="1800" spc="-1" strike="noStrike">
-                <a:solidFill>
-                  <a:srgbClr val="000000"/>
-                </a:solidFill>
-                <a:latin typeface="Arial"/>
-                <a:ea typeface="DejaVu Sans"/>
-              </a:rPr>
-              <a:t>    </a:t>
-            </a:r>
-            <a:r>
-              <a:rPr b="1" lang="en-US" sz="1800" spc="-1" strike="noStrike">
-                <a:solidFill>
-                  <a:srgbClr val="182f7c"/>
-                </a:solidFill>
-                <a:latin typeface="Arial"/>
-                <a:ea typeface="DejaVu Sans"/>
-              </a:rPr>
-              <a:t>fun</a:t>
-            </a:r>
-            <a:r>
-              <a:rPr b="0" lang="en-US" sz="1800" spc="-1" strike="noStrike">
-                <a:solidFill>
-                  <a:srgbClr val="000000"/>
-                </a:solidFill>
-                <a:latin typeface="Arial"/>
-                <a:ea typeface="DejaVu Sans"/>
-              </a:rPr>
-              <a:t> deleteUser(request: Request) {</a:t>
-            </a:r>
-            <a:endParaRPr b="0" lang="en-US" sz="1800" spc="-1" strike="noStrike">
-              <a:latin typeface="Arial"/>
-            </a:endParaRPr>
-          </a:p>
-          <a:p>
-            <a:pPr>
-              <a:lnSpc>
-                <a:spcPct val="100000"/>
-              </a:lnSpc>
-            </a:pPr>
-            <a:r>
-              <a:rPr b="1" i="1" lang="en-US" sz="1800" spc="-1" strike="noStrike">
-                <a:solidFill>
-                  <a:srgbClr val="000000"/>
-                </a:solidFill>
-                <a:latin typeface="Arial"/>
-                <a:ea typeface="DejaVu Sans"/>
-              </a:rPr>
-              <a:t>        </a:t>
-            </a:r>
-            <a:r>
-              <a:rPr b="1" i="1" lang="en-US" sz="1800" spc="-1" strike="noStrike">
-                <a:solidFill>
-                  <a:srgbClr val="000000"/>
-                </a:solidFill>
-                <a:latin typeface="Arial"/>
-                <a:ea typeface="DejaVu Sans"/>
-              </a:rPr>
-              <a:t>if (!request.hasAccess()) {</a:t>
-            </a:r>
-            <a:endParaRPr b="0" lang="en-US" sz="1800" spc="-1" strike="noStrike">
-              <a:latin typeface="Arial"/>
-            </a:endParaRPr>
-          </a:p>
-          <a:p>
-            <a:pPr>
-              <a:lnSpc>
-                <a:spcPct val="100000"/>
-              </a:lnSpc>
-            </a:pPr>
-            <a:r>
-              <a:rPr b="1" i="1" lang="en-US" sz="1800" spc="-1" strike="noStrike">
-                <a:solidFill>
-                  <a:srgbClr val="000000"/>
-                </a:solidFill>
-                <a:latin typeface="Arial"/>
-                <a:ea typeface="DejaVu Sans"/>
-              </a:rPr>
-              <a:t>            </a:t>
-            </a:r>
-            <a:r>
-              <a:rPr b="1" i="1" lang="en-US" sz="1800" spc="-1" strike="noStrike">
-                <a:solidFill>
-                  <a:srgbClr val="000000"/>
-                </a:solidFill>
-                <a:latin typeface="Arial"/>
-                <a:ea typeface="DejaVu Sans"/>
-              </a:rPr>
-              <a:t>println("No access")</a:t>
-            </a:r>
-            <a:endParaRPr b="0" lang="en-US" sz="1800" spc="-1" strike="noStrike">
-              <a:latin typeface="Arial"/>
-            </a:endParaRPr>
-          </a:p>
-          <a:p>
-            <a:pPr>
-              <a:lnSpc>
-                <a:spcPct val="100000"/>
-              </a:lnSpc>
-            </a:pPr>
-            <a:r>
-              <a:rPr b="1" i="1" lang="en-US" sz="1800" spc="-1" strike="noStrike">
-                <a:solidFill>
-                  <a:srgbClr val="000000"/>
-                </a:solidFill>
-                <a:latin typeface="Arial"/>
-                <a:ea typeface="DejaVu Sans"/>
-              </a:rPr>
-              <a:t>            </a:t>
-            </a:r>
-            <a:r>
-              <a:rPr b="1" i="1" lang="en-US" sz="1800" spc="-1" strike="noStrike">
-                <a:solidFill>
-                  <a:srgbClr val="000000"/>
-                </a:solidFill>
-                <a:latin typeface="Arial"/>
-                <a:ea typeface="DejaVu Sans"/>
-              </a:rPr>
-              <a:t>return -1</a:t>
-            </a:r>
-            <a:endParaRPr b="0" lang="en-US" sz="1800" spc="-1" strike="noStrike">
-              <a:latin typeface="Arial"/>
-            </a:endParaRPr>
-          </a:p>
-          <a:p>
-            <a:pPr>
-              <a:lnSpc>
-                <a:spcPct val="100000"/>
-              </a:lnSpc>
-            </a:pPr>
-            <a:r>
-              <a:rPr b="1" i="1" lang="en-US" sz="1800" spc="-1" strike="noStrike">
-                <a:solidFill>
-                  <a:srgbClr val="000000"/>
-                </a:solidFill>
-                <a:latin typeface="Arial"/>
-                <a:ea typeface="DejaVu Sans"/>
-              </a:rPr>
-              <a:t>        </a:t>
-            </a:r>
-            <a:r>
-              <a:rPr b="1" i="1" lang="en-US" sz="1800" spc="-1" strike="noStrike">
-                <a:solidFill>
-                  <a:srgbClr val="000000"/>
-                </a:solidFill>
-                <a:latin typeface="Arial"/>
-                <a:ea typeface="DejaVu Sans"/>
-              </a:rPr>
-              <a:t>}</a:t>
-            </a:r>
-            <a:endParaRPr b="0" lang="en-US" sz="1800" spc="-1" strike="noStrike">
-              <a:latin typeface="Arial"/>
-            </a:endParaRPr>
-          </a:p>
-          <a:p>
-            <a:pPr>
-              <a:lnSpc>
-                <a:spcPct val="100000"/>
-              </a:lnSpc>
-            </a:pPr>
-            <a:r>
-              <a:rPr b="0" lang="en-US" sz="1800" spc="-1" strike="noStrike">
-                <a:solidFill>
-                  <a:srgbClr val="000000"/>
-                </a:solidFill>
-                <a:latin typeface="Arial"/>
-                <a:ea typeface="DejaVu Sans"/>
-              </a:rPr>
-              <a:t>        </a:t>
-            </a:r>
-            <a:r>
-              <a:rPr b="0" lang="en-US" sz="1800" spc="-1" strike="noStrike">
-                <a:solidFill>
-                  <a:srgbClr val="000000"/>
-                </a:solidFill>
-                <a:latin typeface="Arial"/>
-                <a:ea typeface="DejaVu Sans"/>
-              </a:rPr>
-              <a:t>...</a:t>
-            </a:r>
-            <a:endParaRPr b="0" lang="en-US" sz="1800" spc="-1" strike="noStrike">
-              <a:latin typeface="Arial"/>
-            </a:endParaRPr>
-          </a:p>
-          <a:p>
-            <a:pPr>
-              <a:lnSpc>
-                <a:spcPct val="100000"/>
-              </a:lnSpc>
-            </a:pPr>
-            <a:r>
-              <a:rPr b="0" lang="en-US" sz="1800" spc="-1" strike="noStrike">
-                <a:solidFill>
-                  <a:srgbClr val="000000"/>
-                </a:solidFill>
-                <a:latin typeface="Arial"/>
-                <a:ea typeface="DejaVu Sans"/>
-              </a:rPr>
-              <a:t>    </a:t>
-            </a:r>
-            <a:r>
-              <a:rPr b="0" lang="en-US" sz="1800" spc="-1" strike="noStrike">
-                <a:solidFill>
-                  <a:srgbClr val="000000"/>
-                </a:solidFill>
-                <a:latin typeface="Arial"/>
-                <a:ea typeface="DejaVu Sans"/>
-              </a:rPr>
-              <a:t>}</a:t>
-            </a:r>
-            <a:endParaRPr b="0" lang="en-US" sz="1800" spc="-1" strike="noStrike">
-              <a:latin typeface="Arial"/>
-            </a:endParaRPr>
-          </a:p>
-          <a:p>
-            <a:pPr>
-              <a:lnSpc>
-                <a:spcPct val="100000"/>
-              </a:lnSpc>
-            </a:pPr>
-            <a:r>
-              <a:rPr b="0" lang="en-US" sz="1800" spc="-1" strike="noStrike">
-                <a:solidFill>
-                  <a:srgbClr val="000000"/>
-                </a:solidFill>
-                <a:latin typeface="Arial"/>
-                <a:ea typeface="DejaVu Sans"/>
-              </a:rPr>
-              <a:t>}</a:t>
-            </a:r>
-            <a:endParaRPr b="0" lang="en-US" sz="1800" spc="-1" strike="noStrike">
-              <a:latin typeface="Arial"/>
+            <a:br/>
+            <a:endParaRPr b="1" lang="en-US" sz="1400" spc="-1" strike="noStrike">
+              <a:solidFill>
+                <a:srgbClr val="666666"/>
+              </a:solidFill>
+              <a:latin typeface="DejaVu Sans Mono"/>
+              <a:ea typeface="DejaVu Sans Mono"/>
             </a:endParaRPr>
           </a:p>
         </p:txBody>
@@ -7571,14 +8416,14 @@
       </p:grpSpPr>
       <p:sp>
         <p:nvSpPr>
-          <p:cNvPr id="101" name="CustomShape 1"/>
+          <p:cNvPr id="102" name="CustomShape 1"/>
           <p:cNvSpPr/>
           <p:nvPr/>
         </p:nvSpPr>
         <p:spPr>
           <a:xfrm>
             <a:off x="366840" y="276840"/>
-            <a:ext cx="6856920" cy="546120"/>
+            <a:ext cx="6856560" cy="545760"/>
           </a:xfrm>
           <a:prstGeom prst="rect">
             <a:avLst/>
@@ -7622,14 +8467,14 @@
       </p:sp>
       <p:sp>
         <p:nvSpPr>
-          <p:cNvPr id="102" name="CustomShape 2"/>
+          <p:cNvPr id="103" name="CustomShape 2"/>
           <p:cNvSpPr/>
           <p:nvPr/>
         </p:nvSpPr>
         <p:spPr>
           <a:xfrm>
             <a:off x="549720" y="1005840"/>
-            <a:ext cx="6856920" cy="5303520"/>
+            <a:ext cx="6856560" cy="4937400"/>
           </a:xfrm>
           <a:prstGeom prst="rect">
             <a:avLst/>
@@ -7655,6 +8500,16 @@
                 <a:spcPct val="100000"/>
               </a:lnSpc>
             </a:pPr>
+            <a:endParaRPr b="0" lang="en-US" sz="1800" spc="-1" strike="noStrike">
+              <a:latin typeface="Arial"/>
+            </a:endParaRPr>
+          </a:p>
+          <a:p>
+            <a:pPr>
+              <a:lnSpc>
+                <a:spcPct val="100000"/>
+              </a:lnSpc>
+            </a:pPr>
             <a:r>
               <a:rPr b="0" lang="en-US" sz="1800" spc="-1" strike="noStrike">
                 <a:solidFill>
@@ -7696,16 +8551,6 @@
               <a:t>    </a:t>
             </a:r>
             <a:r>
-              <a:rPr b="0" lang="en-US" sz="1800" spc="-1" strike="noStrike">
-                <a:solidFill>
-                  <a:srgbClr val="000000"/>
-                </a:solidFill>
-                <a:latin typeface="Arial"/>
-                <a:ea typeface="DejaVu Sans"/>
-              </a:rPr>
-              <a:t>private </a:t>
-            </a:r>
-            <a:r>
               <a:rPr b="1" lang="en-US" sz="1800" spc="-1" strike="noStrike">
                 <a:solidFill>
                   <a:srgbClr val="182f7c"/>
@@ -7723,7 +8568,7 @@
                 <a:latin typeface="Arial"/>
                 <a:ea typeface="DejaVu Sans"/>
               </a:rPr>
-              <a:t> checkAcess(request: Request): Int {</a:t>
+              <a:t> blockUser(request: Request): Int {</a:t>
             </a:r>
             <a:endParaRPr b="0" lang="en-US" sz="1800" spc="-1" strike="noStrike">
               <a:latin typeface="Arial"/>
@@ -7856,6 +8701,116 @@
               </a:lnSpc>
             </a:pPr>
             <a:r>
+              <a:rPr b="0" lang="en-US" sz="1800" spc="-1" strike="noStrike">
+                <a:solidFill>
+                  <a:srgbClr val="000000"/>
+                </a:solidFill>
+                <a:latin typeface="Arial"/>
+                <a:ea typeface="DejaVu Sans"/>
+              </a:rPr>
+              <a:t>        </a:t>
+            </a:r>
+            <a:r>
+              <a:rPr b="0" lang="en-US" sz="1800" spc="-1" strike="noStrike">
+                <a:solidFill>
+                  <a:srgbClr val="000000"/>
+                </a:solidFill>
+                <a:latin typeface="Arial"/>
+                <a:ea typeface="DejaVu Sans"/>
+              </a:rPr>
+              <a:t>...</a:t>
+            </a:r>
+            <a:endParaRPr b="0" lang="en-US" sz="1800" spc="-1" strike="noStrike">
+              <a:latin typeface="Arial"/>
+            </a:endParaRPr>
+          </a:p>
+          <a:p>
+            <a:pPr>
+              <a:lnSpc>
+                <a:spcPct val="100000"/>
+              </a:lnSpc>
+            </a:pPr>
+            <a:r>
+              <a:rPr b="0" lang="en-US" sz="1800" spc="-1" strike="noStrike">
+                <a:solidFill>
+                  <a:srgbClr val="000000"/>
+                </a:solidFill>
+                <a:latin typeface="Arial"/>
+                <a:ea typeface="DejaVu Sans"/>
+              </a:rPr>
+              <a:t>    </a:t>
+            </a:r>
+            <a:r>
+              <a:rPr b="0" lang="en-US" sz="1800" spc="-1" strike="noStrike">
+                <a:solidFill>
+                  <a:srgbClr val="000000"/>
+                </a:solidFill>
+                <a:latin typeface="Arial"/>
+                <a:ea typeface="DejaVu Sans"/>
+              </a:rPr>
+              <a:t>}</a:t>
+            </a:r>
+            <a:endParaRPr b="0" lang="en-US" sz="1800" spc="-1" strike="noStrike">
+              <a:latin typeface="Arial"/>
+            </a:endParaRPr>
+          </a:p>
+          <a:p>
+            <a:pPr>
+              <a:lnSpc>
+                <a:spcPct val="100000"/>
+              </a:lnSpc>
+            </a:pPr>
+            <a:endParaRPr b="0" lang="en-US" sz="1800" spc="-1" strike="noStrike">
+              <a:latin typeface="Arial"/>
+            </a:endParaRPr>
+          </a:p>
+          <a:p>
+            <a:pPr>
+              <a:lnSpc>
+                <a:spcPct val="100000"/>
+              </a:lnSpc>
+            </a:pPr>
+            <a:r>
+              <a:rPr b="0" lang="en-US" sz="1800" spc="-1" strike="noStrike">
+                <a:solidFill>
+                  <a:srgbClr val="000000"/>
+                </a:solidFill>
+                <a:latin typeface="Arial"/>
+                <a:ea typeface="DejaVu Sans"/>
+              </a:rPr>
+              <a:t>    </a:t>
+            </a:r>
+            <a:r>
+              <a:rPr b="1" lang="en-US" sz="1800" spc="-1" strike="noStrike">
+                <a:solidFill>
+                  <a:srgbClr val="182f7c"/>
+                </a:solidFill>
+                <a:latin typeface="Arial"/>
+                <a:ea typeface="DejaVu Sans"/>
+              </a:rPr>
+              <a:t>fun</a:t>
+            </a:r>
+            <a:r>
+              <a:rPr b="0" lang="en-US" sz="1800" spc="-1" strike="noStrike">
+                <a:solidFill>
+                  <a:srgbClr val="000000"/>
+                </a:solidFill>
+                <a:latin typeface="Arial"/>
+                <a:ea typeface="DejaVu Sans"/>
+              </a:rPr>
+              <a:t> deleteUser(request: Request): Int {</a:t>
+            </a:r>
+            <a:endParaRPr b="0" lang="en-US" sz="1800" spc="-1" strike="noStrike">
+              <a:latin typeface="Arial"/>
+            </a:endParaRPr>
+          </a:p>
+          <a:p>
+            <a:pPr>
+              <a:lnSpc>
+                <a:spcPct val="100000"/>
+              </a:lnSpc>
+            </a:pPr>
+            <a:r>
               <a:rPr b="1" i="1" lang="en-US" sz="1800" spc="-1" strike="noStrike">
                 <a:solidFill>
                   <a:srgbClr val="000000"/>
@@ -7863,7 +8818,7 @@
                 <a:latin typeface="Arial"/>
                 <a:ea typeface="DejaVu Sans"/>
               </a:rPr>
-              <a:t>	</a:t>
+              <a:t>        </a:t>
             </a:r>
             <a:r>
               <a:rPr b="1" i="1" lang="en-US" sz="1800" spc="-1" strike="noStrike">
@@ -7873,30 +8828,90 @@
                 <a:latin typeface="Arial"/>
                 <a:ea typeface="DejaVu Sans"/>
               </a:rPr>
-              <a:t>return 0</a:t>
-            </a:r>
-            <a:endParaRPr b="0" lang="en-US" sz="1800" spc="-1" strike="noStrike">
-              <a:latin typeface="Arial"/>
-            </a:endParaRPr>
-          </a:p>
-          <a:p>
-            <a:pPr>
-              <a:lnSpc>
-                <a:spcPct val="100000"/>
-              </a:lnSpc>
-            </a:pPr>
-            <a:r>
-              <a:rPr b="0" lang="en-US" sz="1800" spc="-1" strike="noStrike">
-                <a:solidFill>
-                  <a:srgbClr val="000000"/>
-                </a:solidFill>
-                <a:latin typeface="Arial"/>
-                <a:ea typeface="DejaVu Sans"/>
-              </a:rPr>
-              <a:t>    </a:t>
-            </a:r>
-            <a:r>
-              <a:rPr b="0" lang="en-US" sz="1800" spc="-1" strike="noStrike">
+              <a:t>if (!request.hasAccess()) {</a:t>
+            </a:r>
+            <a:endParaRPr b="0" lang="en-US" sz="1800" spc="-1" strike="noStrike">
+              <a:latin typeface="Arial"/>
+            </a:endParaRPr>
+          </a:p>
+          <a:p>
+            <a:pPr>
+              <a:lnSpc>
+                <a:spcPct val="100000"/>
+              </a:lnSpc>
+            </a:pPr>
+            <a:r>
+              <a:rPr b="1" i="1" lang="en-US" sz="1800" spc="-1" strike="noStrike">
+                <a:solidFill>
+                  <a:srgbClr val="000000"/>
+                </a:solidFill>
+                <a:latin typeface="Arial"/>
+                <a:ea typeface="DejaVu Sans"/>
+              </a:rPr>
+              <a:t>            </a:t>
+            </a:r>
+            <a:r>
+              <a:rPr b="1" i="1" lang="en-US" sz="1800" spc="-1" strike="noStrike">
+                <a:solidFill>
+                  <a:srgbClr val="000000"/>
+                </a:solidFill>
+                <a:latin typeface="Arial"/>
+                <a:ea typeface="DejaVu Sans"/>
+              </a:rPr>
+              <a:t>println("No access")</a:t>
+            </a:r>
+            <a:endParaRPr b="0" lang="en-US" sz="1800" spc="-1" strike="noStrike">
+              <a:latin typeface="Arial"/>
+            </a:endParaRPr>
+          </a:p>
+          <a:p>
+            <a:pPr>
+              <a:lnSpc>
+                <a:spcPct val="100000"/>
+              </a:lnSpc>
+            </a:pPr>
+            <a:r>
+              <a:rPr b="1" i="1" lang="en-US" sz="1800" spc="-1" strike="noStrike">
+                <a:solidFill>
+                  <a:srgbClr val="000000"/>
+                </a:solidFill>
+                <a:latin typeface="Arial"/>
+                <a:ea typeface="DejaVu Sans"/>
+              </a:rPr>
+              <a:t>            </a:t>
+            </a:r>
+            <a:r>
+              <a:rPr b="1" i="1" lang="en-US" sz="1800" spc="-1" strike="noStrike">
+                <a:solidFill>
+                  <a:srgbClr val="000000"/>
+                </a:solidFill>
+                <a:latin typeface="Arial"/>
+                <a:ea typeface="DejaVu Sans"/>
+              </a:rPr>
+              <a:t>return -1</a:t>
+            </a:r>
+            <a:endParaRPr b="0" lang="en-US" sz="1800" spc="-1" strike="noStrike">
+              <a:latin typeface="Arial"/>
+            </a:endParaRPr>
+          </a:p>
+          <a:p>
+            <a:pPr>
+              <a:lnSpc>
+                <a:spcPct val="100000"/>
+              </a:lnSpc>
+            </a:pPr>
+            <a:r>
+              <a:rPr b="1" i="1" lang="en-US" sz="1800" spc="-1" strike="noStrike">
+                <a:solidFill>
+                  <a:srgbClr val="000000"/>
+                </a:solidFill>
+                <a:latin typeface="Arial"/>
+                <a:ea typeface="DejaVu Sans"/>
+              </a:rPr>
+              <a:t>        </a:t>
+            </a:r>
+            <a:r>
+              <a:rPr b="1" i="1" lang="en-US" sz="1800" spc="-1" strike="noStrike">
                 <a:solidFill>
                   <a:srgbClr val="000000"/>
                 </a:solidFill>
@@ -7904,241 +8919,6 @@
                 <a:ea typeface="DejaVu Sans"/>
               </a:rPr>
               <a:t>}</a:t>
-            </a:r>
-            <a:endParaRPr b="0" lang="en-US" sz="1800" spc="-1" strike="noStrike">
-              <a:latin typeface="Arial"/>
-            </a:endParaRPr>
-          </a:p>
-          <a:p>
-            <a:pPr>
-              <a:lnSpc>
-                <a:spcPct val="100000"/>
-              </a:lnSpc>
-            </a:pPr>
-            <a:endParaRPr b="0" lang="en-US" sz="1800" spc="-1" strike="noStrike">
-              <a:latin typeface="Arial"/>
-            </a:endParaRPr>
-          </a:p>
-          <a:p>
-            <a:pPr>
-              <a:lnSpc>
-                <a:spcPct val="100000"/>
-              </a:lnSpc>
-            </a:pPr>
-            <a:r>
-              <a:rPr b="0" lang="en-US" sz="1800" spc="-1" strike="noStrike">
-                <a:solidFill>
-                  <a:srgbClr val="000000"/>
-                </a:solidFill>
-                <a:latin typeface="Arial"/>
-                <a:ea typeface="DejaVu Sans"/>
-              </a:rPr>
-              <a:t>    </a:t>
-            </a:r>
-            <a:r>
-              <a:rPr b="1" lang="en-US" sz="1800" spc="-1" strike="noStrike">
-                <a:solidFill>
-                  <a:srgbClr val="182f7c"/>
-                </a:solidFill>
-                <a:latin typeface="Arial"/>
-                <a:ea typeface="DejaVu Sans"/>
-              </a:rPr>
-              <a:t>fun</a:t>
-            </a:r>
-            <a:r>
-              <a:rPr b="0" lang="en-US" sz="1800" spc="-1" strike="noStrike">
-                <a:solidFill>
-                  <a:srgbClr val="000000"/>
-                </a:solidFill>
-                <a:latin typeface="Arial"/>
-                <a:ea typeface="DejaVu Sans"/>
-              </a:rPr>
-              <a:t> blockUser(request: Request): Int {</a:t>
-            </a:r>
-            <a:endParaRPr b="0" lang="en-US" sz="1800" spc="-1" strike="noStrike">
-              <a:latin typeface="Arial"/>
-            </a:endParaRPr>
-          </a:p>
-          <a:p>
-            <a:pPr>
-              <a:lnSpc>
-                <a:spcPct val="100000"/>
-              </a:lnSpc>
-            </a:pPr>
-            <a:r>
-              <a:rPr b="0" lang="en-US" sz="1800" spc="-1" strike="noStrike">
-                <a:solidFill>
-                  <a:srgbClr val="000000"/>
-                </a:solidFill>
-                <a:latin typeface="Arial"/>
-                <a:ea typeface="DejaVu Sans"/>
-              </a:rPr>
-              <a:t>	</a:t>
-            </a:r>
-            <a:r>
-              <a:rPr b="1" lang="en-US" sz="1800" spc="-1" strike="noStrike">
-                <a:solidFill>
-                  <a:srgbClr val="000000"/>
-                </a:solidFill>
-                <a:latin typeface="Arial"/>
-                <a:ea typeface="DejaVu Sans"/>
-              </a:rPr>
-              <a:t>checkAcess</a:t>
-            </a:r>
-            <a:r>
-              <a:rPr b="0" lang="en-US" sz="1800" spc="-1" strike="noStrike">
-                <a:solidFill>
-                  <a:srgbClr val="000000"/>
-                </a:solidFill>
-                <a:latin typeface="Arial"/>
-                <a:ea typeface="DejaVu Sans"/>
-              </a:rPr>
-              <a:t>(request)</a:t>
-            </a:r>
-            <a:endParaRPr b="0" lang="en-US" sz="1800" spc="-1" strike="noStrike">
-              <a:latin typeface="Arial"/>
-            </a:endParaRPr>
-          </a:p>
-          <a:p>
-            <a:pPr>
-              <a:lnSpc>
-                <a:spcPct val="100000"/>
-              </a:lnSpc>
-            </a:pPr>
-            <a:r>
-              <a:rPr b="0" lang="en-US" sz="1800" spc="-1" strike="noStrike">
-                <a:solidFill>
-                  <a:srgbClr val="000000"/>
-                </a:solidFill>
-                <a:latin typeface="Arial"/>
-                <a:ea typeface="DejaVu Sans"/>
-              </a:rPr>
-              <a:t>        </a:t>
-            </a:r>
-            <a:r>
-              <a:rPr b="0" lang="en-US" sz="1800" spc="-1" strike="noStrike">
-                <a:solidFill>
-                  <a:srgbClr val="000000"/>
-                </a:solidFill>
-                <a:latin typeface="Arial"/>
-                <a:ea typeface="DejaVu Sans"/>
-              </a:rPr>
-              <a:t>...</a:t>
-            </a:r>
-            <a:endParaRPr b="0" lang="en-US" sz="1800" spc="-1" strike="noStrike">
-              <a:latin typeface="Arial"/>
-            </a:endParaRPr>
-          </a:p>
-          <a:p>
-            <a:pPr>
-              <a:lnSpc>
-                <a:spcPct val="100000"/>
-              </a:lnSpc>
-            </a:pPr>
-            <a:r>
-              <a:rPr b="0" lang="en-US" sz="1800" spc="-1" strike="noStrike">
-                <a:solidFill>
-                  <a:srgbClr val="000000"/>
-                </a:solidFill>
-                <a:latin typeface="Arial"/>
-                <a:ea typeface="DejaVu Sans"/>
-              </a:rPr>
-              <a:t>    </a:t>
-            </a:r>
-            <a:r>
-              <a:rPr b="0" lang="en-US" sz="1800" spc="-1" strike="noStrike">
-                <a:solidFill>
-                  <a:srgbClr val="000000"/>
-                </a:solidFill>
-                <a:latin typeface="Arial"/>
-                <a:ea typeface="DejaVu Sans"/>
-              </a:rPr>
-              <a:t>}</a:t>
-            </a:r>
-            <a:endParaRPr b="0" lang="en-US" sz="1800" spc="-1" strike="noStrike">
-              <a:latin typeface="Arial"/>
-            </a:endParaRPr>
-          </a:p>
-          <a:p>
-            <a:pPr>
-              <a:lnSpc>
-                <a:spcPct val="100000"/>
-              </a:lnSpc>
-            </a:pPr>
-            <a:endParaRPr b="0" lang="en-US" sz="1800" spc="-1" strike="noStrike">
-              <a:latin typeface="Arial"/>
-            </a:endParaRPr>
-          </a:p>
-          <a:p>
-            <a:r>
-              <a:rPr b="0" lang="en-US" sz="1800" spc="-1" strike="noStrike">
-                <a:solidFill>
-                  <a:srgbClr val="000000"/>
-                </a:solidFill>
-                <a:latin typeface="Arial"/>
-                <a:ea typeface="DejaVu Sans"/>
-              </a:rPr>
-              <a:t>    </a:t>
-            </a:r>
-            <a:r>
-              <a:rPr b="1" lang="en-US" sz="1800" spc="-1" strike="noStrike">
-                <a:solidFill>
-                  <a:srgbClr val="182f7c"/>
-                </a:solidFill>
-                <a:latin typeface="Arial"/>
-                <a:ea typeface="DejaVu Sans"/>
-              </a:rPr>
-              <a:t>fun</a:t>
-            </a:r>
-            <a:r>
-              <a:rPr b="0" lang="en-US" sz="1800" spc="-1" strike="noStrike">
-                <a:solidFill>
-                  <a:srgbClr val="000000"/>
-                </a:solidFill>
-                <a:latin typeface="Arial"/>
-                <a:ea typeface="DejaVu Sans"/>
-              </a:rPr>
-              <a:t> deleteUser(request: Request): Int {</a:t>
-            </a:r>
-            <a:endParaRPr b="0" lang="en-US" sz="1800" spc="-1" strike="noStrike">
-              <a:latin typeface="Arial"/>
-            </a:endParaRPr>
-          </a:p>
-          <a:p>
-            <a:pPr>
-              <a:lnSpc>
-                <a:spcPct val="100000"/>
-              </a:lnSpc>
-            </a:pPr>
-            <a:r>
-              <a:rPr b="0" lang="en-US" sz="1800" spc="-1" strike="noStrike">
-                <a:solidFill>
-                  <a:srgbClr val="000000"/>
-                </a:solidFill>
-                <a:latin typeface="Arial"/>
-                <a:ea typeface="DejaVu Sans"/>
-              </a:rPr>
-              <a:t>	</a:t>
-            </a:r>
-            <a:r>
-              <a:rPr b="1" lang="en-US" sz="1800" spc="-1" strike="noStrike">
-                <a:solidFill>
-                  <a:srgbClr val="000000"/>
-                </a:solidFill>
-                <a:latin typeface="Arial"/>
-                <a:ea typeface="DejaVu Sans"/>
-              </a:rPr>
-              <a:t>checkAcess</a:t>
-            </a:r>
-            <a:r>
-              <a:rPr b="0" lang="en-US" sz="1800" spc="-1" strike="noStrike">
-                <a:solidFill>
-                  <a:srgbClr val="000000"/>
-                </a:solidFill>
-                <a:latin typeface="Arial"/>
-                <a:ea typeface="DejaVu Sans"/>
-              </a:rPr>
-              <a:t>(request)</a:t>
             </a:r>
             <a:endParaRPr b="0" lang="en-US" sz="1800" spc="-1" strike="noStrike">
               <a:latin typeface="Arial"/>
@@ -8277,14 +9057,14 @@
       </p:grpSpPr>
       <p:sp>
         <p:nvSpPr>
-          <p:cNvPr id="103" name="CustomShape 1"/>
+          <p:cNvPr id="104" name="CustomShape 1"/>
           <p:cNvSpPr/>
           <p:nvPr/>
         </p:nvSpPr>
         <p:spPr>
           <a:xfrm>
             <a:off x="366840" y="276840"/>
-            <a:ext cx="6856920" cy="546120"/>
+            <a:ext cx="6856560" cy="545760"/>
           </a:xfrm>
           <a:prstGeom prst="rect">
             <a:avLst/>
@@ -8328,14 +9108,14 @@
       </p:sp>
       <p:sp>
         <p:nvSpPr>
-          <p:cNvPr id="104" name="CustomShape 2"/>
+          <p:cNvPr id="105" name="CustomShape 2"/>
           <p:cNvSpPr/>
           <p:nvPr/>
         </p:nvSpPr>
         <p:spPr>
           <a:xfrm>
             <a:off x="549720" y="1005840"/>
-            <a:ext cx="6856920" cy="5303520"/>
+            <a:ext cx="6856560" cy="5303160"/>
           </a:xfrm>
           <a:prstGeom prst="rect">
             <a:avLst/>
@@ -8682,16 +9462,6 @@
               <a:t>	</a:t>
             </a:r>
             <a:r>
-              <a:rPr b="0" lang="en-US" sz="1800" spc="-1" strike="noStrike">
-                <a:solidFill>
-                  <a:srgbClr val="000000"/>
-                </a:solidFill>
-                <a:latin typeface="Arial"/>
-                <a:ea typeface="DejaVu Sans"/>
-              </a:rPr>
-              <a:t>if (</a:t>
-            </a:r>
-            <a:r>
               <a:rPr b="1" lang="en-US" sz="1800" spc="-1" strike="noStrike">
                 <a:solidFill>
                   <a:srgbClr val="000000"/>
@@ -8709,7 +9479,7 @@
                 <a:latin typeface="Arial"/>
                 <a:ea typeface="DejaVu Sans"/>
               </a:rPr>
-              <a:t>(request) == -1) return -1</a:t>
+              <a:t>(request)</a:t>
             </a:r>
             <a:endParaRPr b="0" lang="en-US" sz="1800" spc="-1" strike="noStrike">
               <a:latin typeface="Arial"/>
@@ -8786,6 +9556,11 @@
             </a:endParaRPr>
           </a:p>
           <a:p>
+            <a:pPr>
+              <a:lnSpc>
+                <a:spcPct val="100000"/>
+              </a:lnSpc>
+            </a:pPr>
             <a:r>
               <a:rPr b="0" lang="en-US" sz="1800" spc="-1" strike="noStrike">
                 <a:solidFill>
@@ -8837,16 +9612,6 @@
               <a:t>	</a:t>
             </a:r>
             <a:r>
-              <a:rPr b="0" lang="en-US" sz="1800" spc="-1" strike="noStrike">
-                <a:solidFill>
-                  <a:srgbClr val="000000"/>
-                </a:solidFill>
-                <a:latin typeface="Arial"/>
-                <a:ea typeface="DejaVu Sans"/>
-              </a:rPr>
-              <a:t>if (</a:t>
-            </a:r>
-            <a:r>
               <a:rPr b="1" lang="en-US" sz="1800" spc="-1" strike="noStrike">
                 <a:solidFill>
                   <a:srgbClr val="000000"/>
@@ -8864,7 +9629,7 @@
                 <a:latin typeface="Arial"/>
                 <a:ea typeface="DejaVu Sans"/>
               </a:rPr>
-              <a:t>(request) == -1) return -1</a:t>
+              <a:t>(request)</a:t>
             </a:r>
             <a:endParaRPr b="0" lang="en-US" sz="1800" spc="-1" strike="noStrike">
               <a:latin typeface="Arial"/>
@@ -9003,14 +9768,14 @@
       </p:grpSpPr>
       <p:sp>
         <p:nvSpPr>
-          <p:cNvPr id="105" name="CustomShape 1"/>
+          <p:cNvPr id="106" name="CustomShape 1"/>
           <p:cNvSpPr/>
           <p:nvPr/>
         </p:nvSpPr>
         <p:spPr>
           <a:xfrm>
             <a:off x="366840" y="276840"/>
-            <a:ext cx="6856920" cy="546120"/>
+            <a:ext cx="6856560" cy="545760"/>
           </a:xfrm>
           <a:prstGeom prst="rect">
             <a:avLst/>
@@ -9054,14 +9819,14 @@
       </p:sp>
       <p:sp>
         <p:nvSpPr>
-          <p:cNvPr id="106" name="CustomShape 2"/>
+          <p:cNvPr id="107" name="CustomShape 2"/>
           <p:cNvSpPr/>
           <p:nvPr/>
         </p:nvSpPr>
         <p:spPr>
           <a:xfrm>
             <a:off x="549720" y="1005840"/>
-            <a:ext cx="6856920" cy="5303520"/>
+            <a:ext cx="6856560" cy="5303160"/>
           </a:xfrm>
           <a:prstGeom prst="rect">
             <a:avLst/>
@@ -9112,8 +9877,16 @@
             </a:endParaRPr>
           </a:p>
           <a:p>
-            <a:r>
-              <a:rPr b="0" lang="en-US" sz="1800" spc="-1" strike="noStrike">
+            <a:pPr>
+              <a:lnSpc>
+                <a:spcPct val="100000"/>
+              </a:lnSpc>
+            </a:pPr>
+            <a:r>
+              <a:rPr b="0" lang="en-US" sz="1800" spc="-1" strike="noStrike">
+                <a:solidFill>
+                  <a:srgbClr val="000000"/>
+                </a:solidFill>
                 <a:latin typeface="Arial"/>
                 <a:ea typeface="DejaVu Sans"/>
               </a:rPr>
@@ -9121,6 +9894,9 @@
             </a:r>
             <a:r>
               <a:rPr b="0" lang="en-US" sz="1800" spc="-1" strike="noStrike">
+                <a:solidFill>
+                  <a:srgbClr val="000000"/>
+                </a:solidFill>
                 <a:latin typeface="Arial"/>
                 <a:ea typeface="DejaVu Sans"/>
               </a:rPr>
@@ -9129,19 +9905,232 @@
             <a:r>
               <a:rPr b="1" lang="en-US" sz="1800" spc="-1" strike="noStrike">
                 <a:solidFill>
-                  <a:srgbClr val="ed1c24"/>
-                </a:solidFill>
-                <a:latin typeface="Arial"/>
-                <a:ea typeface="DejaVu Sans"/>
-              </a:rPr>
-              <a:t>inline</a:t>
-            </a:r>
-            <a:r>
-              <a:rPr b="0" lang="en-US" sz="1800" spc="-1" strike="noStrike">
-                <a:latin typeface="Arial"/>
-                <a:ea typeface="DejaVu Sans"/>
-              </a:rPr>
-              <a:t> </a:t>
+                  <a:srgbClr val="182f7c"/>
+                </a:solidFill>
+                <a:latin typeface="Arial"/>
+                <a:ea typeface="DejaVu Sans"/>
+              </a:rPr>
+              <a:t>fun</a:t>
+            </a:r>
+            <a:r>
+              <a:rPr b="0" lang="en-US" sz="1800" spc="-1" strike="noStrike">
+                <a:solidFill>
+                  <a:srgbClr val="000000"/>
+                </a:solidFill>
+                <a:latin typeface="Arial"/>
+                <a:ea typeface="DejaVu Sans"/>
+              </a:rPr>
+              <a:t> checkAcess(request: Request): Int {</a:t>
+            </a:r>
+            <a:endParaRPr b="0" lang="en-US" sz="1800" spc="-1" strike="noStrike">
+              <a:latin typeface="Arial"/>
+            </a:endParaRPr>
+          </a:p>
+          <a:p>
+            <a:pPr>
+              <a:lnSpc>
+                <a:spcPct val="100000"/>
+              </a:lnSpc>
+            </a:pPr>
+            <a:r>
+              <a:rPr b="1" i="1" lang="en-US" sz="1800" spc="-1" strike="noStrike">
+                <a:solidFill>
+                  <a:srgbClr val="000000"/>
+                </a:solidFill>
+                <a:latin typeface="Arial"/>
+                <a:ea typeface="DejaVu Sans"/>
+              </a:rPr>
+              <a:t>        </a:t>
+            </a:r>
+            <a:r>
+              <a:rPr b="1" i="1" lang="en-US" sz="1800" spc="-1" strike="noStrike">
+                <a:solidFill>
+                  <a:srgbClr val="000000"/>
+                </a:solidFill>
+                <a:latin typeface="Arial"/>
+                <a:ea typeface="DejaVu Sans"/>
+              </a:rPr>
+              <a:t>if (!request.hasAccess()) {</a:t>
+            </a:r>
+            <a:endParaRPr b="0" lang="en-US" sz="1800" spc="-1" strike="noStrike">
+              <a:latin typeface="Arial"/>
+            </a:endParaRPr>
+          </a:p>
+          <a:p>
+            <a:pPr>
+              <a:lnSpc>
+                <a:spcPct val="100000"/>
+              </a:lnSpc>
+            </a:pPr>
+            <a:r>
+              <a:rPr b="1" i="1" lang="en-US" sz="1800" spc="-1" strike="noStrike">
+                <a:solidFill>
+                  <a:srgbClr val="000000"/>
+                </a:solidFill>
+                <a:latin typeface="Arial"/>
+                <a:ea typeface="DejaVu Sans"/>
+              </a:rPr>
+              <a:t>            </a:t>
+            </a:r>
+            <a:r>
+              <a:rPr b="1" i="1" lang="en-US" sz="1800" spc="-1" strike="noStrike">
+                <a:solidFill>
+                  <a:srgbClr val="000000"/>
+                </a:solidFill>
+                <a:latin typeface="Arial"/>
+                <a:ea typeface="DejaVu Sans"/>
+              </a:rPr>
+              <a:t>println("No access")</a:t>
+            </a:r>
+            <a:endParaRPr b="0" lang="en-US" sz="1800" spc="-1" strike="noStrike">
+              <a:latin typeface="Arial"/>
+            </a:endParaRPr>
+          </a:p>
+          <a:p>
+            <a:pPr>
+              <a:lnSpc>
+                <a:spcPct val="100000"/>
+              </a:lnSpc>
+            </a:pPr>
+            <a:r>
+              <a:rPr b="1" i="1" lang="en-US" sz="1800" spc="-1" strike="noStrike">
+                <a:solidFill>
+                  <a:srgbClr val="000000"/>
+                </a:solidFill>
+                <a:latin typeface="Arial"/>
+                <a:ea typeface="DejaVu Sans"/>
+              </a:rPr>
+              <a:t>            </a:t>
+            </a:r>
+            <a:r>
+              <a:rPr b="1" i="1" lang="en-US" sz="1800" spc="-1" strike="noStrike">
+                <a:solidFill>
+                  <a:srgbClr val="000000"/>
+                </a:solidFill>
+                <a:latin typeface="Arial"/>
+                <a:ea typeface="DejaVu Sans"/>
+              </a:rPr>
+              <a:t>return -1</a:t>
+            </a:r>
+            <a:endParaRPr b="0" lang="en-US" sz="1800" spc="-1" strike="noStrike">
+              <a:latin typeface="Arial"/>
+            </a:endParaRPr>
+          </a:p>
+          <a:p>
+            <a:pPr>
+              <a:lnSpc>
+                <a:spcPct val="100000"/>
+              </a:lnSpc>
+            </a:pPr>
+            <a:r>
+              <a:rPr b="1" i="1" lang="en-US" sz="1800" spc="-1" strike="noStrike">
+                <a:solidFill>
+                  <a:srgbClr val="000000"/>
+                </a:solidFill>
+                <a:latin typeface="Arial"/>
+                <a:ea typeface="DejaVu Sans"/>
+              </a:rPr>
+              <a:t>        </a:t>
+            </a:r>
+            <a:r>
+              <a:rPr b="1" i="1" lang="en-US" sz="1800" spc="-1" strike="noStrike">
+                <a:solidFill>
+                  <a:srgbClr val="000000"/>
+                </a:solidFill>
+                <a:latin typeface="Arial"/>
+                <a:ea typeface="DejaVu Sans"/>
+              </a:rPr>
+              <a:t>}</a:t>
+            </a:r>
+            <a:endParaRPr b="0" lang="en-US" sz="1800" spc="-1" strike="noStrike">
+              <a:latin typeface="Arial"/>
+            </a:endParaRPr>
+          </a:p>
+          <a:p>
+            <a:pPr>
+              <a:lnSpc>
+                <a:spcPct val="100000"/>
+              </a:lnSpc>
+            </a:pPr>
+            <a:r>
+              <a:rPr b="1" i="1" lang="en-US" sz="1800" spc="-1" strike="noStrike">
+                <a:solidFill>
+                  <a:srgbClr val="000000"/>
+                </a:solidFill>
+                <a:latin typeface="Arial"/>
+                <a:ea typeface="DejaVu Sans"/>
+              </a:rPr>
+              <a:t>	</a:t>
+            </a:r>
+            <a:r>
+              <a:rPr b="1" i="1" lang="en-US" sz="1800" spc="-1" strike="noStrike">
+                <a:solidFill>
+                  <a:srgbClr val="000000"/>
+                </a:solidFill>
+                <a:latin typeface="Arial"/>
+                <a:ea typeface="DejaVu Sans"/>
+              </a:rPr>
+              <a:t>return 0</a:t>
+            </a:r>
+            <a:endParaRPr b="0" lang="en-US" sz="1800" spc="-1" strike="noStrike">
+              <a:latin typeface="Arial"/>
+            </a:endParaRPr>
+          </a:p>
+          <a:p>
+            <a:pPr>
+              <a:lnSpc>
+                <a:spcPct val="100000"/>
+              </a:lnSpc>
+            </a:pPr>
+            <a:r>
+              <a:rPr b="0" lang="en-US" sz="1800" spc="-1" strike="noStrike">
+                <a:solidFill>
+                  <a:srgbClr val="000000"/>
+                </a:solidFill>
+                <a:latin typeface="Arial"/>
+                <a:ea typeface="DejaVu Sans"/>
+              </a:rPr>
+              <a:t>    </a:t>
+            </a:r>
+            <a:r>
+              <a:rPr b="0" lang="en-US" sz="1800" spc="-1" strike="noStrike">
+                <a:solidFill>
+                  <a:srgbClr val="000000"/>
+                </a:solidFill>
+                <a:latin typeface="Arial"/>
+                <a:ea typeface="DejaVu Sans"/>
+              </a:rPr>
+              <a:t>}</a:t>
+            </a:r>
+            <a:endParaRPr b="0" lang="en-US" sz="1800" spc="-1" strike="noStrike">
+              <a:latin typeface="Arial"/>
+            </a:endParaRPr>
+          </a:p>
+          <a:p>
+            <a:pPr>
+              <a:lnSpc>
+                <a:spcPct val="100000"/>
+              </a:lnSpc>
+            </a:pPr>
+            <a:endParaRPr b="0" lang="en-US" sz="1800" spc="-1" strike="noStrike">
+              <a:latin typeface="Arial"/>
+            </a:endParaRPr>
+          </a:p>
+          <a:p>
+            <a:pPr>
+              <a:lnSpc>
+                <a:spcPct val="100000"/>
+              </a:lnSpc>
+            </a:pPr>
+            <a:r>
+              <a:rPr b="0" lang="en-US" sz="1800" spc="-1" strike="noStrike">
+                <a:solidFill>
+                  <a:srgbClr val="000000"/>
+                </a:solidFill>
+                <a:latin typeface="Arial"/>
+                <a:ea typeface="DejaVu Sans"/>
+              </a:rPr>
+              <a:t>    </a:t>
             </a:r>
             <a:r>
               <a:rPr b="1" lang="en-US" sz="1800" spc="-1" strike="noStrike">
@@ -9155,23 +10144,79 @@
             </a:r>
             <a:r>
               <a:rPr b="0" lang="en-US" sz="1800" spc="-1" strike="noStrike">
-                <a:latin typeface="Arial"/>
-                <a:ea typeface="DejaVu Sans"/>
-              </a:rPr>
-              <a:t> withAccess(request: Request, action: () -&gt; Int): Int {</a:t>
-            </a:r>
-            <a:endParaRPr b="0" lang="en-US" sz="1800" spc="-1" strike="noStrike">
-              <a:latin typeface="Arial"/>
-            </a:endParaRPr>
-          </a:p>
-          <a:p>
-            <a:pPr>
-              <a:lnSpc>
-                <a:spcPct val="100000"/>
-              </a:lnSpc>
-            </a:pPr>
-            <a:r>
-              <a:rPr b="0" lang="en-US" sz="1800" spc="-1" strike="noStrike">
+                <a:solidFill>
+                  <a:srgbClr val="000000"/>
+                </a:solidFill>
+                <a:latin typeface="Arial"/>
+                <a:ea typeface="DejaVu Sans"/>
+              </a:rPr>
+              <a:t> blockUser(request: Request): Int {</a:t>
+            </a:r>
+            <a:endParaRPr b="0" lang="en-US" sz="1800" spc="-1" strike="noStrike">
+              <a:latin typeface="Arial"/>
+            </a:endParaRPr>
+          </a:p>
+          <a:p>
+            <a:pPr>
+              <a:lnSpc>
+                <a:spcPct val="100000"/>
+              </a:lnSpc>
+            </a:pPr>
+            <a:r>
+              <a:rPr b="0" lang="en-US" sz="1800" spc="-1" strike="noStrike">
+                <a:solidFill>
+                  <a:srgbClr val="000000"/>
+                </a:solidFill>
+                <a:latin typeface="Arial"/>
+                <a:ea typeface="DejaVu Sans"/>
+              </a:rPr>
+              <a:t>	</a:t>
+            </a:r>
+            <a:r>
+              <a:rPr b="0" lang="en-US" sz="1800" spc="-1" strike="noStrike">
+                <a:solidFill>
+                  <a:srgbClr val="000000"/>
+                </a:solidFill>
+                <a:latin typeface="Arial"/>
+                <a:ea typeface="DejaVu Sans"/>
+              </a:rPr>
+              <a:t>if (</a:t>
+            </a:r>
+            <a:r>
+              <a:rPr b="1" lang="en-US" sz="1800" spc="-1" strike="noStrike">
+                <a:solidFill>
+                  <a:srgbClr val="000000"/>
+                </a:solidFill>
+                <a:latin typeface="Arial"/>
+                <a:ea typeface="DejaVu Sans"/>
+              </a:rPr>
+              <a:t>checkAcess</a:t>
+            </a:r>
+            <a:r>
+              <a:rPr b="0" lang="en-US" sz="1800" spc="-1" strike="noStrike">
+                <a:solidFill>
+                  <a:srgbClr val="000000"/>
+                </a:solidFill>
+                <a:latin typeface="Arial"/>
+                <a:ea typeface="DejaVu Sans"/>
+              </a:rPr>
+              <a:t>(request) == -1) return -1</a:t>
+            </a:r>
+            <a:endParaRPr b="0" lang="en-US" sz="1800" spc="-1" strike="noStrike">
+              <a:latin typeface="Arial"/>
+            </a:endParaRPr>
+          </a:p>
+          <a:p>
+            <a:pPr>
+              <a:lnSpc>
+                <a:spcPct val="100000"/>
+              </a:lnSpc>
+            </a:pPr>
+            <a:r>
+              <a:rPr b="0" lang="en-US" sz="1800" spc="-1" strike="noStrike">
+                <a:solidFill>
+                  <a:srgbClr val="000000"/>
+                </a:solidFill>
                 <a:latin typeface="Arial"/>
                 <a:ea typeface="DejaVu Sans"/>
               </a:rPr>
@@ -9179,71 +10224,159 @@
             </a:r>
             <a:r>
               <a:rPr b="0" lang="en-US" sz="1800" spc="-1" strike="noStrike">
-                <a:latin typeface="Arial"/>
-                <a:ea typeface="DejaVu Sans"/>
-              </a:rPr>
-              <a:t>if (!request.hasAccess()) {</a:t>
-            </a:r>
-            <a:endParaRPr b="0" lang="en-US" sz="1800" spc="-1" strike="noStrike">
-              <a:latin typeface="Arial"/>
-            </a:endParaRPr>
-          </a:p>
-          <a:p>
-            <a:pPr>
-              <a:lnSpc>
-                <a:spcPct val="100000"/>
-              </a:lnSpc>
-            </a:pPr>
-            <a:r>
-              <a:rPr b="0" lang="en-US" sz="1800" spc="-1" strike="noStrike">
-                <a:latin typeface="Arial"/>
-                <a:ea typeface="DejaVu Sans"/>
-              </a:rPr>
-              <a:t>            </a:t>
-            </a:r>
-            <a:r>
-              <a:rPr b="0" lang="en-US" sz="1800" spc="-1" strike="noStrike">
-                <a:latin typeface="Arial"/>
-                <a:ea typeface="DejaVu Sans"/>
-              </a:rPr>
-              <a:t>println("No access")</a:t>
-            </a:r>
-            <a:endParaRPr b="0" lang="en-US" sz="1800" spc="-1" strike="noStrike">
-              <a:latin typeface="Arial"/>
-            </a:endParaRPr>
-          </a:p>
-          <a:p>
-            <a:pPr>
-              <a:lnSpc>
-                <a:spcPct val="100000"/>
-              </a:lnSpc>
-            </a:pPr>
-            <a:r>
-              <a:rPr b="0" lang="en-US" sz="1800" spc="-1" strike="noStrike">
-                <a:latin typeface="Arial"/>
-                <a:ea typeface="DejaVu Sans"/>
-              </a:rPr>
-              <a:t>            </a:t>
+                <a:solidFill>
+                  <a:srgbClr val="000000"/>
+                </a:solidFill>
+                <a:latin typeface="Arial"/>
+                <a:ea typeface="DejaVu Sans"/>
+              </a:rPr>
+              <a:t>...</a:t>
+            </a:r>
+            <a:endParaRPr b="0" lang="en-US" sz="1800" spc="-1" strike="noStrike">
+              <a:latin typeface="Arial"/>
+            </a:endParaRPr>
+          </a:p>
+          <a:p>
+            <a:pPr>
+              <a:lnSpc>
+                <a:spcPct val="100000"/>
+              </a:lnSpc>
+            </a:pPr>
+            <a:r>
+              <a:rPr b="0" lang="en-US" sz="1800" spc="-1" strike="noStrike">
+                <a:solidFill>
+                  <a:srgbClr val="000000"/>
+                </a:solidFill>
+                <a:latin typeface="Arial"/>
+                <a:ea typeface="DejaVu Sans"/>
+              </a:rPr>
+              <a:t>    </a:t>
+            </a:r>
+            <a:r>
+              <a:rPr b="0" lang="en-US" sz="1800" spc="-1" strike="noStrike">
+                <a:solidFill>
+                  <a:srgbClr val="000000"/>
+                </a:solidFill>
+                <a:latin typeface="Arial"/>
+                <a:ea typeface="DejaVu Sans"/>
+              </a:rPr>
+              <a:t>}</a:t>
+            </a:r>
+            <a:endParaRPr b="0" lang="en-US" sz="1800" spc="-1" strike="noStrike">
+              <a:latin typeface="Arial"/>
+            </a:endParaRPr>
+          </a:p>
+          <a:p>
+            <a:pPr>
+              <a:lnSpc>
+                <a:spcPct val="100000"/>
+              </a:lnSpc>
+            </a:pPr>
+            <a:endParaRPr b="0" lang="en-US" sz="1800" spc="-1" strike="noStrike">
+              <a:latin typeface="Arial"/>
+            </a:endParaRPr>
+          </a:p>
+          <a:p>
+            <a:pPr>
+              <a:lnSpc>
+                <a:spcPct val="100000"/>
+              </a:lnSpc>
+            </a:pPr>
+            <a:r>
+              <a:rPr b="0" lang="en-US" sz="1800" spc="-1" strike="noStrike">
+                <a:solidFill>
+                  <a:srgbClr val="000000"/>
+                </a:solidFill>
+                <a:latin typeface="Arial"/>
+                <a:ea typeface="DejaVu Sans"/>
+              </a:rPr>
+              <a:t>    </a:t>
             </a:r>
             <a:r>
               <a:rPr b="1" lang="en-US" sz="1800" spc="-1" strike="noStrike">
-                <a:latin typeface="Arial"/>
-                <a:ea typeface="DejaVu Sans"/>
-              </a:rPr>
-              <a:t>return -1</a:t>
-            </a:r>
-            <a:endParaRPr b="0" lang="en-US" sz="1800" spc="-1" strike="noStrike">
-              <a:latin typeface="Arial"/>
-            </a:endParaRPr>
-          </a:p>
-          <a:p>
-            <a:pPr>
-              <a:lnSpc>
-                <a:spcPct val="100000"/>
-              </a:lnSpc>
-            </a:pPr>
-            <a:r>
-              <a:rPr b="0" lang="en-US" sz="1800" spc="-1" strike="noStrike">
+                <a:solidFill>
+                  <a:srgbClr val="182f7c"/>
+                </a:solidFill>
+                <a:latin typeface="Arial"/>
+                <a:ea typeface="DejaVu Sans"/>
+              </a:rPr>
+              <a:t>fun</a:t>
+            </a:r>
+            <a:r>
+              <a:rPr b="0" lang="en-US" sz="1800" spc="-1" strike="noStrike">
+                <a:solidFill>
+                  <a:srgbClr val="000000"/>
+                </a:solidFill>
+                <a:latin typeface="Arial"/>
+                <a:ea typeface="DejaVu Sans"/>
+              </a:rPr>
+              <a:t> deleteUser(request: Request): Int {</a:t>
+            </a:r>
+            <a:endParaRPr b="0" lang="en-US" sz="1800" spc="-1" strike="noStrike">
+              <a:latin typeface="Arial"/>
+            </a:endParaRPr>
+          </a:p>
+          <a:p>
+            <a:pPr>
+              <a:lnSpc>
+                <a:spcPct val="100000"/>
+              </a:lnSpc>
+            </a:pPr>
+            <a:r>
+              <a:rPr b="0" lang="en-US" sz="1800" spc="-1" strike="noStrike">
+                <a:solidFill>
+                  <a:srgbClr val="000000"/>
+                </a:solidFill>
+                <a:latin typeface="Arial"/>
+                <a:ea typeface="DejaVu Sans"/>
+              </a:rPr>
+              <a:t>	</a:t>
+            </a:r>
+            <a:r>
+              <a:rPr b="0" lang="en-US" sz="1800" spc="-1" strike="noStrike">
+                <a:solidFill>
+                  <a:srgbClr val="000000"/>
+                </a:solidFill>
+                <a:latin typeface="Arial"/>
+                <a:ea typeface="DejaVu Sans"/>
+              </a:rPr>
+              <a:t>if (</a:t>
+            </a:r>
+            <a:r>
+              <a:rPr b="1" lang="en-US" sz="1800" spc="-1" strike="noStrike">
+                <a:solidFill>
+                  <a:srgbClr val="000000"/>
+                </a:solidFill>
+                <a:latin typeface="Arial"/>
+                <a:ea typeface="DejaVu Sans"/>
+              </a:rPr>
+              <a:t>checkAcess</a:t>
+            </a:r>
+            <a:r>
+              <a:rPr b="0" lang="en-US" sz="1800" spc="-1" strike="noStrike">
+                <a:solidFill>
+                  <a:srgbClr val="000000"/>
+                </a:solidFill>
+                <a:latin typeface="Arial"/>
+                <a:ea typeface="DejaVu Sans"/>
+              </a:rPr>
+              <a:t>(request) == -1) return -1</a:t>
+            </a:r>
+            <a:endParaRPr b="0" lang="en-US" sz="1800" spc="-1" strike="noStrike">
+              <a:latin typeface="Arial"/>
+            </a:endParaRPr>
+          </a:p>
+          <a:p>
+            <a:pPr>
+              <a:lnSpc>
+                <a:spcPct val="100000"/>
+              </a:lnSpc>
+            </a:pPr>
+            <a:r>
+              <a:rPr b="0" lang="en-US" sz="1800" spc="-1" strike="noStrike">
+                <a:solidFill>
+                  <a:srgbClr val="000000"/>
+                </a:solidFill>
                 <a:latin typeface="Arial"/>
                 <a:ea typeface="DejaVu Sans"/>
               </a:rPr>
@@ -9251,158 +10384,6 @@
             </a:r>
             <a:r>
               <a:rPr b="0" lang="en-US" sz="1800" spc="-1" strike="noStrike">
-                <a:latin typeface="Arial"/>
-                <a:ea typeface="DejaVu Sans"/>
-              </a:rPr>
-              <a:t>}</a:t>
-            </a:r>
-            <a:endParaRPr b="0" lang="en-US" sz="1800" spc="-1" strike="noStrike">
-              <a:latin typeface="Arial"/>
-            </a:endParaRPr>
-          </a:p>
-          <a:p>
-            <a:pPr>
-              <a:lnSpc>
-                <a:spcPct val="100000"/>
-              </a:lnSpc>
-            </a:pPr>
-            <a:r>
-              <a:rPr b="0" lang="en-US" sz="1800" spc="-1" strike="noStrike">
-                <a:latin typeface="Arial"/>
-                <a:ea typeface="DejaVu Sans"/>
-              </a:rPr>
-              <a:t>        </a:t>
-            </a:r>
-            <a:r>
-              <a:rPr b="1" lang="en-US" sz="1800" spc="-1" strike="noStrike">
-                <a:latin typeface="Arial"/>
-                <a:ea typeface="DejaVu Sans"/>
-              </a:rPr>
-              <a:t>return</a:t>
-            </a:r>
-            <a:r>
-              <a:rPr b="0" lang="en-US" sz="1800" spc="-1" strike="noStrike">
-                <a:latin typeface="Arial"/>
-                <a:ea typeface="DejaVu Sans"/>
-              </a:rPr>
-              <a:t> action()</a:t>
-            </a:r>
-            <a:endParaRPr b="0" lang="en-US" sz="1800" spc="-1" strike="noStrike">
-              <a:latin typeface="Arial"/>
-            </a:endParaRPr>
-          </a:p>
-          <a:p>
-            <a:pPr>
-              <a:lnSpc>
-                <a:spcPct val="100000"/>
-              </a:lnSpc>
-            </a:pPr>
-            <a:r>
-              <a:rPr b="0" lang="en-US" sz="1800" spc="-1" strike="noStrike">
-                <a:latin typeface="Arial"/>
-                <a:ea typeface="DejaVu Sans"/>
-              </a:rPr>
-              <a:t>    </a:t>
-            </a:r>
-            <a:r>
-              <a:rPr b="0" lang="en-US" sz="1800" spc="-1" strike="noStrike">
-                <a:latin typeface="Arial"/>
-                <a:ea typeface="DejaVu Sans"/>
-              </a:rPr>
-              <a:t>}</a:t>
-            </a:r>
-            <a:endParaRPr b="0" lang="en-US" sz="1800" spc="-1" strike="noStrike">
-              <a:latin typeface="Arial"/>
-            </a:endParaRPr>
-          </a:p>
-          <a:p>
-            <a:pPr>
-              <a:lnSpc>
-                <a:spcPct val="100000"/>
-              </a:lnSpc>
-            </a:pPr>
-            <a:endParaRPr b="0" lang="en-US" sz="1800" spc="-1" strike="noStrike">
-              <a:latin typeface="Arial"/>
-            </a:endParaRPr>
-          </a:p>
-          <a:p>
-            <a:pPr>
-              <a:lnSpc>
-                <a:spcPct val="100000"/>
-              </a:lnSpc>
-            </a:pPr>
-            <a:r>
-              <a:rPr b="0" lang="en-US" sz="1800" spc="-1" strike="noStrike">
-                <a:solidFill>
-                  <a:srgbClr val="000000"/>
-                </a:solidFill>
-                <a:latin typeface="Arial"/>
-                <a:ea typeface="DejaVu Sans"/>
-              </a:rPr>
-              <a:t>    </a:t>
-            </a:r>
-            <a:r>
-              <a:rPr b="1" lang="en-US" sz="1800" spc="-1" strike="noStrike">
-                <a:solidFill>
-                  <a:srgbClr val="182f7c"/>
-                </a:solidFill>
-                <a:latin typeface="Arial"/>
-                <a:ea typeface="DejaVu Sans"/>
-              </a:rPr>
-              <a:t>fun</a:t>
-            </a:r>
-            <a:r>
-              <a:rPr b="0" lang="en-US" sz="1800" spc="-1" strike="noStrike">
-                <a:solidFill>
-                  <a:srgbClr val="000000"/>
-                </a:solidFill>
-                <a:latin typeface="Arial"/>
-                <a:ea typeface="DejaVu Sans"/>
-              </a:rPr>
-              <a:t> blockUser(request: Request) = </a:t>
-            </a:r>
-            <a:r>
-              <a:rPr b="1" lang="en-US" sz="1800" spc="-1" strike="noStrike">
-                <a:solidFill>
-                  <a:srgbClr val="000000"/>
-                </a:solidFill>
-                <a:latin typeface="Arial"/>
-                <a:ea typeface="DejaVu Sans"/>
-              </a:rPr>
-              <a:t>withAccess</a:t>
-            </a:r>
-            <a:r>
-              <a:rPr b="0" lang="en-US" sz="1800" spc="-1" strike="noStrike">
-                <a:solidFill>
-                  <a:srgbClr val="000000"/>
-                </a:solidFill>
-                <a:latin typeface="Arial"/>
-                <a:ea typeface="DejaVu Sans"/>
-              </a:rPr>
-              <a:t>(request) {</a:t>
-            </a:r>
-            <a:endParaRPr b="0" lang="en-US" sz="1800" spc="-1" strike="noStrike">
-              <a:latin typeface="Arial"/>
-            </a:endParaRPr>
-          </a:p>
-          <a:p>
-            <a:pPr>
-              <a:lnSpc>
-                <a:spcPct val="100000"/>
-              </a:lnSpc>
-            </a:pPr>
-            <a:r>
-              <a:rPr b="0" lang="en-US" sz="1800" spc="-1" strike="noStrike">
-                <a:solidFill>
-                  <a:srgbClr val="000000"/>
-                </a:solidFill>
-                <a:latin typeface="Arial"/>
-                <a:ea typeface="DejaVu Sans"/>
-              </a:rPr>
-              <a:t>        </a:t>
-            </a:r>
-            <a:r>
-              <a:rPr b="0" lang="en-US" sz="1800" spc="-1" strike="noStrike">
                 <a:solidFill>
                   <a:srgbClr val="000000"/>
                 </a:solidFill>
@@ -9421,176 +10402,6 @@
                 <a:spcPct val="100000"/>
               </a:lnSpc>
             </a:pPr>
-            <a:r>
-              <a:rPr b="0" lang="en-US" sz="1800" spc="-1" strike="noStrike">
-                <a:solidFill>
-                  <a:srgbClr val="000000"/>
-                </a:solidFill>
-                <a:latin typeface="Arial"/>
-                <a:ea typeface="DejaVu Sans"/>
-              </a:rPr>
-              <a:t>        </a:t>
-            </a:r>
-            <a:r>
-              <a:rPr b="0" lang="en-US" sz="1800" spc="-1" strike="noStrike">
-                <a:solidFill>
-                  <a:srgbClr val="000000"/>
-                </a:solidFill>
-                <a:latin typeface="Arial"/>
-                <a:ea typeface="DejaVu Sans"/>
-              </a:rPr>
-              <a:t>return 0</a:t>
-            </a:r>
-            <a:endParaRPr b="0" lang="en-US" sz="1800" spc="-1" strike="noStrike">
-              <a:latin typeface="Arial"/>
-            </a:endParaRPr>
-          </a:p>
-          <a:p>
-            <a:pPr>
-              <a:lnSpc>
-                <a:spcPct val="100000"/>
-              </a:lnSpc>
-            </a:pPr>
-            <a:r>
-              <a:rPr b="0" lang="en-US" sz="1800" spc="-1" strike="noStrike">
-                <a:solidFill>
-                  <a:srgbClr val="000000"/>
-                </a:solidFill>
-                <a:latin typeface="Arial"/>
-                <a:ea typeface="DejaVu Sans"/>
-              </a:rPr>
-              <a:t>    </a:t>
-            </a:r>
-            <a:r>
-              <a:rPr b="0" lang="en-US" sz="1800" spc="-1" strike="noStrike">
-                <a:solidFill>
-                  <a:srgbClr val="000000"/>
-                </a:solidFill>
-                <a:latin typeface="Arial"/>
-                <a:ea typeface="DejaVu Sans"/>
-              </a:rPr>
-              <a:t>}</a:t>
-            </a:r>
-            <a:endParaRPr b="0" lang="en-US" sz="1800" spc="-1" strike="noStrike">
-              <a:latin typeface="Arial"/>
-            </a:endParaRPr>
-          </a:p>
-          <a:p>
-            <a:pPr>
-              <a:lnSpc>
-                <a:spcPct val="100000"/>
-              </a:lnSpc>
-            </a:pPr>
-            <a:endParaRPr b="0" lang="en-US" sz="1800" spc="-1" strike="noStrike">
-              <a:latin typeface="Arial"/>
-            </a:endParaRPr>
-          </a:p>
-          <a:p>
-            <a:r>
-              <a:rPr b="0" lang="en-US" sz="1800" spc="-1" strike="noStrike">
-                <a:solidFill>
-                  <a:srgbClr val="000000"/>
-                </a:solidFill>
-                <a:latin typeface="Arial"/>
-                <a:ea typeface="DejaVu Sans"/>
-              </a:rPr>
-              <a:t>    </a:t>
-            </a:r>
-            <a:r>
-              <a:rPr b="1" lang="en-US" sz="1800" spc="-1" strike="noStrike">
-                <a:solidFill>
-                  <a:srgbClr val="182f7c"/>
-                </a:solidFill>
-                <a:latin typeface="Arial"/>
-                <a:ea typeface="DejaVu Sans"/>
-              </a:rPr>
-              <a:t>fun</a:t>
-            </a:r>
-            <a:r>
-              <a:rPr b="0" lang="en-US" sz="1800" spc="-1" strike="noStrike">
-                <a:solidFill>
-                  <a:srgbClr val="000000"/>
-                </a:solidFill>
-                <a:latin typeface="Arial"/>
-                <a:ea typeface="DejaVu Sans"/>
-              </a:rPr>
-              <a:t> deleteUser(request: Request) = </a:t>
-            </a:r>
-            <a:r>
-              <a:rPr b="1" lang="en-US" sz="1800" spc="-1" strike="noStrike">
-                <a:solidFill>
-                  <a:srgbClr val="000000"/>
-                </a:solidFill>
-                <a:latin typeface="Arial"/>
-                <a:ea typeface="DejaVu Sans"/>
-              </a:rPr>
-              <a:t>withAccess</a:t>
-            </a:r>
-            <a:r>
-              <a:rPr b="0" lang="en-US" sz="1800" spc="-1" strike="noStrike">
-                <a:solidFill>
-                  <a:srgbClr val="000000"/>
-                </a:solidFill>
-                <a:latin typeface="Arial"/>
-                <a:ea typeface="DejaVu Sans"/>
-              </a:rPr>
-              <a:t>(request) {</a:t>
-            </a:r>
-            <a:endParaRPr b="0" lang="en-US" sz="1800" spc="-1" strike="noStrike">
-              <a:latin typeface="Arial"/>
-            </a:endParaRPr>
-          </a:p>
-          <a:p>
-            <a:r>
-              <a:rPr b="0" lang="en-US" sz="1800" spc="-1" strike="noStrike">
-                <a:solidFill>
-                  <a:srgbClr val="000000"/>
-                </a:solidFill>
-                <a:latin typeface="Arial"/>
-                <a:ea typeface="DejaVu Sans"/>
-              </a:rPr>
-              <a:t>        </a:t>
-            </a:r>
-            <a:r>
-              <a:rPr b="0" lang="en-US" sz="1800" spc="-1" strike="noStrike">
-                <a:solidFill>
-                  <a:srgbClr val="000000"/>
-                </a:solidFill>
-                <a:latin typeface="Arial"/>
-                <a:ea typeface="DejaVu Sans"/>
-              </a:rPr>
-              <a:t>...</a:t>
-            </a:r>
-            <a:endParaRPr b="0" lang="en-US" sz="1800" spc="-1" strike="noStrike">
-              <a:latin typeface="Arial"/>
-            </a:endParaRPr>
-          </a:p>
-          <a:p>
-            <a:r>
-              <a:rPr b="0" lang="en-US" sz="1800" spc="-1" strike="noStrike">
-                <a:solidFill>
-                  <a:srgbClr val="000000"/>
-                </a:solidFill>
-                <a:latin typeface="Arial"/>
-                <a:ea typeface="DejaVu Sans"/>
-              </a:rPr>
-              <a:t>        </a:t>
-            </a:r>
-            <a:r>
-              <a:rPr b="0" lang="en-US" sz="1800" spc="-1" strike="noStrike">
-                <a:solidFill>
-                  <a:srgbClr val="000000"/>
-                </a:solidFill>
-                <a:latin typeface="Arial"/>
-                <a:ea typeface="DejaVu Sans"/>
-              </a:rPr>
-              <a:t>return 0</a:t>
-            </a:r>
-            <a:endParaRPr b="0" lang="en-US" sz="1800" spc="-1" strike="noStrike">
-              <a:latin typeface="Arial"/>
-            </a:endParaRPr>
-          </a:p>
-          <a:p>
             <a:r>
               <a:rPr b="0" lang="en-US" sz="1800" spc="-1" strike="noStrike">
                 <a:solidFill>

</xml_diff>

<commit_message>
slides - 9 more extensions - noinline
</commit_message>
<xml_diff>
--- a/slides/Kotlin - 9. More about Extensions.pptx
+++ b/slides/Kotlin - 9. More about Extensions.pptx
@@ -26,6 +26,7 @@
     <p:sldId id="270" r:id="rId19"/>
     <p:sldId id="271" r:id="rId20"/>
     <p:sldId id="272" r:id="rId21"/>
+    <p:sldId id="273" r:id="rId22"/>
   </p:sldIdLst>
   <p:sldSz cx="9144000" cy="6858000"/>
   <p:notesSz cx="6858000" cy="9144000"/>
@@ -209,7 +210,7 @@
           <a:bodyPr lIns="0" rIns="0" tIns="0" bIns="0" anchor="b"/>
           <a:p>
             <a:pPr algn="r"/>
-            <a:fld id="{84A3AE8E-E086-4D1B-BA84-B15FE8E9A67B}" type="slidenum">
+            <a:fld id="{1A952BCF-6F88-467E-B17F-F7050F9719CD}" type="slidenum">
               <a:rPr b="0" lang="en-US" sz="1400" spc="-1" strike="noStrike">
                 <a:latin typeface="Times New Roman"/>
               </a:rPr>
@@ -246,7 +247,7 @@
       </p:grpSpPr>
       <p:sp>
         <p:nvSpPr>
-          <p:cNvPr id="118" name="PlaceHolder 1"/>
+          <p:cNvPr id="121" name="PlaceHolder 1"/>
           <p:cNvSpPr>
             <a:spLocks noGrp="1"/>
           </p:cNvSpPr>
@@ -257,7 +258,7 @@
         <p:spPr>
           <a:xfrm>
             <a:off x="685800" y="4343400"/>
-            <a:ext cx="5483880" cy="4112280"/>
+            <a:ext cx="5483520" cy="4111920"/>
           </a:xfrm>
           <a:prstGeom prst="rect">
             <a:avLst/>
@@ -274,14 +275,14 @@
       </p:sp>
       <p:sp>
         <p:nvSpPr>
-          <p:cNvPr id="119" name="CustomShape 2"/>
+          <p:cNvPr id="122" name="CustomShape 2"/>
           <p:cNvSpPr/>
           <p:nvPr/>
         </p:nvSpPr>
         <p:spPr>
           <a:xfrm>
             <a:off x="3884760" y="8685360"/>
-            <a:ext cx="2969280" cy="454680"/>
+            <a:ext cx="2968920" cy="454320"/>
           </a:xfrm>
           <a:prstGeom prst="rect">
             <a:avLst/>
@@ -305,7 +306,7 @@
                 <a:spcPct val="100000"/>
               </a:lnSpc>
             </a:pPr>
-            <a:fld id="{E5398B70-538A-4F61-A223-01E49EEFBCD6}" type="slidenum">
+            <a:fld id="{2BA8CCFA-4CC1-48C6-B715-A5017C829CD1}" type="slidenum">
               <a:rPr b="0" lang="en-US" sz="1200" spc="-1" strike="noStrike">
                 <a:solidFill>
                   <a:srgbClr val="000000"/>
@@ -3022,13 +3023,13 @@
         </p:nvPicPr>
         <p:blipFill>
           <a:blip r:embed="rId2"/>
-          <a:srcRect l="90248" t="0" r="0" b="0"/>
+          <a:srcRect l="90260" t="0" r="0" b="0"/>
           <a:stretch/>
         </p:blipFill>
         <p:spPr>
           <a:xfrm>
             <a:off x="8244360" y="0"/>
-            <a:ext cx="897120" cy="6855480"/>
+            <a:ext cx="896760" cy="6855120"/>
           </a:xfrm>
           <a:prstGeom prst="rect">
             <a:avLst/>
@@ -3050,8 +3051,8 @@
         </p:blipFill>
         <p:spPr>
           <a:xfrm rot="16200000">
-            <a:off x="7976520" y="990720"/>
-            <a:ext cx="1481760" cy="226440"/>
+            <a:off x="7976520" y="991080"/>
+            <a:ext cx="1481400" cy="226080"/>
           </a:xfrm>
           <a:prstGeom prst="rect">
             <a:avLst/>
@@ -3074,7 +3075,7 @@
         <p:spPr>
           <a:xfrm>
             <a:off x="0" y="0"/>
-            <a:ext cx="9141480" cy="6855480"/>
+            <a:ext cx="9141120" cy="6855120"/>
           </a:xfrm>
           <a:prstGeom prst="rect">
             <a:avLst/>
@@ -3097,7 +3098,7 @@
         <p:spPr>
           <a:xfrm>
             <a:off x="709200" y="0"/>
-            <a:ext cx="1865880" cy="1907640"/>
+            <a:ext cx="1865520" cy="1907280"/>
           </a:xfrm>
           <a:prstGeom prst="rect">
             <a:avLst/>
@@ -3373,13 +3374,13 @@
         </p:nvPicPr>
         <p:blipFill>
           <a:blip r:embed="rId2"/>
-          <a:srcRect l="90248" t="0" r="0" b="0"/>
+          <a:srcRect l="90260" t="0" r="0" b="0"/>
           <a:stretch/>
         </p:blipFill>
         <p:spPr>
           <a:xfrm>
             <a:off x="8244360" y="0"/>
-            <a:ext cx="897120" cy="6855480"/>
+            <a:ext cx="896760" cy="6855120"/>
           </a:xfrm>
           <a:prstGeom prst="rect">
             <a:avLst/>
@@ -3401,8 +3402,8 @@
         </p:blipFill>
         <p:spPr>
           <a:xfrm rot="16200000">
-            <a:off x="7976520" y="990720"/>
-            <a:ext cx="1481760" cy="226440"/>
+            <a:off x="7976520" y="991080"/>
+            <a:ext cx="1481400" cy="226080"/>
           </a:xfrm>
           <a:prstGeom prst="rect">
             <a:avLst/>
@@ -3672,7 +3673,7 @@
         <p:spPr>
           <a:xfrm>
             <a:off x="6588360" y="5949360"/>
-            <a:ext cx="1869840" cy="213480"/>
+            <a:ext cx="1869480" cy="213120"/>
           </a:xfrm>
           <a:prstGeom prst="rect">
             <a:avLst/>
@@ -3691,7 +3692,7 @@
         <p:txBody>
           <a:bodyPr lIns="0" rIns="0" tIns="0" bIns="0" anchor="b"/>
           <a:p>
-            <a:pPr marL="343080" indent="-340560" algn="r">
+            <a:pPr marL="343080" indent="-340200" algn="r">
               <a:lnSpc>
                 <a:spcPct val="100000"/>
               </a:lnSpc>
@@ -3727,7 +3728,7 @@
         <p:spPr>
           <a:xfrm>
             <a:off x="709200" y="2709000"/>
-            <a:ext cx="6837480" cy="2373840"/>
+            <a:ext cx="6837120" cy="2373480"/>
           </a:xfrm>
           <a:prstGeom prst="rect">
             <a:avLst/>
@@ -3754,7 +3755,7 @@
                 <a:latin typeface="Arial"/>
                 <a:ea typeface="Adobe Gothic Std B"/>
               </a:rPr>
-              <a:t>More about Extensions and Lambda with receiver</a:t>
+              <a:t>More about Extensions and Lambdas</a:t>
             </a:r>
             <a:endParaRPr b="0" lang="en-US" sz="3600" spc="-1" strike="noStrike">
               <a:latin typeface="Arial"/>
@@ -3813,14 +3814,14 @@
       </p:grpSpPr>
       <p:sp>
         <p:nvSpPr>
-          <p:cNvPr id="108" name="CustomShape 1"/>
+          <p:cNvPr id="109" name="CustomShape 1"/>
           <p:cNvSpPr/>
           <p:nvPr/>
         </p:nvSpPr>
         <p:spPr>
           <a:xfrm>
             <a:off x="366840" y="276840"/>
-            <a:ext cx="6856560" cy="545760"/>
+            <a:ext cx="6856200" cy="545400"/>
           </a:xfrm>
           <a:prstGeom prst="rect">
             <a:avLst/>
@@ -3864,14 +3865,14 @@
       </p:sp>
       <p:sp>
         <p:nvSpPr>
-          <p:cNvPr id="109" name="CustomShape 2"/>
+          <p:cNvPr id="110" name="CustomShape 2"/>
           <p:cNvSpPr/>
           <p:nvPr/>
         </p:nvSpPr>
         <p:spPr>
           <a:xfrm>
             <a:off x="549720" y="1005840"/>
-            <a:ext cx="6856560" cy="5303160"/>
+            <a:ext cx="6856200" cy="5302800"/>
           </a:xfrm>
           <a:prstGeom prst="rect">
             <a:avLst/>
@@ -3950,22 +3951,232 @@
             <a:r>
               <a:rPr b="1" lang="en-US" sz="1800" spc="-1" strike="noStrike">
                 <a:solidFill>
-                  <a:srgbClr val="ed1c24"/>
-                </a:solidFill>
-                <a:latin typeface="Arial"/>
-                <a:ea typeface="DejaVu Sans"/>
-              </a:rPr>
-              <a:t>inline</a:t>
-            </a:r>
-            <a:r>
-              <a:rPr b="0" lang="en-US" sz="1800" spc="-1" strike="noStrike">
-                <a:solidFill>
-                  <a:srgbClr val="000000"/>
-                </a:solidFill>
-                <a:latin typeface="Arial"/>
-                <a:ea typeface="DejaVu Sans"/>
-              </a:rPr>
-              <a:t> </a:t>
+                  <a:srgbClr val="182f7c"/>
+                </a:solidFill>
+                <a:latin typeface="Arial"/>
+                <a:ea typeface="DejaVu Sans"/>
+              </a:rPr>
+              <a:t>fun</a:t>
+            </a:r>
+            <a:r>
+              <a:rPr b="0" lang="en-US" sz="1800" spc="-1" strike="noStrike">
+                <a:solidFill>
+                  <a:srgbClr val="000000"/>
+                </a:solidFill>
+                <a:latin typeface="Arial"/>
+                <a:ea typeface="DejaVu Sans"/>
+              </a:rPr>
+              <a:t> checkAcess(request: Request): Int {</a:t>
+            </a:r>
+            <a:endParaRPr b="0" lang="en-US" sz="1800" spc="-1" strike="noStrike">
+              <a:latin typeface="Arial"/>
+            </a:endParaRPr>
+          </a:p>
+          <a:p>
+            <a:pPr>
+              <a:lnSpc>
+                <a:spcPct val="100000"/>
+              </a:lnSpc>
+            </a:pPr>
+            <a:r>
+              <a:rPr b="1" i="1" lang="en-US" sz="1800" spc="-1" strike="noStrike">
+                <a:solidFill>
+                  <a:srgbClr val="000000"/>
+                </a:solidFill>
+                <a:latin typeface="Arial"/>
+                <a:ea typeface="DejaVu Sans"/>
+              </a:rPr>
+              <a:t>        </a:t>
+            </a:r>
+            <a:r>
+              <a:rPr b="1" i="1" lang="en-US" sz="1800" spc="-1" strike="noStrike">
+                <a:solidFill>
+                  <a:srgbClr val="000000"/>
+                </a:solidFill>
+                <a:latin typeface="Arial"/>
+                <a:ea typeface="DejaVu Sans"/>
+              </a:rPr>
+              <a:t>if (!request.hasAccess()) {</a:t>
+            </a:r>
+            <a:endParaRPr b="0" lang="en-US" sz="1800" spc="-1" strike="noStrike">
+              <a:latin typeface="Arial"/>
+            </a:endParaRPr>
+          </a:p>
+          <a:p>
+            <a:pPr>
+              <a:lnSpc>
+                <a:spcPct val="100000"/>
+              </a:lnSpc>
+            </a:pPr>
+            <a:r>
+              <a:rPr b="1" i="1" lang="en-US" sz="1800" spc="-1" strike="noStrike">
+                <a:solidFill>
+                  <a:srgbClr val="000000"/>
+                </a:solidFill>
+                <a:latin typeface="Arial"/>
+                <a:ea typeface="DejaVu Sans"/>
+              </a:rPr>
+              <a:t>            </a:t>
+            </a:r>
+            <a:r>
+              <a:rPr b="1" i="1" lang="en-US" sz="1800" spc="-1" strike="noStrike">
+                <a:solidFill>
+                  <a:srgbClr val="000000"/>
+                </a:solidFill>
+                <a:latin typeface="Arial"/>
+                <a:ea typeface="DejaVu Sans"/>
+              </a:rPr>
+              <a:t>println("No access")</a:t>
+            </a:r>
+            <a:endParaRPr b="0" lang="en-US" sz="1800" spc="-1" strike="noStrike">
+              <a:latin typeface="Arial"/>
+            </a:endParaRPr>
+          </a:p>
+          <a:p>
+            <a:pPr>
+              <a:lnSpc>
+                <a:spcPct val="100000"/>
+              </a:lnSpc>
+            </a:pPr>
+            <a:r>
+              <a:rPr b="1" i="1" lang="en-US" sz="1800" spc="-1" strike="noStrike">
+                <a:solidFill>
+                  <a:srgbClr val="000000"/>
+                </a:solidFill>
+                <a:latin typeface="Arial"/>
+                <a:ea typeface="DejaVu Sans"/>
+              </a:rPr>
+              <a:t>            </a:t>
+            </a:r>
+            <a:r>
+              <a:rPr b="1" i="1" lang="en-US" sz="1800" spc="-1" strike="noStrike">
+                <a:solidFill>
+                  <a:srgbClr val="000000"/>
+                </a:solidFill>
+                <a:latin typeface="Arial"/>
+                <a:ea typeface="DejaVu Sans"/>
+              </a:rPr>
+              <a:t>return -1</a:t>
+            </a:r>
+            <a:endParaRPr b="0" lang="en-US" sz="1800" spc="-1" strike="noStrike">
+              <a:latin typeface="Arial"/>
+            </a:endParaRPr>
+          </a:p>
+          <a:p>
+            <a:pPr>
+              <a:lnSpc>
+                <a:spcPct val="100000"/>
+              </a:lnSpc>
+            </a:pPr>
+            <a:r>
+              <a:rPr b="1" i="1" lang="en-US" sz="1800" spc="-1" strike="noStrike">
+                <a:solidFill>
+                  <a:srgbClr val="000000"/>
+                </a:solidFill>
+                <a:latin typeface="Arial"/>
+                <a:ea typeface="DejaVu Sans"/>
+              </a:rPr>
+              <a:t>        </a:t>
+            </a:r>
+            <a:r>
+              <a:rPr b="1" i="1" lang="en-US" sz="1800" spc="-1" strike="noStrike">
+                <a:solidFill>
+                  <a:srgbClr val="000000"/>
+                </a:solidFill>
+                <a:latin typeface="Arial"/>
+                <a:ea typeface="DejaVu Sans"/>
+              </a:rPr>
+              <a:t>}</a:t>
+            </a:r>
+            <a:endParaRPr b="0" lang="en-US" sz="1800" spc="-1" strike="noStrike">
+              <a:latin typeface="Arial"/>
+            </a:endParaRPr>
+          </a:p>
+          <a:p>
+            <a:pPr>
+              <a:lnSpc>
+                <a:spcPct val="100000"/>
+              </a:lnSpc>
+            </a:pPr>
+            <a:r>
+              <a:rPr b="1" i="1" lang="en-US" sz="1800" spc="-1" strike="noStrike">
+                <a:solidFill>
+                  <a:srgbClr val="000000"/>
+                </a:solidFill>
+                <a:latin typeface="Arial"/>
+                <a:ea typeface="DejaVu Sans"/>
+              </a:rPr>
+              <a:t>	</a:t>
+            </a:r>
+            <a:r>
+              <a:rPr b="1" i="1" lang="en-US" sz="1800" spc="-1" strike="noStrike">
+                <a:solidFill>
+                  <a:srgbClr val="000000"/>
+                </a:solidFill>
+                <a:latin typeface="Arial"/>
+                <a:ea typeface="DejaVu Sans"/>
+              </a:rPr>
+              <a:t>return 0</a:t>
+            </a:r>
+            <a:endParaRPr b="0" lang="en-US" sz="1800" spc="-1" strike="noStrike">
+              <a:latin typeface="Arial"/>
+            </a:endParaRPr>
+          </a:p>
+          <a:p>
+            <a:pPr>
+              <a:lnSpc>
+                <a:spcPct val="100000"/>
+              </a:lnSpc>
+            </a:pPr>
+            <a:r>
+              <a:rPr b="0" lang="en-US" sz="1800" spc="-1" strike="noStrike">
+                <a:solidFill>
+                  <a:srgbClr val="000000"/>
+                </a:solidFill>
+                <a:latin typeface="Arial"/>
+                <a:ea typeface="DejaVu Sans"/>
+              </a:rPr>
+              <a:t>    </a:t>
+            </a:r>
+            <a:r>
+              <a:rPr b="0" lang="en-US" sz="1800" spc="-1" strike="noStrike">
+                <a:solidFill>
+                  <a:srgbClr val="000000"/>
+                </a:solidFill>
+                <a:latin typeface="Arial"/>
+                <a:ea typeface="DejaVu Sans"/>
+              </a:rPr>
+              <a:t>}</a:t>
+            </a:r>
+            <a:endParaRPr b="0" lang="en-US" sz="1800" spc="-1" strike="noStrike">
+              <a:latin typeface="Arial"/>
+            </a:endParaRPr>
+          </a:p>
+          <a:p>
+            <a:pPr>
+              <a:lnSpc>
+                <a:spcPct val="100000"/>
+              </a:lnSpc>
+            </a:pPr>
+            <a:endParaRPr b="0" lang="en-US" sz="1800" spc="-1" strike="noStrike">
+              <a:latin typeface="Arial"/>
+            </a:endParaRPr>
+          </a:p>
+          <a:p>
+            <a:pPr>
+              <a:lnSpc>
+                <a:spcPct val="100000"/>
+              </a:lnSpc>
+            </a:pPr>
+            <a:r>
+              <a:rPr b="0" lang="en-US" sz="1800" spc="-1" strike="noStrike">
+                <a:solidFill>
+                  <a:srgbClr val="000000"/>
+                </a:solidFill>
+                <a:latin typeface="Arial"/>
+                <a:ea typeface="DejaVu Sans"/>
+              </a:rPr>
+              <a:t>    </a:t>
             </a:r>
             <a:r>
               <a:rPr b="1" lang="en-US" sz="1800" spc="-1" strike="noStrike">
@@ -3985,7 +4196,57 @@
                 <a:latin typeface="Arial"/>
                 <a:ea typeface="DejaVu Sans"/>
               </a:rPr>
-              <a:t> withAccess(request: Request, action: () -&gt; Int): Int {</a:t>
+              <a:t> blockUser(request: Request): Int {</a:t>
+            </a:r>
+            <a:endParaRPr b="0" lang="en-US" sz="1800" spc="-1" strike="noStrike">
+              <a:latin typeface="Arial"/>
+            </a:endParaRPr>
+          </a:p>
+          <a:p>
+            <a:pPr>
+              <a:lnSpc>
+                <a:spcPct val="100000"/>
+              </a:lnSpc>
+            </a:pPr>
+            <a:r>
+              <a:rPr b="0" lang="en-US" sz="1800" spc="-1" strike="noStrike">
+                <a:solidFill>
+                  <a:srgbClr val="000000"/>
+                </a:solidFill>
+                <a:latin typeface="Arial"/>
+                <a:ea typeface="DejaVu Sans"/>
+              </a:rPr>
+              <a:t>	</a:t>
+            </a:r>
+            <a:r>
+              <a:rPr b="0" lang="en-US" sz="1800" spc="-1" strike="noStrike">
+                <a:solidFill>
+                  <a:srgbClr val="000000"/>
+                </a:solidFill>
+                <a:latin typeface="Arial"/>
+                <a:ea typeface="DejaVu Sans"/>
+              </a:rPr>
+              <a:t>if (</a:t>
+            </a:r>
+            <a:r>
+              <a:rPr b="1" lang="en-US" sz="1800" spc="-1" strike="noStrike">
+                <a:solidFill>
+                  <a:srgbClr val="000000"/>
+                </a:solidFill>
+                <a:latin typeface="Arial"/>
+                <a:ea typeface="DejaVu Sans"/>
+              </a:rPr>
+              <a:t>checkAcess</a:t>
+            </a:r>
+            <a:r>
+              <a:rPr b="0" lang="en-US" sz="1800" spc="-1" strike="noStrike">
+                <a:solidFill>
+                  <a:srgbClr val="000000"/>
+                </a:solidFill>
+                <a:latin typeface="Arial"/>
+                <a:ea typeface="DejaVu Sans"/>
+              </a:rPr>
+              <a:t>(request) == -1) return -1</a:t>
             </a:r>
             <a:endParaRPr b="0" lang="en-US" sz="1800" spc="-1" strike="noStrike">
               <a:latin typeface="Arial"/>
@@ -4015,67 +4276,137 @@
                 <a:latin typeface="Arial"/>
                 <a:ea typeface="DejaVu Sans"/>
               </a:rPr>
-              <a:t>if (!request.hasAccess()) {</a:t>
-            </a:r>
-            <a:endParaRPr b="0" lang="en-US" sz="1800" spc="-1" strike="noStrike">
-              <a:latin typeface="Arial"/>
-            </a:endParaRPr>
-          </a:p>
-          <a:p>
-            <a:pPr>
-              <a:lnSpc>
-                <a:spcPct val="100000"/>
-              </a:lnSpc>
-            </a:pPr>
-            <a:r>
-              <a:rPr b="0" lang="en-US" sz="1800" spc="-1" strike="noStrike">
-                <a:solidFill>
-                  <a:srgbClr val="000000"/>
-                </a:solidFill>
-                <a:latin typeface="Arial"/>
-                <a:ea typeface="DejaVu Sans"/>
-              </a:rPr>
-              <a:t>            </a:t>
-            </a:r>
-            <a:r>
-              <a:rPr b="0" lang="en-US" sz="1800" spc="-1" strike="noStrike">
-                <a:solidFill>
-                  <a:srgbClr val="000000"/>
-                </a:solidFill>
-                <a:latin typeface="Arial"/>
-                <a:ea typeface="DejaVu Sans"/>
-              </a:rPr>
-              <a:t>println("No access")</a:t>
-            </a:r>
-            <a:endParaRPr b="0" lang="en-US" sz="1800" spc="-1" strike="noStrike">
-              <a:latin typeface="Arial"/>
-            </a:endParaRPr>
-          </a:p>
-          <a:p>
-            <a:pPr>
-              <a:lnSpc>
-                <a:spcPct val="100000"/>
-              </a:lnSpc>
-            </a:pPr>
-            <a:r>
-              <a:rPr b="0" lang="en-US" sz="1800" spc="-1" strike="noStrike">
-                <a:solidFill>
-                  <a:srgbClr val="000000"/>
-                </a:solidFill>
-                <a:latin typeface="Arial"/>
-                <a:ea typeface="DejaVu Sans"/>
-              </a:rPr>
-              <a:t>            </a:t>
+              <a:t>...</a:t>
+            </a:r>
+            <a:endParaRPr b="0" lang="en-US" sz="1800" spc="-1" strike="noStrike">
+              <a:latin typeface="Arial"/>
+            </a:endParaRPr>
+          </a:p>
+          <a:p>
+            <a:pPr>
+              <a:lnSpc>
+                <a:spcPct val="100000"/>
+              </a:lnSpc>
+            </a:pPr>
+            <a:r>
+              <a:rPr b="0" lang="en-US" sz="1800" spc="-1" strike="noStrike">
+                <a:solidFill>
+                  <a:srgbClr val="000000"/>
+                </a:solidFill>
+                <a:latin typeface="Arial"/>
+                <a:ea typeface="DejaVu Sans"/>
+              </a:rPr>
+              <a:t>    </a:t>
+            </a:r>
+            <a:r>
+              <a:rPr b="0" lang="en-US" sz="1800" spc="-1" strike="noStrike">
+                <a:solidFill>
+                  <a:srgbClr val="000000"/>
+                </a:solidFill>
+                <a:latin typeface="Arial"/>
+                <a:ea typeface="DejaVu Sans"/>
+              </a:rPr>
+              <a:t>}</a:t>
+            </a:r>
+            <a:endParaRPr b="0" lang="en-US" sz="1800" spc="-1" strike="noStrike">
+              <a:latin typeface="Arial"/>
+            </a:endParaRPr>
+          </a:p>
+          <a:p>
+            <a:pPr>
+              <a:lnSpc>
+                <a:spcPct val="100000"/>
+              </a:lnSpc>
+            </a:pPr>
+            <a:endParaRPr b="0" lang="en-US" sz="1800" spc="-1" strike="noStrike">
+              <a:latin typeface="Arial"/>
+            </a:endParaRPr>
+          </a:p>
+          <a:p>
+            <a:pPr>
+              <a:lnSpc>
+                <a:spcPct val="100000"/>
+              </a:lnSpc>
+            </a:pPr>
+            <a:r>
+              <a:rPr b="0" lang="en-US" sz="1800" spc="-1" strike="noStrike">
+                <a:solidFill>
+                  <a:srgbClr val="000000"/>
+                </a:solidFill>
+                <a:latin typeface="Arial"/>
+                <a:ea typeface="DejaVu Sans"/>
+              </a:rPr>
+              <a:t>    </a:t>
             </a:r>
             <a:r>
               <a:rPr b="1" lang="en-US" sz="1800" spc="-1" strike="noStrike">
                 <a:solidFill>
-                  <a:srgbClr val="000000"/>
-                </a:solidFill>
-                <a:latin typeface="Arial"/>
-                <a:ea typeface="DejaVu Sans"/>
-              </a:rPr>
-              <a:t>return -1</a:t>
+                  <a:srgbClr val="182f7c"/>
+                </a:solidFill>
+                <a:latin typeface="Arial"/>
+                <a:ea typeface="DejaVu Sans"/>
+              </a:rPr>
+              <a:t>fun</a:t>
+            </a:r>
+            <a:r>
+              <a:rPr b="0" lang="en-US" sz="1800" spc="-1" strike="noStrike">
+                <a:solidFill>
+                  <a:srgbClr val="000000"/>
+                </a:solidFill>
+                <a:latin typeface="Arial"/>
+                <a:ea typeface="DejaVu Sans"/>
+              </a:rPr>
+              <a:t> deleteUser(request: Request): Int {</a:t>
+            </a:r>
+            <a:endParaRPr b="0" lang="en-US" sz="1800" spc="-1" strike="noStrike">
+              <a:latin typeface="Arial"/>
+            </a:endParaRPr>
+          </a:p>
+          <a:p>
+            <a:pPr>
+              <a:lnSpc>
+                <a:spcPct val="100000"/>
+              </a:lnSpc>
+            </a:pPr>
+            <a:r>
+              <a:rPr b="0" lang="en-US" sz="1800" spc="-1" strike="noStrike">
+                <a:solidFill>
+                  <a:srgbClr val="000000"/>
+                </a:solidFill>
+                <a:latin typeface="Arial"/>
+                <a:ea typeface="DejaVu Sans"/>
+              </a:rPr>
+              <a:t>	</a:t>
+            </a:r>
+            <a:r>
+              <a:rPr b="0" lang="en-US" sz="1800" spc="-1" strike="noStrike">
+                <a:solidFill>
+                  <a:srgbClr val="000000"/>
+                </a:solidFill>
+                <a:latin typeface="Arial"/>
+                <a:ea typeface="DejaVu Sans"/>
+              </a:rPr>
+              <a:t>if (</a:t>
+            </a:r>
+            <a:r>
+              <a:rPr b="1" lang="en-US" sz="1800" spc="-1" strike="noStrike">
+                <a:solidFill>
+                  <a:srgbClr val="000000"/>
+                </a:solidFill>
+                <a:latin typeface="Arial"/>
+                <a:ea typeface="DejaVu Sans"/>
+              </a:rPr>
+              <a:t>checkAcess</a:t>
+            </a:r>
+            <a:r>
+              <a:rPr b="0" lang="en-US" sz="1800" spc="-1" strike="noStrike">
+                <a:solidFill>
+                  <a:srgbClr val="000000"/>
+                </a:solidFill>
+                <a:latin typeface="Arial"/>
+                <a:ea typeface="DejaVu Sans"/>
+              </a:rPr>
+              <a:t>(request) == -1) return -1</a:t>
             </a:r>
             <a:endParaRPr b="0" lang="en-US" sz="1800" spc="-1" strike="noStrike">
               <a:latin typeface="Arial"/>
@@ -4105,367 +4436,7 @@
                 <a:latin typeface="Arial"/>
                 <a:ea typeface="DejaVu Sans"/>
               </a:rPr>
-              <a:t>}</a:t>
-            </a:r>
-            <a:endParaRPr b="0" lang="en-US" sz="1800" spc="-1" strike="noStrike">
-              <a:latin typeface="Arial"/>
-            </a:endParaRPr>
-          </a:p>
-          <a:p>
-            <a:pPr>
-              <a:lnSpc>
-                <a:spcPct val="100000"/>
-              </a:lnSpc>
-            </a:pPr>
-            <a:r>
-              <a:rPr b="0" lang="en-US" sz="1800" spc="-1" strike="noStrike">
-                <a:solidFill>
-                  <a:srgbClr val="000000"/>
-                </a:solidFill>
-                <a:latin typeface="Arial"/>
-                <a:ea typeface="DejaVu Sans"/>
-              </a:rPr>
-              <a:t>        </a:t>
-            </a:r>
-            <a:r>
-              <a:rPr b="1" lang="en-US" sz="1800" spc="-1" strike="noStrike">
-                <a:solidFill>
-                  <a:srgbClr val="000000"/>
-                </a:solidFill>
-                <a:latin typeface="Arial"/>
-                <a:ea typeface="DejaVu Sans"/>
-              </a:rPr>
-              <a:t>return</a:t>
-            </a:r>
-            <a:r>
-              <a:rPr b="0" lang="en-US" sz="1800" spc="-1" strike="noStrike">
-                <a:solidFill>
-                  <a:srgbClr val="000000"/>
-                </a:solidFill>
-                <a:latin typeface="Arial"/>
-                <a:ea typeface="DejaVu Sans"/>
-              </a:rPr>
-              <a:t> action()</a:t>
-            </a:r>
-            <a:endParaRPr b="0" lang="en-US" sz="1800" spc="-1" strike="noStrike">
-              <a:latin typeface="Arial"/>
-            </a:endParaRPr>
-          </a:p>
-          <a:p>
-            <a:pPr>
-              <a:lnSpc>
-                <a:spcPct val="100000"/>
-              </a:lnSpc>
-            </a:pPr>
-            <a:r>
-              <a:rPr b="0" lang="en-US" sz="1800" spc="-1" strike="noStrike">
-                <a:solidFill>
-                  <a:srgbClr val="000000"/>
-                </a:solidFill>
-                <a:latin typeface="Arial"/>
-                <a:ea typeface="DejaVu Sans"/>
-              </a:rPr>
-              <a:t>    </a:t>
-            </a:r>
-            <a:r>
-              <a:rPr b="0" lang="en-US" sz="1800" spc="-1" strike="noStrike">
-                <a:solidFill>
-                  <a:srgbClr val="000000"/>
-                </a:solidFill>
-                <a:latin typeface="Arial"/>
-                <a:ea typeface="DejaVu Sans"/>
-              </a:rPr>
-              <a:t>}</a:t>
-            </a:r>
-            <a:endParaRPr b="0" lang="en-US" sz="1800" spc="-1" strike="noStrike">
-              <a:latin typeface="Arial"/>
-            </a:endParaRPr>
-          </a:p>
-          <a:p>
-            <a:pPr>
-              <a:lnSpc>
-                <a:spcPct val="100000"/>
-              </a:lnSpc>
-            </a:pPr>
-            <a:endParaRPr b="0" lang="en-US" sz="1800" spc="-1" strike="noStrike">
-              <a:latin typeface="Arial"/>
-            </a:endParaRPr>
-          </a:p>
-          <a:p>
-            <a:pPr>
-              <a:lnSpc>
-                <a:spcPct val="100000"/>
-              </a:lnSpc>
-            </a:pPr>
-            <a:r>
-              <a:rPr b="0" lang="en-US" sz="1800" spc="-1" strike="noStrike">
-                <a:solidFill>
-                  <a:srgbClr val="000000"/>
-                </a:solidFill>
-                <a:latin typeface="Arial"/>
-                <a:ea typeface="DejaVu Sans"/>
-              </a:rPr>
-              <a:t>    </a:t>
-            </a:r>
-            <a:r>
-              <a:rPr b="1" lang="en-US" sz="1800" spc="-1" strike="noStrike">
-                <a:solidFill>
-                  <a:srgbClr val="182f7c"/>
-                </a:solidFill>
-                <a:latin typeface="Arial"/>
-                <a:ea typeface="DejaVu Sans"/>
-              </a:rPr>
-              <a:t>fun</a:t>
-            </a:r>
-            <a:r>
-              <a:rPr b="0" lang="en-US" sz="1800" spc="-1" strike="noStrike">
-                <a:solidFill>
-                  <a:srgbClr val="000000"/>
-                </a:solidFill>
-                <a:latin typeface="Arial"/>
-                <a:ea typeface="DejaVu Sans"/>
-              </a:rPr>
-              <a:t> blockUser(request: Request) = </a:t>
-            </a:r>
-            <a:r>
-              <a:rPr b="1" lang="en-US" sz="1800" spc="-1" strike="noStrike">
-                <a:solidFill>
-                  <a:srgbClr val="000000"/>
-                </a:solidFill>
-                <a:latin typeface="Arial"/>
-                <a:ea typeface="DejaVu Sans"/>
-              </a:rPr>
-              <a:t>withAccess</a:t>
-            </a:r>
-            <a:r>
-              <a:rPr b="0" lang="en-US" sz="1800" spc="-1" strike="noStrike">
-                <a:solidFill>
-                  <a:srgbClr val="000000"/>
-                </a:solidFill>
-                <a:latin typeface="Arial"/>
-                <a:ea typeface="DejaVu Sans"/>
-              </a:rPr>
-              <a:t>(request) {</a:t>
-            </a:r>
-            <a:endParaRPr b="0" lang="en-US" sz="1800" spc="-1" strike="noStrike">
-              <a:latin typeface="Arial"/>
-            </a:endParaRPr>
-          </a:p>
-          <a:p>
-            <a:pPr>
-              <a:lnSpc>
-                <a:spcPct val="100000"/>
-              </a:lnSpc>
-            </a:pPr>
-            <a:r>
-              <a:rPr b="0" lang="en-US" sz="1800" spc="-1" strike="noStrike">
-                <a:solidFill>
-                  <a:srgbClr val="000000"/>
-                </a:solidFill>
-                <a:latin typeface="Arial"/>
-                <a:ea typeface="DejaVu Sans"/>
-              </a:rPr>
-              <a:t>        </a:t>
-            </a:r>
-            <a:r>
-              <a:rPr b="0" lang="en-US" sz="1800" spc="-1" strike="noStrike">
-                <a:solidFill>
-                  <a:srgbClr val="000000"/>
-                </a:solidFill>
-                <a:latin typeface="Arial"/>
-                <a:ea typeface="DejaVu Sans"/>
-              </a:rPr>
               <a:t>...</a:t>
-            </a:r>
-            <a:endParaRPr b="0" lang="en-US" sz="1800" spc="-1" strike="noStrike">
-              <a:latin typeface="Arial"/>
-            </a:endParaRPr>
-          </a:p>
-          <a:p>
-            <a:pPr>
-              <a:lnSpc>
-                <a:spcPct val="100000"/>
-              </a:lnSpc>
-            </a:pPr>
-            <a:r>
-              <a:rPr b="0" lang="en-US" sz="1800" spc="-1" strike="noStrike">
-                <a:solidFill>
-                  <a:srgbClr val="000000"/>
-                </a:solidFill>
-                <a:latin typeface="Arial"/>
-                <a:ea typeface="DejaVu Sans"/>
-              </a:rPr>
-              <a:t>        </a:t>
-            </a:r>
-            <a:r>
-              <a:rPr b="0" lang="en-US" sz="1800" spc="-1" strike="noStrike">
-                <a:solidFill>
-                  <a:srgbClr val="000000"/>
-                </a:solidFill>
-                <a:latin typeface="Arial"/>
-                <a:ea typeface="DejaVu Sans"/>
-              </a:rPr>
-              <a:t>return 0</a:t>
-            </a:r>
-            <a:endParaRPr b="0" lang="en-US" sz="1800" spc="-1" strike="noStrike">
-              <a:latin typeface="Arial"/>
-            </a:endParaRPr>
-          </a:p>
-          <a:p>
-            <a:pPr>
-              <a:lnSpc>
-                <a:spcPct val="100000"/>
-              </a:lnSpc>
-            </a:pPr>
-            <a:r>
-              <a:rPr b="0" lang="en-US" sz="1800" spc="-1" strike="noStrike">
-                <a:solidFill>
-                  <a:srgbClr val="000000"/>
-                </a:solidFill>
-                <a:latin typeface="Arial"/>
-                <a:ea typeface="DejaVu Sans"/>
-              </a:rPr>
-              <a:t>    </a:t>
-            </a:r>
-            <a:r>
-              <a:rPr b="0" lang="en-US" sz="1800" spc="-1" strike="noStrike">
-                <a:solidFill>
-                  <a:srgbClr val="000000"/>
-                </a:solidFill>
-                <a:latin typeface="Arial"/>
-                <a:ea typeface="DejaVu Sans"/>
-              </a:rPr>
-              <a:t>}</a:t>
-            </a:r>
-            <a:endParaRPr b="0" lang="en-US" sz="1800" spc="-1" strike="noStrike">
-              <a:latin typeface="Arial"/>
-            </a:endParaRPr>
-          </a:p>
-          <a:p>
-            <a:pPr>
-              <a:lnSpc>
-                <a:spcPct val="100000"/>
-              </a:lnSpc>
-            </a:pPr>
-            <a:endParaRPr b="0" lang="en-US" sz="1800" spc="-1" strike="noStrike">
-              <a:latin typeface="Arial"/>
-            </a:endParaRPr>
-          </a:p>
-          <a:p>
-            <a:pPr>
-              <a:lnSpc>
-                <a:spcPct val="100000"/>
-              </a:lnSpc>
-            </a:pPr>
-            <a:r>
-              <a:rPr b="0" lang="en-US" sz="1800" spc="-1" strike="noStrike">
-                <a:solidFill>
-                  <a:srgbClr val="000000"/>
-                </a:solidFill>
-                <a:latin typeface="Arial"/>
-                <a:ea typeface="DejaVu Sans"/>
-              </a:rPr>
-              <a:t>    </a:t>
-            </a:r>
-            <a:r>
-              <a:rPr b="1" lang="en-US" sz="1800" spc="-1" strike="noStrike">
-                <a:solidFill>
-                  <a:srgbClr val="182f7c"/>
-                </a:solidFill>
-                <a:latin typeface="Arial"/>
-                <a:ea typeface="DejaVu Sans"/>
-              </a:rPr>
-              <a:t>fun</a:t>
-            </a:r>
-            <a:r>
-              <a:rPr b="0" lang="en-US" sz="1800" spc="-1" strike="noStrike">
-                <a:solidFill>
-                  <a:srgbClr val="000000"/>
-                </a:solidFill>
-                <a:latin typeface="Arial"/>
-                <a:ea typeface="DejaVu Sans"/>
-              </a:rPr>
-              <a:t> deleteUser(request: Request) = </a:t>
-            </a:r>
-            <a:r>
-              <a:rPr b="1" lang="en-US" sz="1800" spc="-1" strike="noStrike">
-                <a:solidFill>
-                  <a:srgbClr val="000000"/>
-                </a:solidFill>
-                <a:latin typeface="Arial"/>
-                <a:ea typeface="DejaVu Sans"/>
-              </a:rPr>
-              <a:t>withAccess</a:t>
-            </a:r>
-            <a:r>
-              <a:rPr b="0" lang="en-US" sz="1800" spc="-1" strike="noStrike">
-                <a:solidFill>
-                  <a:srgbClr val="000000"/>
-                </a:solidFill>
-                <a:latin typeface="Arial"/>
-                <a:ea typeface="DejaVu Sans"/>
-              </a:rPr>
-              <a:t>(request) {</a:t>
-            </a:r>
-            <a:endParaRPr b="0" lang="en-US" sz="1800" spc="-1" strike="noStrike">
-              <a:latin typeface="Arial"/>
-            </a:endParaRPr>
-          </a:p>
-          <a:p>
-            <a:pPr>
-              <a:lnSpc>
-                <a:spcPct val="100000"/>
-              </a:lnSpc>
-            </a:pPr>
-            <a:r>
-              <a:rPr b="0" lang="en-US" sz="1800" spc="-1" strike="noStrike">
-                <a:solidFill>
-                  <a:srgbClr val="000000"/>
-                </a:solidFill>
-                <a:latin typeface="Arial"/>
-                <a:ea typeface="DejaVu Sans"/>
-              </a:rPr>
-              <a:t>        </a:t>
-            </a:r>
-            <a:r>
-              <a:rPr b="0" lang="en-US" sz="1800" spc="-1" strike="noStrike">
-                <a:solidFill>
-                  <a:srgbClr val="000000"/>
-                </a:solidFill>
-                <a:latin typeface="Arial"/>
-                <a:ea typeface="DejaVu Sans"/>
-              </a:rPr>
-              <a:t>...</a:t>
-            </a:r>
-            <a:endParaRPr b="0" lang="en-US" sz="1800" spc="-1" strike="noStrike">
-              <a:latin typeface="Arial"/>
-            </a:endParaRPr>
-          </a:p>
-          <a:p>
-            <a:pPr>
-              <a:lnSpc>
-                <a:spcPct val="100000"/>
-              </a:lnSpc>
-            </a:pPr>
-            <a:r>
-              <a:rPr b="0" lang="en-US" sz="1800" spc="-1" strike="noStrike">
-                <a:solidFill>
-                  <a:srgbClr val="000000"/>
-                </a:solidFill>
-                <a:latin typeface="Arial"/>
-                <a:ea typeface="DejaVu Sans"/>
-              </a:rPr>
-              <a:t>        </a:t>
-            </a:r>
-            <a:r>
-              <a:rPr b="0" lang="en-US" sz="1800" spc="-1" strike="noStrike">
-                <a:solidFill>
-                  <a:srgbClr val="000000"/>
-                </a:solidFill>
-                <a:latin typeface="Arial"/>
-                <a:ea typeface="DejaVu Sans"/>
-              </a:rPr>
-              <a:t>return 0</a:t>
             </a:r>
             <a:endParaRPr b="0" lang="en-US" sz="1800" spc="-1" strike="noStrike">
               <a:latin typeface="Arial"/>
@@ -4572,29 +4543,6 @@
           <a:chExt cx="0" cy="0"/>
         </a:xfrm>
       </p:grpSpPr>
-      <p:pic>
-        <p:nvPicPr>
-          <p:cNvPr id="110" name="" descr=""/>
-          <p:cNvPicPr/>
-          <p:nvPr/>
-        </p:nvPicPr>
-        <p:blipFill>
-          <a:blip r:embed="rId1"/>
-          <a:stretch/>
-        </p:blipFill>
-        <p:spPr>
-          <a:xfrm>
-            <a:off x="474840" y="731520"/>
-            <a:ext cx="7022880" cy="2742840"/>
-          </a:xfrm>
-          <a:prstGeom prst="rect">
-            <a:avLst/>
-          </a:prstGeom>
-          <a:ln>
-            <a:noFill/>
-          </a:ln>
-        </p:spPr>
-      </p:pic>
       <p:sp>
         <p:nvSpPr>
           <p:cNvPr id="111" name="CustomShape 1"/>
@@ -4603,13 +4551,15 @@
         </p:nvSpPr>
         <p:spPr>
           <a:xfrm>
-            <a:off x="1005840" y="4206240"/>
-            <a:ext cx="3657240" cy="1645560"/>
-          </a:xfrm>
-          <a:prstGeom prst="rect">
-            <a:avLst/>
-          </a:prstGeom>
-          <a:noFill/>
+            <a:off x="366840" y="276840"/>
+            <a:ext cx="6856200" cy="545400"/>
+          </a:xfrm>
+          <a:prstGeom prst="rect">
+            <a:avLst/>
+          </a:prstGeom>
+          <a:solidFill>
+            <a:srgbClr val="ffffff"/>
+          </a:solidFill>
           <a:ln>
             <a:noFill/>
           </a:ln>
@@ -4621,37 +4571,685 @@
           <a:fontRef idx="minor"/>
         </p:style>
         <p:txBody>
-          <a:bodyPr lIns="90000" rIns="90000" tIns="45000" bIns="45000"/>
-          <a:p>
-            <a:r>
-              <a:rPr b="0" lang="en-US" sz="2200" spc="-1" strike="noStrike">
-                <a:latin typeface="Arial"/>
-              </a:rPr>
-              <a:t>1. [ [3, 3], [ ], [5, 5] ]</a:t>
-            </a:r>
-            <a:endParaRPr b="0" lang="en-US" sz="2200" spc="-1" strike="noStrike">
-              <a:latin typeface="Arial"/>
-            </a:endParaRPr>
-          </a:p>
-          <a:p>
-            <a:r>
-              <a:rPr b="0" lang="en-US" sz="2200" spc="-1" strike="noStrike">
-                <a:latin typeface="Arial"/>
-              </a:rPr>
-              <a:t>2. [3, 3, 5, 5]</a:t>
-            </a:r>
-            <a:endParaRPr b="0" lang="en-US" sz="2200" spc="-1" strike="noStrike">
-              <a:latin typeface="Arial"/>
-            </a:endParaRPr>
-          </a:p>
-          <a:p>
-            <a:r>
-              <a:rPr b="0" lang="en-US" sz="2200" spc="-1" strike="noStrike">
-                <a:latin typeface="Arial"/>
-              </a:rPr>
-              <a:t>3. [ ]</a:t>
-            </a:r>
-            <a:endParaRPr b="0" lang="en-US" sz="2200" spc="-1" strike="noStrike">
+          <a:bodyPr wrap="none" lIns="90000" rIns="90000" tIns="45000" bIns="45000" anchor="ctr"/>
+          <a:p>
+            <a:pPr>
+              <a:lnSpc>
+                <a:spcPct val="100000"/>
+              </a:lnSpc>
+            </a:pPr>
+            <a:r>
+              <a:rPr b="0" lang="en-US" sz="1800" spc="-1" strike="noStrike">
+                <a:solidFill>
+                  <a:srgbClr val="000000"/>
+                </a:solidFill>
+                <a:latin typeface="Consolas"/>
+                <a:ea typeface="DejaVu Sans"/>
+              </a:rPr>
+              <a:t>Inlining</a:t>
+            </a:r>
+            <a:endParaRPr b="0" lang="en-US" sz="1800" spc="-1" strike="noStrike">
+              <a:latin typeface="Arial"/>
+            </a:endParaRPr>
+          </a:p>
+        </p:txBody>
+      </p:sp>
+      <p:sp>
+        <p:nvSpPr>
+          <p:cNvPr id="112" name="CustomShape 2"/>
+          <p:cNvSpPr/>
+          <p:nvPr/>
+        </p:nvSpPr>
+        <p:spPr>
+          <a:xfrm>
+            <a:off x="549720" y="1005840"/>
+            <a:ext cx="6856200" cy="5302800"/>
+          </a:xfrm>
+          <a:prstGeom prst="rect">
+            <a:avLst/>
+          </a:prstGeom>
+          <a:solidFill>
+            <a:srgbClr val="ffffff"/>
+          </a:solidFill>
+          <a:ln>
+            <a:noFill/>
+          </a:ln>
+        </p:spPr>
+        <p:style>
+          <a:lnRef idx="0"/>
+          <a:fillRef idx="0"/>
+          <a:effectRef idx="0"/>
+          <a:fontRef idx="minor"/>
+        </p:style>
+        <p:txBody>
+          <a:bodyPr wrap="none" lIns="90000" rIns="90000" tIns="45000" bIns="45000" anchor="ctr"/>
+          <a:p>
+            <a:pPr>
+              <a:lnSpc>
+                <a:spcPct val="100000"/>
+              </a:lnSpc>
+            </a:pPr>
+            <a:r>
+              <a:rPr b="0" lang="en-US" sz="1800" spc="-1" strike="noStrike">
+                <a:solidFill>
+                  <a:srgbClr val="000000"/>
+                </a:solidFill>
+                <a:latin typeface="Arial"/>
+                <a:ea typeface="DejaVu Sans"/>
+              </a:rPr>
+              <a:t>class Controller {</a:t>
+            </a:r>
+            <a:endParaRPr b="0" lang="en-US" sz="1800" spc="-1" strike="noStrike">
+              <a:latin typeface="Arial"/>
+            </a:endParaRPr>
+          </a:p>
+          <a:p>
+            <a:pPr>
+              <a:lnSpc>
+                <a:spcPct val="100000"/>
+              </a:lnSpc>
+            </a:pPr>
+            <a:endParaRPr b="0" lang="en-US" sz="1800" spc="-1" strike="noStrike">
+              <a:latin typeface="Arial"/>
+            </a:endParaRPr>
+          </a:p>
+          <a:p>
+            <a:pPr>
+              <a:lnSpc>
+                <a:spcPct val="100000"/>
+              </a:lnSpc>
+            </a:pPr>
+            <a:r>
+              <a:rPr b="0" lang="en-US" sz="1800" spc="-1" strike="noStrike">
+                <a:solidFill>
+                  <a:srgbClr val="000000"/>
+                </a:solidFill>
+                <a:latin typeface="Arial"/>
+                <a:ea typeface="DejaVu Sans"/>
+              </a:rPr>
+              <a:t>    </a:t>
+            </a:r>
+            <a:r>
+              <a:rPr b="0" lang="en-US" sz="1800" spc="-1" strike="noStrike">
+                <a:solidFill>
+                  <a:srgbClr val="000000"/>
+                </a:solidFill>
+                <a:latin typeface="Arial"/>
+                <a:ea typeface="DejaVu Sans"/>
+              </a:rPr>
+              <a:t>private </a:t>
+            </a:r>
+            <a:r>
+              <a:rPr b="1" lang="en-US" sz="1800" spc="-1" strike="noStrike">
+                <a:solidFill>
+                  <a:srgbClr val="ed1c24"/>
+                </a:solidFill>
+                <a:latin typeface="Arial"/>
+                <a:ea typeface="DejaVu Sans"/>
+              </a:rPr>
+              <a:t>inline</a:t>
+            </a:r>
+            <a:r>
+              <a:rPr b="0" lang="en-US" sz="1800" spc="-1" strike="noStrike">
+                <a:solidFill>
+                  <a:srgbClr val="000000"/>
+                </a:solidFill>
+                <a:latin typeface="Arial"/>
+                <a:ea typeface="DejaVu Sans"/>
+              </a:rPr>
+              <a:t> </a:t>
+            </a:r>
+            <a:r>
+              <a:rPr b="1" lang="en-US" sz="1800" spc="-1" strike="noStrike">
+                <a:solidFill>
+                  <a:srgbClr val="182f7c"/>
+                </a:solidFill>
+                <a:latin typeface="Arial"/>
+                <a:ea typeface="DejaVu Sans"/>
+              </a:rPr>
+              <a:t>fun</a:t>
+            </a:r>
+            <a:r>
+              <a:rPr b="0" lang="en-US" sz="1800" spc="-1" strike="noStrike">
+                <a:solidFill>
+                  <a:srgbClr val="000000"/>
+                </a:solidFill>
+                <a:latin typeface="Arial"/>
+                <a:ea typeface="DejaVu Sans"/>
+              </a:rPr>
+              <a:t> withAccess(request: Request, action: () -&gt; Int): Int {</a:t>
+            </a:r>
+            <a:endParaRPr b="0" lang="en-US" sz="1800" spc="-1" strike="noStrike">
+              <a:latin typeface="Arial"/>
+            </a:endParaRPr>
+          </a:p>
+          <a:p>
+            <a:pPr>
+              <a:lnSpc>
+                <a:spcPct val="100000"/>
+              </a:lnSpc>
+            </a:pPr>
+            <a:r>
+              <a:rPr b="0" lang="en-US" sz="1800" spc="-1" strike="noStrike">
+                <a:solidFill>
+                  <a:srgbClr val="000000"/>
+                </a:solidFill>
+                <a:latin typeface="Arial"/>
+                <a:ea typeface="DejaVu Sans"/>
+              </a:rPr>
+              <a:t>        </a:t>
+            </a:r>
+            <a:r>
+              <a:rPr b="0" lang="en-US" sz="1800" spc="-1" strike="noStrike">
+                <a:solidFill>
+                  <a:srgbClr val="000000"/>
+                </a:solidFill>
+                <a:latin typeface="Arial"/>
+                <a:ea typeface="DejaVu Sans"/>
+              </a:rPr>
+              <a:t>if (!request.hasAccess()) {</a:t>
+            </a:r>
+            <a:endParaRPr b="0" lang="en-US" sz="1800" spc="-1" strike="noStrike">
+              <a:latin typeface="Arial"/>
+            </a:endParaRPr>
+          </a:p>
+          <a:p>
+            <a:pPr>
+              <a:lnSpc>
+                <a:spcPct val="100000"/>
+              </a:lnSpc>
+            </a:pPr>
+            <a:r>
+              <a:rPr b="0" lang="en-US" sz="1800" spc="-1" strike="noStrike">
+                <a:solidFill>
+                  <a:srgbClr val="000000"/>
+                </a:solidFill>
+                <a:latin typeface="Arial"/>
+                <a:ea typeface="DejaVu Sans"/>
+              </a:rPr>
+              <a:t>            </a:t>
+            </a:r>
+            <a:r>
+              <a:rPr b="0" lang="en-US" sz="1800" spc="-1" strike="noStrike">
+                <a:solidFill>
+                  <a:srgbClr val="000000"/>
+                </a:solidFill>
+                <a:latin typeface="Arial"/>
+                <a:ea typeface="DejaVu Sans"/>
+              </a:rPr>
+              <a:t>println("No access")</a:t>
+            </a:r>
+            <a:endParaRPr b="0" lang="en-US" sz="1800" spc="-1" strike="noStrike">
+              <a:latin typeface="Arial"/>
+            </a:endParaRPr>
+          </a:p>
+          <a:p>
+            <a:pPr>
+              <a:lnSpc>
+                <a:spcPct val="100000"/>
+              </a:lnSpc>
+            </a:pPr>
+            <a:r>
+              <a:rPr b="0" lang="en-US" sz="1800" spc="-1" strike="noStrike">
+                <a:solidFill>
+                  <a:srgbClr val="000000"/>
+                </a:solidFill>
+                <a:latin typeface="Arial"/>
+                <a:ea typeface="DejaVu Sans"/>
+              </a:rPr>
+              <a:t>            </a:t>
+            </a:r>
+            <a:r>
+              <a:rPr b="1" lang="en-US" sz="1800" spc="-1" strike="noStrike">
+                <a:solidFill>
+                  <a:srgbClr val="000000"/>
+                </a:solidFill>
+                <a:latin typeface="Arial"/>
+                <a:ea typeface="DejaVu Sans"/>
+              </a:rPr>
+              <a:t>return -1</a:t>
+            </a:r>
+            <a:endParaRPr b="0" lang="en-US" sz="1800" spc="-1" strike="noStrike">
+              <a:latin typeface="Arial"/>
+            </a:endParaRPr>
+          </a:p>
+          <a:p>
+            <a:pPr>
+              <a:lnSpc>
+                <a:spcPct val="100000"/>
+              </a:lnSpc>
+            </a:pPr>
+            <a:r>
+              <a:rPr b="0" lang="en-US" sz="1800" spc="-1" strike="noStrike">
+                <a:solidFill>
+                  <a:srgbClr val="000000"/>
+                </a:solidFill>
+                <a:latin typeface="Arial"/>
+                <a:ea typeface="DejaVu Sans"/>
+              </a:rPr>
+              <a:t>        </a:t>
+            </a:r>
+            <a:r>
+              <a:rPr b="0" lang="en-US" sz="1800" spc="-1" strike="noStrike">
+                <a:solidFill>
+                  <a:srgbClr val="000000"/>
+                </a:solidFill>
+                <a:latin typeface="Arial"/>
+                <a:ea typeface="DejaVu Sans"/>
+              </a:rPr>
+              <a:t>}</a:t>
+            </a:r>
+            <a:endParaRPr b="0" lang="en-US" sz="1800" spc="-1" strike="noStrike">
+              <a:latin typeface="Arial"/>
+            </a:endParaRPr>
+          </a:p>
+          <a:p>
+            <a:pPr>
+              <a:lnSpc>
+                <a:spcPct val="100000"/>
+              </a:lnSpc>
+            </a:pPr>
+            <a:r>
+              <a:rPr b="0" lang="en-US" sz="1800" spc="-1" strike="noStrike">
+                <a:solidFill>
+                  <a:srgbClr val="000000"/>
+                </a:solidFill>
+                <a:latin typeface="Arial"/>
+                <a:ea typeface="DejaVu Sans"/>
+              </a:rPr>
+              <a:t>        </a:t>
+            </a:r>
+            <a:r>
+              <a:rPr b="1" lang="en-US" sz="1800" spc="-1" strike="noStrike">
+                <a:solidFill>
+                  <a:srgbClr val="000000"/>
+                </a:solidFill>
+                <a:latin typeface="Arial"/>
+                <a:ea typeface="DejaVu Sans"/>
+              </a:rPr>
+              <a:t>return</a:t>
+            </a:r>
+            <a:r>
+              <a:rPr b="0" lang="en-US" sz="1800" spc="-1" strike="noStrike">
+                <a:solidFill>
+                  <a:srgbClr val="000000"/>
+                </a:solidFill>
+                <a:latin typeface="Arial"/>
+                <a:ea typeface="DejaVu Sans"/>
+              </a:rPr>
+              <a:t> action()</a:t>
+            </a:r>
+            <a:endParaRPr b="0" lang="en-US" sz="1800" spc="-1" strike="noStrike">
+              <a:latin typeface="Arial"/>
+            </a:endParaRPr>
+          </a:p>
+          <a:p>
+            <a:pPr>
+              <a:lnSpc>
+                <a:spcPct val="100000"/>
+              </a:lnSpc>
+            </a:pPr>
+            <a:r>
+              <a:rPr b="0" lang="en-US" sz="1800" spc="-1" strike="noStrike">
+                <a:solidFill>
+                  <a:srgbClr val="000000"/>
+                </a:solidFill>
+                <a:latin typeface="Arial"/>
+                <a:ea typeface="DejaVu Sans"/>
+              </a:rPr>
+              <a:t>    </a:t>
+            </a:r>
+            <a:r>
+              <a:rPr b="0" lang="en-US" sz="1800" spc="-1" strike="noStrike">
+                <a:solidFill>
+                  <a:srgbClr val="000000"/>
+                </a:solidFill>
+                <a:latin typeface="Arial"/>
+                <a:ea typeface="DejaVu Sans"/>
+              </a:rPr>
+              <a:t>}</a:t>
+            </a:r>
+            <a:endParaRPr b="0" lang="en-US" sz="1800" spc="-1" strike="noStrike">
+              <a:latin typeface="Arial"/>
+            </a:endParaRPr>
+          </a:p>
+          <a:p>
+            <a:pPr>
+              <a:lnSpc>
+                <a:spcPct val="100000"/>
+              </a:lnSpc>
+            </a:pPr>
+            <a:endParaRPr b="0" lang="en-US" sz="1800" spc="-1" strike="noStrike">
+              <a:latin typeface="Arial"/>
+            </a:endParaRPr>
+          </a:p>
+          <a:p>
+            <a:pPr>
+              <a:lnSpc>
+                <a:spcPct val="100000"/>
+              </a:lnSpc>
+            </a:pPr>
+            <a:r>
+              <a:rPr b="0" lang="en-US" sz="1800" spc="-1" strike="noStrike">
+                <a:solidFill>
+                  <a:srgbClr val="000000"/>
+                </a:solidFill>
+                <a:latin typeface="Arial"/>
+                <a:ea typeface="DejaVu Sans"/>
+              </a:rPr>
+              <a:t>    </a:t>
+            </a:r>
+            <a:r>
+              <a:rPr b="1" lang="en-US" sz="1800" spc="-1" strike="noStrike">
+                <a:solidFill>
+                  <a:srgbClr val="182f7c"/>
+                </a:solidFill>
+                <a:latin typeface="Arial"/>
+                <a:ea typeface="DejaVu Sans"/>
+              </a:rPr>
+              <a:t>fun</a:t>
+            </a:r>
+            <a:r>
+              <a:rPr b="0" lang="en-US" sz="1800" spc="-1" strike="noStrike">
+                <a:solidFill>
+                  <a:srgbClr val="000000"/>
+                </a:solidFill>
+                <a:latin typeface="Arial"/>
+                <a:ea typeface="DejaVu Sans"/>
+              </a:rPr>
+              <a:t> blockUser(request: Request) = </a:t>
+            </a:r>
+            <a:r>
+              <a:rPr b="1" lang="en-US" sz="1800" spc="-1" strike="noStrike">
+                <a:solidFill>
+                  <a:srgbClr val="000000"/>
+                </a:solidFill>
+                <a:latin typeface="Arial"/>
+                <a:ea typeface="DejaVu Sans"/>
+              </a:rPr>
+              <a:t>withAccess</a:t>
+            </a:r>
+            <a:r>
+              <a:rPr b="0" lang="en-US" sz="1800" spc="-1" strike="noStrike">
+                <a:solidFill>
+                  <a:srgbClr val="000000"/>
+                </a:solidFill>
+                <a:latin typeface="Arial"/>
+                <a:ea typeface="DejaVu Sans"/>
+              </a:rPr>
+              <a:t>(request) {</a:t>
+            </a:r>
+            <a:endParaRPr b="0" lang="en-US" sz="1800" spc="-1" strike="noStrike">
+              <a:latin typeface="Arial"/>
+            </a:endParaRPr>
+          </a:p>
+          <a:p>
+            <a:pPr>
+              <a:lnSpc>
+                <a:spcPct val="100000"/>
+              </a:lnSpc>
+            </a:pPr>
+            <a:r>
+              <a:rPr b="0" lang="en-US" sz="1800" spc="-1" strike="noStrike">
+                <a:solidFill>
+                  <a:srgbClr val="000000"/>
+                </a:solidFill>
+                <a:latin typeface="Arial"/>
+                <a:ea typeface="DejaVu Sans"/>
+              </a:rPr>
+              <a:t>        </a:t>
+            </a:r>
+            <a:r>
+              <a:rPr b="0" lang="en-US" sz="1800" spc="-1" strike="noStrike">
+                <a:solidFill>
+                  <a:srgbClr val="000000"/>
+                </a:solidFill>
+                <a:latin typeface="Arial"/>
+                <a:ea typeface="DejaVu Sans"/>
+              </a:rPr>
+              <a:t>...</a:t>
+            </a:r>
+            <a:endParaRPr b="0" lang="en-US" sz="1800" spc="-1" strike="noStrike">
+              <a:latin typeface="Arial"/>
+            </a:endParaRPr>
+          </a:p>
+          <a:p>
+            <a:pPr>
+              <a:lnSpc>
+                <a:spcPct val="100000"/>
+              </a:lnSpc>
+            </a:pPr>
+            <a:r>
+              <a:rPr b="0" lang="en-US" sz="1800" spc="-1" strike="noStrike">
+                <a:solidFill>
+                  <a:srgbClr val="000000"/>
+                </a:solidFill>
+                <a:latin typeface="Arial"/>
+                <a:ea typeface="DejaVu Sans"/>
+              </a:rPr>
+              <a:t>        </a:t>
+            </a:r>
+            <a:r>
+              <a:rPr b="0" lang="en-US" sz="1800" spc="-1" strike="noStrike">
+                <a:solidFill>
+                  <a:srgbClr val="000000"/>
+                </a:solidFill>
+                <a:latin typeface="Arial"/>
+                <a:ea typeface="DejaVu Sans"/>
+              </a:rPr>
+              <a:t>return 0</a:t>
+            </a:r>
+            <a:endParaRPr b="0" lang="en-US" sz="1800" spc="-1" strike="noStrike">
+              <a:latin typeface="Arial"/>
+            </a:endParaRPr>
+          </a:p>
+          <a:p>
+            <a:pPr>
+              <a:lnSpc>
+                <a:spcPct val="100000"/>
+              </a:lnSpc>
+            </a:pPr>
+            <a:r>
+              <a:rPr b="0" lang="en-US" sz="1800" spc="-1" strike="noStrike">
+                <a:solidFill>
+                  <a:srgbClr val="000000"/>
+                </a:solidFill>
+                <a:latin typeface="Arial"/>
+                <a:ea typeface="DejaVu Sans"/>
+              </a:rPr>
+              <a:t>    </a:t>
+            </a:r>
+            <a:r>
+              <a:rPr b="0" lang="en-US" sz="1800" spc="-1" strike="noStrike">
+                <a:solidFill>
+                  <a:srgbClr val="000000"/>
+                </a:solidFill>
+                <a:latin typeface="Arial"/>
+                <a:ea typeface="DejaVu Sans"/>
+              </a:rPr>
+              <a:t>}</a:t>
+            </a:r>
+            <a:endParaRPr b="0" lang="en-US" sz="1800" spc="-1" strike="noStrike">
+              <a:latin typeface="Arial"/>
+            </a:endParaRPr>
+          </a:p>
+          <a:p>
+            <a:pPr>
+              <a:lnSpc>
+                <a:spcPct val="100000"/>
+              </a:lnSpc>
+            </a:pPr>
+            <a:endParaRPr b="0" lang="en-US" sz="1800" spc="-1" strike="noStrike">
+              <a:latin typeface="Arial"/>
+            </a:endParaRPr>
+          </a:p>
+          <a:p>
+            <a:pPr>
+              <a:lnSpc>
+                <a:spcPct val="100000"/>
+              </a:lnSpc>
+            </a:pPr>
+            <a:r>
+              <a:rPr b="0" lang="en-US" sz="1800" spc="-1" strike="noStrike">
+                <a:solidFill>
+                  <a:srgbClr val="000000"/>
+                </a:solidFill>
+                <a:latin typeface="Arial"/>
+                <a:ea typeface="DejaVu Sans"/>
+              </a:rPr>
+              <a:t>    </a:t>
+            </a:r>
+            <a:r>
+              <a:rPr b="1" lang="en-US" sz="1800" spc="-1" strike="noStrike">
+                <a:solidFill>
+                  <a:srgbClr val="182f7c"/>
+                </a:solidFill>
+                <a:latin typeface="Arial"/>
+                <a:ea typeface="DejaVu Sans"/>
+              </a:rPr>
+              <a:t>fun</a:t>
+            </a:r>
+            <a:r>
+              <a:rPr b="0" lang="en-US" sz="1800" spc="-1" strike="noStrike">
+                <a:solidFill>
+                  <a:srgbClr val="000000"/>
+                </a:solidFill>
+                <a:latin typeface="Arial"/>
+                <a:ea typeface="DejaVu Sans"/>
+              </a:rPr>
+              <a:t> deleteUser(request: Request) = </a:t>
+            </a:r>
+            <a:r>
+              <a:rPr b="1" lang="en-US" sz="1800" spc="-1" strike="noStrike">
+                <a:solidFill>
+                  <a:srgbClr val="000000"/>
+                </a:solidFill>
+                <a:latin typeface="Arial"/>
+                <a:ea typeface="DejaVu Sans"/>
+              </a:rPr>
+              <a:t>withAccess</a:t>
+            </a:r>
+            <a:r>
+              <a:rPr b="0" lang="en-US" sz="1800" spc="-1" strike="noStrike">
+                <a:solidFill>
+                  <a:srgbClr val="000000"/>
+                </a:solidFill>
+                <a:latin typeface="Arial"/>
+                <a:ea typeface="DejaVu Sans"/>
+              </a:rPr>
+              <a:t>(request) {</a:t>
+            </a:r>
+            <a:endParaRPr b="0" lang="en-US" sz="1800" spc="-1" strike="noStrike">
+              <a:latin typeface="Arial"/>
+            </a:endParaRPr>
+          </a:p>
+          <a:p>
+            <a:pPr>
+              <a:lnSpc>
+                <a:spcPct val="100000"/>
+              </a:lnSpc>
+            </a:pPr>
+            <a:r>
+              <a:rPr b="0" lang="en-US" sz="1800" spc="-1" strike="noStrike">
+                <a:solidFill>
+                  <a:srgbClr val="000000"/>
+                </a:solidFill>
+                <a:latin typeface="Arial"/>
+                <a:ea typeface="DejaVu Sans"/>
+              </a:rPr>
+              <a:t>        </a:t>
+            </a:r>
+            <a:r>
+              <a:rPr b="0" lang="en-US" sz="1800" spc="-1" strike="noStrike">
+                <a:solidFill>
+                  <a:srgbClr val="000000"/>
+                </a:solidFill>
+                <a:latin typeface="Arial"/>
+                <a:ea typeface="DejaVu Sans"/>
+              </a:rPr>
+              <a:t>...</a:t>
+            </a:r>
+            <a:endParaRPr b="0" lang="en-US" sz="1800" spc="-1" strike="noStrike">
+              <a:latin typeface="Arial"/>
+            </a:endParaRPr>
+          </a:p>
+          <a:p>
+            <a:pPr>
+              <a:lnSpc>
+                <a:spcPct val="100000"/>
+              </a:lnSpc>
+            </a:pPr>
+            <a:r>
+              <a:rPr b="0" lang="en-US" sz="1800" spc="-1" strike="noStrike">
+                <a:solidFill>
+                  <a:srgbClr val="000000"/>
+                </a:solidFill>
+                <a:latin typeface="Arial"/>
+                <a:ea typeface="DejaVu Sans"/>
+              </a:rPr>
+              <a:t>        </a:t>
+            </a:r>
+            <a:r>
+              <a:rPr b="0" lang="en-US" sz="1800" spc="-1" strike="noStrike">
+                <a:solidFill>
+                  <a:srgbClr val="000000"/>
+                </a:solidFill>
+                <a:latin typeface="Arial"/>
+                <a:ea typeface="DejaVu Sans"/>
+              </a:rPr>
+              <a:t>return 0</a:t>
+            </a:r>
+            <a:endParaRPr b="0" lang="en-US" sz="1800" spc="-1" strike="noStrike">
+              <a:latin typeface="Arial"/>
+            </a:endParaRPr>
+          </a:p>
+          <a:p>
+            <a:pPr>
+              <a:lnSpc>
+                <a:spcPct val="100000"/>
+              </a:lnSpc>
+            </a:pPr>
+            <a:r>
+              <a:rPr b="0" lang="en-US" sz="1800" spc="-1" strike="noStrike">
+                <a:solidFill>
+                  <a:srgbClr val="000000"/>
+                </a:solidFill>
+                <a:latin typeface="Arial"/>
+                <a:ea typeface="DejaVu Sans"/>
+              </a:rPr>
+              <a:t>    </a:t>
+            </a:r>
+            <a:r>
+              <a:rPr b="0" lang="en-US" sz="1800" spc="-1" strike="noStrike">
+                <a:solidFill>
+                  <a:srgbClr val="000000"/>
+                </a:solidFill>
+                <a:latin typeface="Arial"/>
+                <a:ea typeface="DejaVu Sans"/>
+              </a:rPr>
+              <a:t>}</a:t>
+            </a:r>
+            <a:endParaRPr b="0" lang="en-US" sz="1800" spc="-1" strike="noStrike">
+              <a:latin typeface="Arial"/>
+            </a:endParaRPr>
+          </a:p>
+          <a:p>
+            <a:pPr>
+              <a:lnSpc>
+                <a:spcPct val="100000"/>
+              </a:lnSpc>
+            </a:pPr>
+            <a:r>
+              <a:rPr b="0" lang="en-US" sz="1800" spc="-1" strike="noStrike">
+                <a:solidFill>
+                  <a:srgbClr val="000000"/>
+                </a:solidFill>
+                <a:latin typeface="Arial"/>
+                <a:ea typeface="DejaVu Sans"/>
+              </a:rPr>
+              <a:t>}</a:t>
+            </a:r>
+            <a:endParaRPr b="0" lang="en-US" sz="1800" spc="-1" strike="noStrike">
               <a:latin typeface="Arial"/>
             </a:endParaRPr>
           </a:p>
@@ -4708,7 +5306,7 @@
       </p:grpSpPr>
       <p:pic>
         <p:nvPicPr>
-          <p:cNvPr id="112" name="" descr=""/>
+          <p:cNvPr id="113" name="" descr=""/>
           <p:cNvPicPr/>
           <p:nvPr/>
         </p:nvPicPr>
@@ -4718,8 +5316,8 @@
         </p:blipFill>
         <p:spPr>
           <a:xfrm>
-            <a:off x="297720" y="1235520"/>
-            <a:ext cx="7474320" cy="3976200"/>
+            <a:off x="474840" y="731520"/>
+            <a:ext cx="7022520" cy="2742480"/>
           </a:xfrm>
           <a:prstGeom prst="rect">
             <a:avLst/>
@@ -4729,6 +5327,80 @@
           </a:ln>
         </p:spPr>
       </p:pic>
+      <p:sp>
+        <p:nvSpPr>
+          <p:cNvPr id="114" name="CustomShape 1"/>
+          <p:cNvSpPr/>
+          <p:nvPr/>
+        </p:nvSpPr>
+        <p:spPr>
+          <a:xfrm>
+            <a:off x="1005840" y="4206240"/>
+            <a:ext cx="3656880" cy="1645200"/>
+          </a:xfrm>
+          <a:prstGeom prst="rect">
+            <a:avLst/>
+          </a:prstGeom>
+          <a:noFill/>
+          <a:ln>
+            <a:noFill/>
+          </a:ln>
+        </p:spPr>
+        <p:style>
+          <a:lnRef idx="0"/>
+          <a:fillRef idx="0"/>
+          <a:effectRef idx="0"/>
+          <a:fontRef idx="minor"/>
+        </p:style>
+        <p:txBody>
+          <a:bodyPr lIns="90000" rIns="90000" tIns="45000" bIns="45000"/>
+          <a:p>
+            <a:r>
+              <a:rPr b="0" lang="en-US" sz="2200" spc="-1" strike="noStrike">
+                <a:solidFill>
+                  <a:srgbClr val="000000"/>
+                </a:solidFill>
+                <a:latin typeface="Arial"/>
+                <a:ea typeface="DejaVu Sans"/>
+              </a:rPr>
+              <a:t>1. [ [3, 3], [ ], [5, 5] ]</a:t>
+            </a:r>
+            <a:endParaRPr b="0" lang="en-US" sz="2200" spc="-1" strike="noStrike">
+              <a:latin typeface="Arial"/>
+            </a:endParaRPr>
+          </a:p>
+          <a:p>
+            <a:r>
+              <a:rPr b="0" lang="en-US" sz="2200" spc="-1" strike="noStrike">
+                <a:solidFill>
+                  <a:srgbClr val="000000"/>
+                </a:solidFill>
+                <a:latin typeface="Arial"/>
+                <a:ea typeface="DejaVu Sans"/>
+              </a:rPr>
+              <a:t>2. [3, 3, 5, 5]</a:t>
+            </a:r>
+            <a:endParaRPr b="0" lang="en-US" sz="2200" spc="-1" strike="noStrike">
+              <a:latin typeface="Arial"/>
+            </a:endParaRPr>
+          </a:p>
+          <a:p>
+            <a:r>
+              <a:rPr b="0" lang="en-US" sz="2200" spc="-1" strike="noStrike">
+                <a:solidFill>
+                  <a:srgbClr val="000000"/>
+                </a:solidFill>
+                <a:latin typeface="Arial"/>
+                <a:ea typeface="DejaVu Sans"/>
+              </a:rPr>
+              <a:t>3. [ ]</a:t>
+            </a:r>
+            <a:endParaRPr b="0" lang="en-US" sz="2200" spc="-1" strike="noStrike">
+              <a:latin typeface="Arial"/>
+            </a:endParaRPr>
+          </a:p>
+        </p:txBody>
+      </p:sp>
     </p:spTree>
   </p:cSld>
   <p:timing>
@@ -4780,7 +5452,7 @@
       </p:grpSpPr>
       <p:pic>
         <p:nvPicPr>
-          <p:cNvPr id="113" name="" descr=""/>
+          <p:cNvPr id="115" name="" descr=""/>
           <p:cNvPicPr/>
           <p:nvPr/>
         </p:nvPicPr>
@@ -4790,8 +5462,8 @@
         </p:blipFill>
         <p:spPr>
           <a:xfrm>
-            <a:off x="412920" y="1463040"/>
-            <a:ext cx="6993360" cy="3564720"/>
+            <a:off x="297720" y="1235520"/>
+            <a:ext cx="7473960" cy="3975840"/>
           </a:xfrm>
           <a:prstGeom prst="rect">
             <a:avLst/>
@@ -4852,7 +5524,7 @@
       </p:grpSpPr>
       <p:pic>
         <p:nvPicPr>
-          <p:cNvPr id="114" name="" descr=""/>
+          <p:cNvPr id="116" name="" descr=""/>
           <p:cNvPicPr/>
           <p:nvPr/>
         </p:nvPicPr>
@@ -4862,8 +5534,8 @@
         </p:blipFill>
         <p:spPr>
           <a:xfrm>
-            <a:off x="487440" y="1445040"/>
-            <a:ext cx="7543080" cy="3675240"/>
+            <a:off x="412920" y="1463040"/>
+            <a:ext cx="6993000" cy="3564360"/>
           </a:xfrm>
           <a:prstGeom prst="rect">
             <a:avLst/>
@@ -4924,7 +5596,7 @@
       </p:grpSpPr>
       <p:pic>
         <p:nvPicPr>
-          <p:cNvPr id="115" name="" descr=""/>
+          <p:cNvPr id="117" name="" descr=""/>
           <p:cNvPicPr/>
           <p:nvPr/>
         </p:nvPicPr>
@@ -4934,8 +5606,8 @@
         </p:blipFill>
         <p:spPr>
           <a:xfrm>
-            <a:off x="217440" y="1361160"/>
-            <a:ext cx="7737480" cy="4033440"/>
+            <a:off x="487440" y="1445040"/>
+            <a:ext cx="7542720" cy="3674880"/>
           </a:xfrm>
           <a:prstGeom prst="rect">
             <a:avLst/>
@@ -4996,7 +5668,7 @@
       </p:grpSpPr>
       <p:pic>
         <p:nvPicPr>
-          <p:cNvPr id="116" name="" descr=""/>
+          <p:cNvPr id="118" name="" descr=""/>
           <p:cNvPicPr/>
           <p:nvPr/>
         </p:nvPicPr>
@@ -5006,8 +5678,8 @@
         </p:blipFill>
         <p:spPr>
           <a:xfrm>
-            <a:off x="91440" y="1188720"/>
-            <a:ext cx="7987680" cy="4235400"/>
+            <a:off x="217440" y="1361160"/>
+            <a:ext cx="7737120" cy="4033080"/>
           </a:xfrm>
           <a:prstGeom prst="rect">
             <a:avLst/>
@@ -5068,7 +5740,7 @@
       </p:grpSpPr>
       <p:pic>
         <p:nvPicPr>
-          <p:cNvPr id="117" name="" descr=""/>
+          <p:cNvPr id="119" name="" descr=""/>
           <p:cNvPicPr/>
           <p:nvPr/>
         </p:nvPicPr>
@@ -5078,8 +5750,8 @@
         </p:blipFill>
         <p:spPr>
           <a:xfrm>
-            <a:off x="235080" y="1182960"/>
-            <a:ext cx="7761960" cy="4028760"/>
+            <a:off x="91440" y="1188720"/>
+            <a:ext cx="7987320" cy="4235040"/>
           </a:xfrm>
           <a:prstGeom prst="rect">
             <a:avLst/>
@@ -5098,6 +5770,78 @@
           <p:childTnLst>
             <p:seq>
               <p:cTn id="50" nodeType="mainSeq"/>
+              <p:prevCondLst>
+                <p:cond delay="0" evt="onPrev">
+                  <p:tgtEl>
+                    <p:sldTgt/>
+                  </p:tgtEl>
+                </p:cond>
+              </p:prevCondLst>
+              <p:nextCondLst>
+                <p:cond delay="0" evt="onNext">
+                  <p:tgtEl>
+                    <p:sldTgt/>
+                  </p:tgtEl>
+                </p:cond>
+              </p:nextCondLst>
+            </p:seq>
+          </p:childTnLst>
+        </p:cTn>
+      </p:par>
+    </p:tnLst>
+  </p:timing>
+</p:sld>
+</file>
+
+<file path=ppt/slides/slide18.xml><?xml version="1.0" encoding="utf-8"?>
+<p:sld xmlns:a="http://schemas.openxmlformats.org/drawingml/2006/main" xmlns:p="http://schemas.openxmlformats.org/presentationml/2006/main" xmlns:r="http://schemas.openxmlformats.org/officeDocument/2006/relationships" xmlns:p14="http://schemas.microsoft.com/office/powerpoint/2010/main" xmlns:p15="http://schemas.microsoft.com/office/powerpoint/2012/main" xmlns:mc="http://schemas.openxmlformats.org/markup-compatibility/2006">
+  <p:cSld>
+    <p:spTree>
+      <p:nvGrpSpPr>
+        <p:cNvPr id="1" name=""/>
+        <p:cNvGrpSpPr/>
+        <p:nvPr/>
+      </p:nvGrpSpPr>
+      <p:grpSpPr>
+        <a:xfrm>
+          <a:off x="0" y="0"/>
+          <a:ext cx="0" cy="0"/>
+          <a:chOff x="0" y="0"/>
+          <a:chExt cx="0" cy="0"/>
+        </a:xfrm>
+      </p:grpSpPr>
+      <p:pic>
+        <p:nvPicPr>
+          <p:cNvPr id="120" name="" descr=""/>
+          <p:cNvPicPr/>
+          <p:nvPr/>
+        </p:nvPicPr>
+        <p:blipFill>
+          <a:blip r:embed="rId1"/>
+          <a:stretch/>
+        </p:blipFill>
+        <p:spPr>
+          <a:xfrm>
+            <a:off x="235080" y="1182960"/>
+            <a:ext cx="7761600" cy="4028400"/>
+          </a:xfrm>
+          <a:prstGeom prst="rect">
+            <a:avLst/>
+          </a:prstGeom>
+          <a:ln>
+            <a:noFill/>
+          </a:ln>
+        </p:spPr>
+      </p:pic>
+    </p:spTree>
+  </p:cSld>
+  <p:timing>
+    <p:tnLst>
+      <p:par>
+        <p:cTn id="51" dur="indefinite" restart="never" nodeType="tmRoot">
+          <p:childTnLst>
+            <p:seq>
+              <p:cTn id="52" nodeType="mainSeq"/>
               <p:prevCondLst>
                 <p:cond delay="0" evt="onPrev">
                   <p:tgtEl>
@@ -5147,7 +5891,7 @@
         <p:spPr>
           <a:xfrm>
             <a:off x="457200" y="457200"/>
-            <a:ext cx="6856560" cy="545760"/>
+            <a:ext cx="6856200" cy="545400"/>
           </a:xfrm>
           <a:prstGeom prst="rect">
             <a:avLst/>
@@ -5198,7 +5942,7 @@
         <p:spPr>
           <a:xfrm>
             <a:off x="548640" y="1098000"/>
-            <a:ext cx="6856560" cy="1370160"/>
+            <a:ext cx="6856200" cy="1369800"/>
           </a:xfrm>
           <a:prstGeom prst="rect">
             <a:avLst/>
@@ -5349,7 +6093,7 @@
         <p:spPr>
           <a:xfrm>
             <a:off x="548640" y="3109680"/>
-            <a:ext cx="6856560" cy="1644480"/>
+            <a:ext cx="6856200" cy="1644120"/>
           </a:xfrm>
           <a:prstGeom prst="rect">
             <a:avLst/>
@@ -5677,7 +6421,7 @@
         <p:spPr>
           <a:xfrm>
             <a:off x="457200" y="457200"/>
-            <a:ext cx="6856560" cy="545760"/>
+            <a:ext cx="6856200" cy="545400"/>
           </a:xfrm>
           <a:prstGeom prst="rect">
             <a:avLst/>
@@ -5728,7 +6472,7 @@
         <p:spPr>
           <a:xfrm>
             <a:off x="548640" y="1188720"/>
-            <a:ext cx="6856560" cy="2377080"/>
+            <a:ext cx="6856200" cy="2376720"/>
           </a:xfrm>
           <a:prstGeom prst="rect">
             <a:avLst/>
@@ -6089,7 +6833,7 @@
         <p:spPr>
           <a:xfrm>
             <a:off x="458280" y="3567240"/>
-            <a:ext cx="6856560" cy="3016080"/>
+            <a:ext cx="6856200" cy="3015720"/>
           </a:xfrm>
           <a:prstGeom prst="rect">
             <a:avLst/>
@@ -6527,7 +7271,7 @@
         <p:spPr>
           <a:xfrm>
             <a:off x="457200" y="457200"/>
-            <a:ext cx="6856560" cy="545760"/>
+            <a:ext cx="6856200" cy="545400"/>
           </a:xfrm>
           <a:prstGeom prst="rect">
             <a:avLst/>
@@ -6578,7 +7322,7 @@
         <p:spPr>
           <a:xfrm>
             <a:off x="548640" y="1188720"/>
-            <a:ext cx="6856560" cy="2377080"/>
+            <a:ext cx="6856200" cy="2376720"/>
           </a:xfrm>
           <a:prstGeom prst="rect">
             <a:avLst/>
@@ -7036,7 +7780,7 @@
         <p:spPr>
           <a:xfrm>
             <a:off x="366840" y="276840"/>
-            <a:ext cx="6856560" cy="545760"/>
+            <a:ext cx="6856200" cy="545400"/>
           </a:xfrm>
           <a:prstGeom prst="rect">
             <a:avLst/>
@@ -7087,7 +7831,7 @@
         <p:spPr>
           <a:xfrm>
             <a:off x="548640" y="1005840"/>
-            <a:ext cx="6856560" cy="4663080"/>
+            <a:ext cx="6856200" cy="4662720"/>
           </a:xfrm>
           <a:prstGeom prst="rect">
             <a:avLst/>
@@ -7785,7 +8529,7 @@
         <p:spPr>
           <a:xfrm>
             <a:off x="366840" y="276840"/>
-            <a:ext cx="6856560" cy="545760"/>
+            <a:ext cx="6856200" cy="545400"/>
           </a:xfrm>
           <a:prstGeom prst="rect">
             <a:avLst/>
@@ -7836,7 +8580,7 @@
         <p:spPr>
           <a:xfrm>
             <a:off x="457200" y="1097280"/>
-            <a:ext cx="6856560" cy="1463040"/>
+            <a:ext cx="6856200" cy="1462680"/>
           </a:xfrm>
           <a:prstGeom prst="rect">
             <a:avLst/>
@@ -7857,7 +8601,7 @@
         <p:txBody>
           <a:bodyPr wrap="none" lIns="90000" rIns="90000" tIns="45000" bIns="45000" anchor="ctr"/>
           <a:p>
-            <a:endParaRPr b="1" lang="en-US" sz="1400" spc="-1" strike="noStrike">
+            <a:endParaRPr b="0" lang="en-US" sz="1800" spc="-1" strike="noStrike">
               <a:latin typeface="Arial"/>
             </a:endParaRPr>
           </a:p>
@@ -7870,198 +8614,213 @@
                 <a:latin typeface="DejaVu Sans Mono"/>
                 <a:ea typeface="DejaVu Sans Mono"/>
               </a:rPr>
-              <a:t>inline</a:t>
+              <a:t>inline fun </a:t>
             </a:r>
             <a:r>
               <a:rPr b="1" lang="en-US" sz="1400" spc="-1" strike="noStrike">
                 <a:solidFill>
-                  <a:srgbClr val="cc7832"/>
+                  <a:srgbClr val="a9b7c6"/>
                 </a:solidFill>
                 <a:latin typeface="DejaVu Sans Mono"/>
                 <a:ea typeface="DejaVu Sans Mono"/>
               </a:rPr>
-              <a:t> fun </a:t>
+              <a:t>&lt;</a:t>
             </a:r>
             <a:r>
               <a:rPr b="1" lang="en-US" sz="1400" spc="-1" strike="noStrike">
                 <a:solidFill>
-                  <a:srgbClr val="a9b7c6"/>
+                  <a:srgbClr val="20999d"/>
                 </a:solidFill>
                 <a:latin typeface="DejaVu Sans Mono"/>
                 <a:ea typeface="DejaVu Sans Mono"/>
               </a:rPr>
-              <a:t>&lt;</a:t>
+              <a:t>T</a:t>
             </a:r>
             <a:r>
               <a:rPr b="1" lang="en-US" sz="1400" spc="-1" strike="noStrike">
                 <a:solidFill>
-                  <a:srgbClr val="20999d"/>
+                  <a:srgbClr val="cc7832"/>
                 </a:solidFill>
                 <a:latin typeface="DejaVu Sans Mono"/>
                 <a:ea typeface="DejaVu Sans Mono"/>
               </a:rPr>
-              <a:t>T</a:t>
+              <a:t>, </a:t>
             </a:r>
             <a:r>
               <a:rPr b="1" lang="en-US" sz="1400" spc="-1" strike="noStrike">
                 <a:solidFill>
-                  <a:srgbClr val="cc7832"/>
+                  <a:srgbClr val="20999d"/>
                 </a:solidFill>
                 <a:latin typeface="DejaVu Sans Mono"/>
                 <a:ea typeface="DejaVu Sans Mono"/>
               </a:rPr>
-              <a:t>, </a:t>
+              <a:t>R</a:t>
             </a:r>
             <a:r>
               <a:rPr b="1" lang="en-US" sz="1400" spc="-1" strike="noStrike">
                 <a:solidFill>
-                  <a:srgbClr val="20999d"/>
+                  <a:srgbClr val="a9b7c6"/>
                 </a:solidFill>
                 <a:latin typeface="DejaVu Sans Mono"/>
                 <a:ea typeface="DejaVu Sans Mono"/>
               </a:rPr>
-              <a:t>R</a:t>
+              <a:t>&gt; </a:t>
             </a:r>
             <a:r>
               <a:rPr b="1" lang="en-US" sz="1400" spc="-1" strike="noStrike">
                 <a:solidFill>
-                  <a:srgbClr val="a9b7c6"/>
+                  <a:srgbClr val="666666"/>
                 </a:solidFill>
                 <a:latin typeface="DejaVu Sans Mono"/>
                 <a:ea typeface="DejaVu Sans Mono"/>
               </a:rPr>
-              <a:t>&gt; </a:t>
+              <a:t>Iterable</a:t>
             </a:r>
             <a:r>
               <a:rPr b="1" lang="en-US" sz="1400" spc="-1" strike="noStrike">
                 <a:solidFill>
-                  <a:srgbClr val="666666"/>
+                  <a:srgbClr val="a9b7c6"/>
                 </a:solidFill>
                 <a:latin typeface="DejaVu Sans Mono"/>
                 <a:ea typeface="DejaVu Sans Mono"/>
               </a:rPr>
-              <a:t>Iterable</a:t>
+              <a:t>&lt;</a:t>
             </a:r>
             <a:r>
               <a:rPr b="1" lang="en-US" sz="1400" spc="-1" strike="noStrike">
                 <a:solidFill>
-                  <a:srgbClr val="a9b7c6"/>
+                  <a:srgbClr val="20999d"/>
                 </a:solidFill>
                 <a:latin typeface="DejaVu Sans Mono"/>
                 <a:ea typeface="DejaVu Sans Mono"/>
               </a:rPr>
-              <a:t>&lt;</a:t>
+              <a:t>T</a:t>
             </a:r>
             <a:r>
               <a:rPr b="1" lang="en-US" sz="1400" spc="-1" strike="noStrike">
                 <a:solidFill>
-                  <a:srgbClr val="20999d"/>
+                  <a:srgbClr val="a9b7c6"/>
                 </a:solidFill>
                 <a:latin typeface="DejaVu Sans Mono"/>
                 <a:ea typeface="DejaVu Sans Mono"/>
               </a:rPr>
-              <a:t>T</a:t>
+              <a:t>&gt;.</a:t>
             </a:r>
             <a:r>
               <a:rPr b="1" lang="en-US" sz="1400" spc="-1" strike="noStrike">
                 <a:solidFill>
-                  <a:srgbClr val="a9b7c6"/>
+                  <a:srgbClr val="000000"/>
                 </a:solidFill>
                 <a:latin typeface="DejaVu Sans Mono"/>
                 <a:ea typeface="DejaVu Sans Mono"/>
               </a:rPr>
-              <a:t>&gt;.</a:t>
+              <a:t>map</a:t>
             </a:r>
             <a:r>
               <a:rPr b="1" lang="en-US" sz="1400" spc="-1" strike="noStrike">
                 <a:solidFill>
-                  <a:srgbClr val="000000"/>
+                  <a:srgbClr val="a9b7c6"/>
                 </a:solidFill>
                 <a:latin typeface="DejaVu Sans Mono"/>
                 <a:ea typeface="DejaVu Sans Mono"/>
               </a:rPr>
-              <a:t>map</a:t>
+              <a:t>(</a:t>
             </a:r>
             <a:r>
               <a:rPr b="1" lang="en-US" sz="1400" spc="-1" strike="noStrike">
                 <a:solidFill>
-                  <a:srgbClr val="a9b7c6"/>
+                  <a:srgbClr val="666666"/>
                 </a:solidFill>
                 <a:latin typeface="DejaVu Sans Mono"/>
                 <a:ea typeface="DejaVu Sans Mono"/>
               </a:rPr>
-              <a:t>(</a:t>
+              <a:t>transform</a:t>
             </a:r>
             <a:r>
               <a:rPr b="1" lang="en-US" sz="1400" spc="-1" strike="noStrike">
                 <a:solidFill>
-                  <a:srgbClr val="666666"/>
+                  <a:srgbClr val="a9b7c6"/>
                 </a:solidFill>
                 <a:latin typeface="DejaVu Sans Mono"/>
                 <a:ea typeface="DejaVu Sans Mono"/>
               </a:rPr>
-              <a:t>transform</a:t>
+              <a:t>: (</a:t>
             </a:r>
             <a:r>
               <a:rPr b="1" lang="en-US" sz="1400" spc="-1" strike="noStrike">
                 <a:solidFill>
-                  <a:srgbClr val="a9b7c6"/>
+                  <a:srgbClr val="20999d"/>
                 </a:solidFill>
                 <a:latin typeface="DejaVu Sans Mono"/>
                 <a:ea typeface="DejaVu Sans Mono"/>
               </a:rPr>
-              <a:t>: (</a:t>
+              <a:t>T</a:t>
             </a:r>
             <a:r>
               <a:rPr b="1" lang="en-US" sz="1400" spc="-1" strike="noStrike">
                 <a:solidFill>
-                  <a:srgbClr val="20999d"/>
+                  <a:srgbClr val="a9b7c6"/>
                 </a:solidFill>
                 <a:latin typeface="DejaVu Sans Mono"/>
                 <a:ea typeface="DejaVu Sans Mono"/>
               </a:rPr>
-              <a:t>T</a:t>
+              <a:t>) -&gt; </a:t>
             </a:r>
             <a:r>
               <a:rPr b="1" lang="en-US" sz="1400" spc="-1" strike="noStrike">
                 <a:solidFill>
-                  <a:srgbClr val="a9b7c6"/>
+                  <a:srgbClr val="20999d"/>
                 </a:solidFill>
                 <a:latin typeface="DejaVu Sans Mono"/>
                 <a:ea typeface="DejaVu Sans Mono"/>
               </a:rPr>
-              <a:t>) -&gt; </a:t>
+              <a:t>R</a:t>
             </a:r>
             <a:r>
               <a:rPr b="1" lang="en-US" sz="1400" spc="-1" strike="noStrike">
                 <a:solidFill>
-                  <a:srgbClr val="20999d"/>
+                  <a:srgbClr val="a9b7c6"/>
                 </a:solidFill>
                 <a:latin typeface="DejaVu Sans Mono"/>
                 <a:ea typeface="DejaVu Sans Mono"/>
               </a:rPr>
-              <a:t>R</a:t>
+              <a:t>): List&lt;</a:t>
             </a:r>
             <a:r>
               <a:rPr b="1" lang="en-US" sz="1400" spc="-1" strike="noStrike">
                 <a:solidFill>
-                  <a:srgbClr val="a9b7c6"/>
+                  <a:srgbClr val="20999d"/>
                 </a:solidFill>
                 <a:latin typeface="DejaVu Sans Mono"/>
                 <a:ea typeface="DejaVu Sans Mono"/>
               </a:rPr>
-              <a:t>): List&lt;</a:t>
+              <a:t>R</a:t>
             </a:r>
             <a:r>
               <a:rPr b="1" lang="en-US" sz="1400" spc="-1" strike="noStrike">
                 <a:solidFill>
-                  <a:srgbClr val="20999d"/>
+                  <a:srgbClr val="a9b7c6"/>
                 </a:solidFill>
                 <a:latin typeface="DejaVu Sans Mono"/>
                 <a:ea typeface="DejaVu Sans Mono"/>
               </a:rPr>
-              <a:t>R</a:t>
-            </a:r>
+              <a:t>&gt;</a:t>
+            </a:r>
+            <a:endParaRPr b="0" lang="en-US" sz="1400" spc="-1" strike="noStrike">
+              <a:latin typeface="Arial"/>
+            </a:endParaRPr>
+          </a:p>
+          <a:p>
+            <a:endParaRPr b="0" lang="en-US" sz="1400" spc="-1" strike="noStrike">
+              <a:latin typeface="Arial"/>
+            </a:endParaRPr>
+          </a:p>
+          <a:p>
+            <a:endParaRPr b="0" lang="en-US" sz="1400" spc="-1" strike="noStrike">
+              <a:latin typeface="Arial"/>
+            </a:endParaRPr>
+          </a:p>
+          <a:p>
             <a:r>
               <a:rPr b="1" lang="en-US" sz="1400" spc="-1" strike="noStrike">
                 <a:solidFill>
@@ -8070,139 +8829,114 @@
                 <a:latin typeface="DejaVu Sans Mono"/>
                 <a:ea typeface="DejaVu Sans Mono"/>
               </a:rPr>
-              <a:t>&gt;</a:t>
+              <a:t>// kotlin</a:t>
             </a:r>
             <a:endParaRPr b="0" lang="en-US" sz="1400" spc="-1" strike="noStrike">
               <a:latin typeface="Arial"/>
             </a:endParaRPr>
           </a:p>
           <a:p>
-            <a:endParaRPr b="1" lang="en-US" sz="1400" spc="-1" strike="noStrike">
-              <a:latin typeface="Arial"/>
-            </a:endParaRPr>
-          </a:p>
-          <a:p>
-            <a:endParaRPr b="1" lang="en-US" sz="1400" spc="-1" strike="noStrike">
-              <a:latin typeface="Arial"/>
-            </a:endParaRPr>
-          </a:p>
-          <a:p>
-            <a:r>
-              <a:rPr b="1" lang="en-US" sz="1400" spc="-1" strike="noStrike">
-                <a:solidFill>
-                  <a:srgbClr val="a9b7c6"/>
+            <a:endParaRPr b="0" lang="en-US" sz="1400" spc="-1" strike="noStrike">
+              <a:latin typeface="Arial"/>
+            </a:endParaRPr>
+          </a:p>
+          <a:p>
+            <a:r>
+              <a:rPr b="1" i="1" lang="en-US" sz="1400" spc="-1" strike="noStrike">
+                <a:solidFill>
+                  <a:srgbClr val="666666"/>
                 </a:solidFill>
                 <a:latin typeface="DejaVu Sans Mono"/>
                 <a:ea typeface="DejaVu Sans Mono"/>
               </a:rPr>
-              <a:t>// kotlin</a:t>
-            </a:r>
-            <a:endParaRPr b="1" lang="en-US" sz="1400" spc="-1" strike="noStrike">
-              <a:latin typeface="Arial"/>
-            </a:endParaRPr>
-          </a:p>
-          <a:p>
-            <a:endParaRPr b="1" lang="en-US" sz="1400" spc="-1" strike="noStrike">
-              <a:latin typeface="Arial"/>
-            </a:endParaRPr>
-          </a:p>
-          <a:p>
-            <a:r>
-              <a:rPr b="1" i="1" lang="en-US" sz="1400" spc="-1" strike="noStrike">
-                <a:solidFill>
-                  <a:srgbClr val="666666"/>
+              <a:t>listOf</a:t>
+            </a:r>
+            <a:r>
+              <a:rPr b="1" lang="en-US" sz="1400" spc="-1" strike="noStrike">
+                <a:solidFill>
+                  <a:srgbClr val="a9b7c6"/>
                 </a:solidFill>
                 <a:latin typeface="DejaVu Sans Mono"/>
                 <a:ea typeface="DejaVu Sans Mono"/>
               </a:rPr>
-              <a:t>listOf</a:t>
+              <a:t>(</a:t>
             </a:r>
             <a:r>
               <a:rPr b="1" lang="en-US" sz="1400" spc="-1" strike="noStrike">
                 <a:solidFill>
-                  <a:srgbClr val="a9b7c6"/>
+                  <a:srgbClr val="6897bb"/>
                 </a:solidFill>
                 <a:latin typeface="DejaVu Sans Mono"/>
                 <a:ea typeface="DejaVu Sans Mono"/>
               </a:rPr>
-              <a:t>(</a:t>
+              <a:t>1</a:t>
             </a:r>
             <a:r>
               <a:rPr b="1" lang="en-US" sz="1400" spc="-1" strike="noStrike">
                 <a:solidFill>
-                  <a:srgbClr val="6897bb"/>
+                  <a:srgbClr val="cc7832"/>
                 </a:solidFill>
                 <a:latin typeface="DejaVu Sans Mono"/>
                 <a:ea typeface="DejaVu Sans Mono"/>
               </a:rPr>
-              <a:t>1</a:t>
+              <a:t>,</a:t>
             </a:r>
             <a:r>
               <a:rPr b="1" lang="en-US" sz="1400" spc="-1" strike="noStrike">
                 <a:solidFill>
-                  <a:srgbClr val="cc7832"/>
+                  <a:srgbClr val="6897bb"/>
                 </a:solidFill>
                 <a:latin typeface="DejaVu Sans Mono"/>
                 <a:ea typeface="DejaVu Sans Mono"/>
               </a:rPr>
-              <a:t>,</a:t>
+              <a:t>2</a:t>
             </a:r>
             <a:r>
               <a:rPr b="1" lang="en-US" sz="1400" spc="-1" strike="noStrike">
                 <a:solidFill>
-                  <a:srgbClr val="6897bb"/>
+                  <a:srgbClr val="a9b7c6"/>
                 </a:solidFill>
                 <a:latin typeface="DejaVu Sans Mono"/>
                 <a:ea typeface="DejaVu Sans Mono"/>
               </a:rPr>
-              <a:t>2</a:t>
-            </a:r>
-            <a:r>
-              <a:rPr b="1" lang="en-US" sz="1400" spc="-1" strike="noStrike">
-                <a:solidFill>
-                  <a:srgbClr val="a9b7c6"/>
+              <a:t>).</a:t>
+            </a:r>
+            <a:r>
+              <a:rPr b="1" i="1" lang="en-US" sz="1400" spc="-1" strike="noStrike">
+                <a:solidFill>
+                  <a:srgbClr val="000000"/>
                 </a:solidFill>
                 <a:latin typeface="DejaVu Sans Mono"/>
                 <a:ea typeface="DejaVu Sans Mono"/>
               </a:rPr>
-              <a:t>).</a:t>
+              <a:t>map</a:t>
             </a:r>
             <a:r>
               <a:rPr b="1" i="1" lang="en-US" sz="1400" spc="-1" strike="noStrike">
                 <a:solidFill>
-                  <a:srgbClr val="000000"/>
+                  <a:srgbClr val="ffc66d"/>
                 </a:solidFill>
                 <a:latin typeface="DejaVu Sans Mono"/>
                 <a:ea typeface="DejaVu Sans Mono"/>
               </a:rPr>
-              <a:t>map</a:t>
-            </a:r>
-            <a:r>
-              <a:rPr b="1" i="1" lang="en-US" sz="1400" spc="-1" strike="noStrike">
-                <a:solidFill>
-                  <a:srgbClr val="ffc66d"/>
+              <a:t> </a:t>
+            </a:r>
+            <a:r>
+              <a:rPr b="1" lang="en-US" sz="1400" spc="-1" strike="noStrike">
+                <a:solidFill>
+                  <a:srgbClr val="666666"/>
                 </a:solidFill>
                 <a:latin typeface="DejaVu Sans Mono"/>
                 <a:ea typeface="DejaVu Sans Mono"/>
               </a:rPr>
-              <a:t> </a:t>
-            </a:r>
-            <a:r>
-              <a:rPr b="1" lang="en-US" sz="1400" spc="-1" strike="noStrike">
-                <a:solidFill>
-                  <a:srgbClr val="666666"/>
-                </a:solidFill>
-                <a:latin typeface="DejaVu Sans Mono"/>
-                <a:ea typeface="DejaVu Sans Mono"/>
-              </a:rPr>
               <a:t>{ it + it }</a:t>
             </a:r>
-            <a:endParaRPr b="1" lang="en-US" sz="1400" spc="-1" strike="noStrike">
-              <a:latin typeface="Arial"/>
-            </a:endParaRPr>
-          </a:p>
-          <a:p>
-            <a:endParaRPr b="1" lang="en-US" sz="1400" spc="-1" strike="noStrike">
+            <a:endParaRPr b="0" lang="en-US" sz="1400" spc="-1" strike="noStrike">
+              <a:latin typeface="Arial"/>
+            </a:endParaRPr>
+          </a:p>
+          <a:p>
+            <a:endParaRPr b="0" lang="en-US" sz="1400" spc="-1" strike="noStrike">
               <a:latin typeface="Arial"/>
             </a:endParaRPr>
           </a:p>
@@ -8217,7 +8951,7 @@
         <p:spPr>
           <a:xfrm>
             <a:off x="609840" y="3137400"/>
-            <a:ext cx="6613920" cy="2714760"/>
+            <a:ext cx="6613560" cy="2714400"/>
           </a:xfrm>
           <a:prstGeom prst="rect">
             <a:avLst/>
@@ -8238,12 +8972,8 @@
         <p:txBody>
           <a:bodyPr wrap="none" lIns="0" rIns="0" tIns="0" bIns="0"/>
           <a:p>
-            <a:endParaRPr b="1" lang="en-US" sz="1400" spc="-1" strike="noStrike">
-              <a:solidFill>
-                <a:srgbClr val="666666"/>
-              </a:solidFill>
-              <a:latin typeface="DejaVu Sans Mono"/>
-              <a:ea typeface="DejaVu Sans Mono"/>
+            <a:endParaRPr b="0" lang="en-US" sz="1800" spc="-1" strike="noStrike">
+              <a:latin typeface="Arial"/>
             </a:endParaRPr>
           </a:p>
           <a:p>
@@ -8253,24 +8983,17 @@
                   <a:srgbClr val="666666"/>
                 </a:solidFill>
                 <a:latin typeface="DejaVu Sans Mono"/>
+                <a:ea typeface="DejaVu Sans"/>
               </a:rPr>
               <a:t>// decompiled java</a:t>
             </a:r>
-            <a:endParaRPr b="1" lang="en-US" sz="1400" spc="-1" strike="noStrike">
-              <a:solidFill>
-                <a:srgbClr val="666666"/>
-              </a:solidFill>
-              <a:latin typeface="DejaVu Sans Mono"/>
-              <a:ea typeface="DejaVu Sans Mono"/>
-            </a:endParaRPr>
-          </a:p>
-          <a:p>
-            <a:endParaRPr b="1" lang="en-US" sz="1400" spc="-1" strike="noStrike">
-              <a:solidFill>
-                <a:srgbClr val="666666"/>
-              </a:solidFill>
-              <a:latin typeface="DejaVu Sans Mono"/>
-              <a:ea typeface="DejaVu Sans Mono"/>
+            <a:endParaRPr b="0" lang="en-US" sz="1400" spc="-1" strike="noStrike">
+              <a:latin typeface="Arial"/>
+            </a:endParaRPr>
+          </a:p>
+          <a:p>
+            <a:endParaRPr b="0" lang="en-US" sz="1400" spc="-1" strike="noStrike">
+              <a:latin typeface="Arial"/>
             </a:endParaRPr>
           </a:p>
           <a:p>
@@ -8280,6 +9003,7 @@
                   <a:srgbClr val="666666"/>
                 </a:solidFill>
                 <a:latin typeface="DejaVu Sans Mono"/>
+                <a:ea typeface="DejaVu Sans"/>
               </a:rPr>
               <a:t>Iterable receiver = CollectionsKt.listOf(new Integer[]{1, 2});</a:t>
             </a:r>
@@ -8290,6 +9014,7 @@
                   <a:srgbClr val="666666"/>
                 </a:solidFill>
                 <a:latin typeface="DejaVu Sans Mono"/>
+                <a:ea typeface="DejaVu Sans"/>
               </a:rPr>
               <a:t>Collection destination = new ArrayList(...);</a:t>
             </a:r>
@@ -8300,6 +9025,7 @@
                   <a:srgbClr val="666666"/>
                 </a:solidFill>
                 <a:latin typeface="DejaVu Sans Mono"/>
+                <a:ea typeface="DejaVu Sans"/>
               </a:rPr>
               <a:t>Iterator iterator = receiver.iterator();</a:t>
             </a:r>
@@ -8311,6 +9037,7 @@
                   <a:srgbClr val="666666"/>
                 </a:solidFill>
                 <a:latin typeface="DejaVu Sans Mono"/>
+                <a:ea typeface="DejaVu Sans"/>
               </a:rPr>
               <a:t>while(iterator.hasNext()) {</a:t>
             </a:r>
@@ -8321,6 +9048,7 @@
                   <a:srgbClr val="666666"/>
                 </a:solidFill>
                 <a:latin typeface="DejaVu Sans Mono"/>
+                <a:ea typeface="DejaVu Sans"/>
               </a:rPr>
               <a:t>   Object item = iterator.next();</a:t>
             </a:r>
@@ -8331,6 +9059,7 @@
                   <a:srgbClr val="666666"/>
                 </a:solidFill>
                 <a:latin typeface="DejaVu Sans Mono"/>
+                <a:ea typeface="DejaVu Sans"/>
               </a:rPr>
               <a:t>   int it = ((Number)item).intValue();</a:t>
             </a:r>
@@ -8341,6 +9070,7 @@
                   <a:srgbClr val="666666"/>
                 </a:solidFill>
                 <a:latin typeface="DejaVu Sans Mono"/>
+                <a:ea typeface="DejaVu Sans"/>
               </a:rPr>
               <a:t>   destination.add(it + it);</a:t>
             </a:r>
@@ -8351,16 +9081,13 @@
                   <a:srgbClr val="666666"/>
                 </a:solidFill>
                 <a:latin typeface="DejaVu Sans Mono"/>
+                <a:ea typeface="DejaVu Sans"/>
               </a:rPr>
               <a:t>}</a:t>
             </a:r>
             <a:br/>
-            <a:endParaRPr b="1" lang="en-US" sz="1400" spc="-1" strike="noStrike">
-              <a:solidFill>
-                <a:srgbClr val="666666"/>
-              </a:solidFill>
-              <a:latin typeface="DejaVu Sans Mono"/>
-              <a:ea typeface="DejaVu Sans Mono"/>
+            <a:endParaRPr b="0" lang="en-US" sz="1400" spc="-1" strike="noStrike">
+              <a:latin typeface="Arial"/>
             </a:endParaRPr>
           </a:p>
         </p:txBody>
@@ -8423,7 +9150,7 @@
         <p:spPr>
           <a:xfrm>
             <a:off x="366840" y="276840"/>
-            <a:ext cx="6856560" cy="545760"/>
+            <a:ext cx="6856200" cy="545400"/>
           </a:xfrm>
           <a:prstGeom prst="rect">
             <a:avLst/>
@@ -8473,8 +9200,8 @@
         </p:nvSpPr>
         <p:spPr>
           <a:xfrm>
-            <a:off x="549720" y="1005840"/>
-            <a:ext cx="6856560" cy="4937400"/>
+            <a:off x="457200" y="1097280"/>
+            <a:ext cx="6856200" cy="1462680"/>
           </a:xfrm>
           <a:prstGeom prst="rect">
             <a:avLst/>
@@ -8495,512 +9222,273 @@
         <p:txBody>
           <a:bodyPr wrap="none" lIns="90000" rIns="90000" tIns="45000" bIns="45000" anchor="ctr"/>
           <a:p>
-            <a:pPr>
-              <a:lnSpc>
-                <a:spcPct val="100000"/>
-              </a:lnSpc>
-            </a:pPr>
-            <a:endParaRPr b="0" lang="en-US" sz="1800" spc="-1" strike="noStrike">
-              <a:latin typeface="Arial"/>
-            </a:endParaRPr>
-          </a:p>
-          <a:p>
-            <a:pPr>
-              <a:lnSpc>
-                <a:spcPct val="100000"/>
-              </a:lnSpc>
-            </a:pPr>
-            <a:r>
-              <a:rPr b="0" lang="en-US" sz="1800" spc="-1" strike="noStrike">
-                <a:solidFill>
-                  <a:srgbClr val="000000"/>
-                </a:solidFill>
-                <a:latin typeface="Arial"/>
-                <a:ea typeface="DejaVu Sans"/>
-              </a:rPr>
-              <a:t>class Controller {</a:t>
-            </a:r>
-            <a:endParaRPr b="0" lang="en-US" sz="1800" spc="-1" strike="noStrike">
-              <a:latin typeface="Arial"/>
-            </a:endParaRPr>
-          </a:p>
-          <a:p>
-            <a:pPr>
-              <a:lnSpc>
-                <a:spcPct val="100000"/>
-              </a:lnSpc>
-            </a:pPr>
-            <a:endParaRPr b="0" lang="en-US" sz="1800" spc="-1" strike="noStrike">
-              <a:latin typeface="Arial"/>
-            </a:endParaRPr>
-          </a:p>
-          <a:p>
-            <a:pPr>
-              <a:lnSpc>
-                <a:spcPct val="100000"/>
-              </a:lnSpc>
-            </a:pPr>
-            <a:r>
-              <a:rPr b="0" lang="en-US" sz="1800" spc="-1" strike="noStrike">
-                <a:solidFill>
-                  <a:srgbClr val="000000"/>
-                </a:solidFill>
-                <a:latin typeface="Arial"/>
-                <a:ea typeface="DejaVu Sans"/>
-              </a:rPr>
-              <a:t>    </a:t>
-            </a:r>
+            <a:endParaRPr b="0" lang="en-US" sz="1400" spc="-1" strike="noStrike">
+              <a:latin typeface="Arial"/>
+            </a:endParaRPr>
+          </a:p>
+          <a:p>
+            <a:r>
+              <a:rPr b="1" lang="en-US" sz="1400" spc="-1" strike="noStrike">
+                <a:solidFill>
+                  <a:srgbClr val="cc7832"/>
+                </a:solidFill>
+                <a:latin typeface="DejaVu Sans Mono"/>
+                <a:ea typeface="DejaVu Sans Mono"/>
+              </a:rPr>
+              <a:t>inline fun </a:t>
+            </a:r>
+            <a:r>
+              <a:rPr b="1" lang="en-US" sz="1400" spc="-1" strike="noStrike">
+                <a:solidFill>
+                  <a:srgbClr val="a9b7c6"/>
+                </a:solidFill>
+                <a:latin typeface="DejaVu Sans Mono"/>
+                <a:ea typeface="DejaVu Sans Mono"/>
+              </a:rPr>
+              <a:t>CharSequence.</a:t>
+            </a:r>
+            <a:r>
+              <a:rPr b="1" lang="en-US" sz="1400" spc="-1" strike="noStrike">
+                <a:solidFill>
+                  <a:srgbClr val="ffc66d"/>
+                </a:solidFill>
+                <a:latin typeface="DejaVu Sans Mono"/>
+                <a:ea typeface="DejaVu Sans Mono"/>
+              </a:rPr>
+              <a:t>replace</a:t>
+            </a:r>
+            <a:r>
+              <a:rPr b="1" lang="en-US" sz="1400" spc="-1" strike="noStrike">
+                <a:solidFill>
+                  <a:srgbClr val="a9b7c6"/>
+                </a:solidFill>
+                <a:latin typeface="DejaVu Sans Mono"/>
+                <a:ea typeface="DejaVu Sans Mono"/>
+              </a:rPr>
+              <a:t>(</a:t>
+            </a:r>
+            <a:endParaRPr b="0" lang="en-US" sz="1400" spc="-1" strike="noStrike">
+              <a:latin typeface="Arial"/>
+            </a:endParaRPr>
+          </a:p>
+          <a:p>
+            <a:r>
+              <a:rPr b="1" lang="en-US" sz="1400" spc="-1" strike="noStrike">
+                <a:solidFill>
+                  <a:srgbClr val="a9b7c6"/>
+                </a:solidFill>
+                <a:latin typeface="DejaVu Sans Mono"/>
+                <a:ea typeface="DejaVu Sans Mono"/>
+              </a:rPr>
+              <a:t>	</a:t>
+            </a:r>
+            <a:r>
+              <a:rPr b="1" lang="en-US" sz="1400" spc="-1" strike="noStrike">
+                <a:solidFill>
+                  <a:srgbClr val="a9b7c6"/>
+                </a:solidFill>
+                <a:latin typeface="DejaVu Sans Mono"/>
+                <a:ea typeface="DejaVu Sans Mono"/>
+              </a:rPr>
+              <a:t>regex: Regex</a:t>
+            </a:r>
+            <a:r>
+              <a:rPr b="1" lang="en-US" sz="1400" spc="-1" strike="noStrike">
+                <a:solidFill>
+                  <a:srgbClr val="cc7832"/>
+                </a:solidFill>
+                <a:latin typeface="DejaVu Sans Mono"/>
+                <a:ea typeface="DejaVu Sans Mono"/>
+              </a:rPr>
+              <a:t>, </a:t>
+            </a:r>
+            <a:endParaRPr b="0" lang="en-US" sz="1400" spc="-1" strike="noStrike">
+              <a:latin typeface="Arial"/>
+            </a:endParaRPr>
+          </a:p>
+          <a:p>
+            <a:r>
+              <a:rPr b="1" lang="en-US" sz="1400" spc="-1" strike="noStrike">
+                <a:solidFill>
+                  <a:srgbClr val="cc7832"/>
+                </a:solidFill>
+                <a:latin typeface="DejaVu Sans Mono"/>
+                <a:ea typeface="DejaVu Sans Mono"/>
+              </a:rPr>
+              <a:t>	</a:t>
+            </a:r>
+            <a:r>
+              <a:rPr b="1" lang="en-US" sz="1400" spc="-1" strike="noStrike">
+                <a:solidFill>
+                  <a:srgbClr val="cc7832"/>
+                </a:solidFill>
+                <a:latin typeface="DejaVu Sans Mono"/>
+                <a:ea typeface="DejaVu Sans Mono"/>
+              </a:rPr>
+              <a:t>noinline </a:t>
+            </a:r>
+            <a:r>
+              <a:rPr b="1" lang="en-US" sz="1400" spc="-1" strike="noStrike">
+                <a:solidFill>
+                  <a:srgbClr val="a9b7c6"/>
+                </a:solidFill>
+                <a:latin typeface="DejaVu Sans Mono"/>
+                <a:ea typeface="DejaVu Sans Mono"/>
+              </a:rPr>
+              <a:t>transform: (MatchResult) -&gt; CharSequence): String {</a:t>
+            </a:r>
+            <a:endParaRPr b="0" lang="en-US" sz="1400" spc="-1" strike="noStrike">
+              <a:latin typeface="Arial"/>
+            </a:endParaRPr>
+          </a:p>
+          <a:p>
+            <a:endParaRPr b="0" lang="en-US" sz="1400" spc="-1" strike="noStrike">
+              <a:latin typeface="Arial"/>
+            </a:endParaRPr>
+          </a:p>
+          <a:p>
+            <a:r>
+              <a:rPr b="1" lang="en-US" sz="1400" spc="-1" strike="noStrike">
+                <a:solidFill>
+                  <a:srgbClr val="808080"/>
+                </a:solidFill>
+                <a:latin typeface="DejaVu Sans Mono"/>
+                <a:ea typeface="DejaVu Sans Mono"/>
+              </a:rPr>
+              <a:t>	</a:t>
+            </a:r>
+            <a:r>
+              <a:rPr b="1" lang="en-US" sz="1400" spc="-1" strike="noStrike">
+                <a:solidFill>
+                  <a:srgbClr val="808080"/>
+                </a:solidFill>
+                <a:latin typeface="DejaVu Sans Mono"/>
+                <a:ea typeface="DejaVu Sans Mono"/>
+              </a:rPr>
+              <a:t>// passing to a normal function</a:t>
+            </a:r>
+            <a:endParaRPr b="0" lang="en-US" sz="1400" spc="-1" strike="noStrike">
+              <a:latin typeface="Arial"/>
+            </a:endParaRPr>
+          </a:p>
+          <a:p>
+            <a:r>
+              <a:rPr b="1" lang="en-US" sz="1400" spc="-1" strike="noStrike">
+                <a:solidFill>
+                  <a:srgbClr val="a9b7c6"/>
+                </a:solidFill>
+                <a:latin typeface="DejaVu Sans Mono"/>
+                <a:ea typeface="DejaVu Sans Mono"/>
+              </a:rPr>
+              <a:t>	</a:t>
+            </a:r>
+            <a:r>
+              <a:rPr b="1" lang="en-US" sz="1400" spc="-1" strike="noStrike">
+                <a:solidFill>
+                  <a:srgbClr val="a9b7c6"/>
+                </a:solidFill>
+                <a:latin typeface="DejaVu Sans Mono"/>
+                <a:ea typeface="DejaVu Sans Mono"/>
+              </a:rPr>
+              <a:t>return regex.replace(</a:t>
+            </a:r>
+            <a:r>
+              <a:rPr b="1" lang="en-US" sz="1400" spc="-1" strike="noStrike">
+                <a:solidFill>
+                  <a:srgbClr val="cc7832"/>
+                </a:solidFill>
+                <a:latin typeface="DejaVu Sans Mono"/>
+                <a:ea typeface="DejaVu Sans Mono"/>
+              </a:rPr>
+              <a:t>this, </a:t>
+            </a:r>
+            <a:r>
+              <a:rPr b="1" lang="en-US" sz="1400" spc="-1" strike="noStrike">
+                <a:solidFill>
+                  <a:srgbClr val="a9b7c6"/>
+                </a:solidFill>
+                <a:latin typeface="DejaVu Sans Mono"/>
+                <a:ea typeface="DejaVu Sans Mono"/>
+              </a:rPr>
+              <a:t>transform) </a:t>
+            </a:r>
+            <a:endParaRPr b="0" lang="en-US" sz="1400" spc="-1" strike="noStrike">
+              <a:latin typeface="Arial"/>
+            </a:endParaRPr>
+          </a:p>
+          <a:p>
+            <a:r>
+              <a:rPr b="1" lang="en-US" sz="1400" spc="-1" strike="noStrike">
+                <a:solidFill>
+                  <a:srgbClr val="a9b7c6"/>
+                </a:solidFill>
+                <a:latin typeface="DejaVu Sans Mono"/>
+                <a:ea typeface="DejaVu Sans Mono"/>
+              </a:rPr>
+              <a:t>}        </a:t>
+            </a:r>
+            <a:endParaRPr b="0" lang="en-US" sz="1400" spc="-1" strike="noStrike">
+              <a:latin typeface="Arial"/>
+            </a:endParaRPr>
+          </a:p>
+          <a:p>
+            <a:endParaRPr b="0" lang="en-US" sz="1400" spc="-1" strike="noStrike">
+              <a:latin typeface="Arial"/>
+            </a:endParaRPr>
+          </a:p>
+        </p:txBody>
+      </p:sp>
+      <p:sp>
+        <p:nvSpPr>
+          <p:cNvPr id="104" name="TextShape 3"/>
+          <p:cNvSpPr txBox="1"/>
+          <p:nvPr/>
+        </p:nvSpPr>
+        <p:spPr>
+          <a:xfrm>
+            <a:off x="548640" y="3291840"/>
+            <a:ext cx="7131600" cy="1645920"/>
+          </a:xfrm>
+          <a:prstGeom prst="rect">
+            <a:avLst/>
+          </a:prstGeom>
+          <a:noFill/>
+          <a:ln>
+            <a:noFill/>
+          </a:ln>
+        </p:spPr>
+        <p:txBody>
+          <a:bodyPr lIns="90000" rIns="90000" tIns="45000" bIns="45000"/>
+          <a:p>
             <a:r>
               <a:rPr b="1" lang="en-US" sz="1800" spc="-1" strike="noStrike">
-                <a:solidFill>
-                  <a:srgbClr val="182f7c"/>
-                </a:solidFill>
-                <a:latin typeface="Arial"/>
-                <a:ea typeface="DejaVu Sans"/>
-              </a:rPr>
-              <a:t>fun</a:t>
-            </a:r>
-            <a:r>
-              <a:rPr b="0" lang="en-US" sz="1800" spc="-1" strike="noStrike">
-                <a:solidFill>
-                  <a:srgbClr val="000000"/>
-                </a:solidFill>
-                <a:latin typeface="Arial"/>
-                <a:ea typeface="DejaVu Sans"/>
-              </a:rPr>
-              <a:t> blockUser(request: Request): Int {</a:t>
-            </a:r>
-            <a:endParaRPr b="0" lang="en-US" sz="1800" spc="-1" strike="noStrike">
-              <a:latin typeface="Arial"/>
-            </a:endParaRPr>
-          </a:p>
-          <a:p>
-            <a:pPr>
-              <a:lnSpc>
-                <a:spcPct val="100000"/>
-              </a:lnSpc>
-            </a:pPr>
-            <a:r>
-              <a:rPr b="1" i="1" lang="en-US" sz="1800" spc="-1" strike="noStrike">
-                <a:solidFill>
-                  <a:srgbClr val="000000"/>
-                </a:solidFill>
-                <a:latin typeface="Arial"/>
-                <a:ea typeface="DejaVu Sans"/>
-              </a:rPr>
-              <a:t>        </a:t>
-            </a:r>
-            <a:r>
-              <a:rPr b="1" i="1" lang="en-US" sz="1800" spc="-1" strike="noStrike">
-                <a:solidFill>
-                  <a:srgbClr val="000000"/>
-                </a:solidFill>
-                <a:latin typeface="Arial"/>
-                <a:ea typeface="DejaVu Sans"/>
-              </a:rPr>
-              <a:t>if (!request.hasAccess()) {</a:t>
-            </a:r>
-            <a:endParaRPr b="0" lang="en-US" sz="1800" spc="-1" strike="noStrike">
-              <a:latin typeface="Arial"/>
-            </a:endParaRPr>
-          </a:p>
-          <a:p>
-            <a:pPr>
-              <a:lnSpc>
-                <a:spcPct val="100000"/>
-              </a:lnSpc>
-            </a:pPr>
-            <a:r>
-              <a:rPr b="1" i="1" lang="en-US" sz="1800" spc="-1" strike="noStrike">
-                <a:solidFill>
-                  <a:srgbClr val="000000"/>
-                </a:solidFill>
-                <a:latin typeface="Arial"/>
-                <a:ea typeface="DejaVu Sans"/>
-              </a:rPr>
-              <a:t>            </a:t>
-            </a:r>
-            <a:r>
-              <a:rPr b="1" i="1" lang="en-US" sz="1800" spc="-1" strike="noStrike">
-                <a:solidFill>
-                  <a:srgbClr val="000000"/>
-                </a:solidFill>
-                <a:latin typeface="Arial"/>
-                <a:ea typeface="DejaVu Sans"/>
-              </a:rPr>
-              <a:t>println("No access")</a:t>
-            </a:r>
-            <a:endParaRPr b="0" lang="en-US" sz="1800" spc="-1" strike="noStrike">
-              <a:latin typeface="Arial"/>
-            </a:endParaRPr>
-          </a:p>
-          <a:p>
-            <a:pPr>
-              <a:lnSpc>
-                <a:spcPct val="100000"/>
-              </a:lnSpc>
-            </a:pPr>
-            <a:r>
-              <a:rPr b="1" i="1" lang="en-US" sz="1800" spc="-1" strike="noStrike">
-                <a:solidFill>
-                  <a:srgbClr val="000000"/>
-                </a:solidFill>
-                <a:latin typeface="Arial"/>
-                <a:ea typeface="DejaVu Sans"/>
-              </a:rPr>
-              <a:t>            </a:t>
-            </a:r>
-            <a:r>
-              <a:rPr b="1" i="1" lang="en-US" sz="1800" spc="-1" strike="noStrike">
-                <a:solidFill>
-                  <a:srgbClr val="000000"/>
-                </a:solidFill>
-                <a:latin typeface="Arial"/>
-                <a:ea typeface="DejaVu Sans"/>
-              </a:rPr>
-              <a:t>return -1</a:t>
-            </a:r>
-            <a:endParaRPr b="0" lang="en-US" sz="1800" spc="-1" strike="noStrike">
-              <a:latin typeface="Arial"/>
-            </a:endParaRPr>
-          </a:p>
-          <a:p>
-            <a:pPr>
-              <a:lnSpc>
-                <a:spcPct val="100000"/>
-              </a:lnSpc>
-            </a:pPr>
-            <a:r>
-              <a:rPr b="1" i="1" lang="en-US" sz="1800" spc="-1" strike="noStrike">
-                <a:solidFill>
-                  <a:srgbClr val="000000"/>
-                </a:solidFill>
-                <a:latin typeface="Arial"/>
-                <a:ea typeface="DejaVu Sans"/>
-              </a:rPr>
-              <a:t>        </a:t>
-            </a:r>
-            <a:r>
-              <a:rPr b="1" i="1" lang="en-US" sz="1800" spc="-1" strike="noStrike">
-                <a:solidFill>
-                  <a:srgbClr val="000000"/>
-                </a:solidFill>
-                <a:latin typeface="Arial"/>
-                <a:ea typeface="DejaVu Sans"/>
-              </a:rPr>
-              <a:t>}</a:t>
-            </a:r>
-            <a:endParaRPr b="0" lang="en-US" sz="1800" spc="-1" strike="noStrike">
-              <a:latin typeface="Arial"/>
-            </a:endParaRPr>
-          </a:p>
-          <a:p>
-            <a:pPr>
-              <a:lnSpc>
-                <a:spcPct val="100000"/>
-              </a:lnSpc>
-            </a:pPr>
-            <a:r>
-              <a:rPr b="0" lang="en-US" sz="1800" spc="-1" strike="noStrike">
-                <a:solidFill>
-                  <a:srgbClr val="000000"/>
-                </a:solidFill>
-                <a:latin typeface="Arial"/>
-                <a:ea typeface="DejaVu Sans"/>
-              </a:rPr>
-              <a:t>        </a:t>
-            </a:r>
-            <a:r>
-              <a:rPr b="0" lang="en-US" sz="1800" spc="-1" strike="noStrike">
-                <a:solidFill>
-                  <a:srgbClr val="000000"/>
-                </a:solidFill>
-                <a:latin typeface="Arial"/>
-                <a:ea typeface="DejaVu Sans"/>
-              </a:rPr>
-              <a:t>...</a:t>
-            </a:r>
-            <a:endParaRPr b="0" lang="en-US" sz="1800" spc="-1" strike="noStrike">
-              <a:latin typeface="Arial"/>
-            </a:endParaRPr>
-          </a:p>
-          <a:p>
-            <a:pPr>
-              <a:lnSpc>
-                <a:spcPct val="100000"/>
-              </a:lnSpc>
-            </a:pPr>
-            <a:r>
-              <a:rPr b="0" lang="en-US" sz="1800" spc="-1" strike="noStrike">
-                <a:solidFill>
-                  <a:srgbClr val="000000"/>
-                </a:solidFill>
-                <a:latin typeface="Arial"/>
-                <a:ea typeface="DejaVu Sans"/>
-              </a:rPr>
-              <a:t>    </a:t>
-            </a:r>
-            <a:r>
-              <a:rPr b="0" lang="en-US" sz="1800" spc="-1" strike="noStrike">
-                <a:solidFill>
-                  <a:srgbClr val="000000"/>
-                </a:solidFill>
-                <a:latin typeface="Arial"/>
-                <a:ea typeface="DejaVu Sans"/>
-              </a:rPr>
-              <a:t>}</a:t>
-            </a:r>
-            <a:endParaRPr b="0" lang="en-US" sz="1800" spc="-1" strike="noStrike">
-              <a:latin typeface="Arial"/>
-            </a:endParaRPr>
-          </a:p>
-          <a:p>
-            <a:pPr>
-              <a:lnSpc>
-                <a:spcPct val="100000"/>
-              </a:lnSpc>
-            </a:pPr>
-            <a:endParaRPr b="0" lang="en-US" sz="1800" spc="-1" strike="noStrike">
-              <a:latin typeface="Arial"/>
-            </a:endParaRPr>
-          </a:p>
-          <a:p>
-            <a:pPr>
-              <a:lnSpc>
-                <a:spcPct val="100000"/>
-              </a:lnSpc>
-            </a:pPr>
-            <a:r>
-              <a:rPr b="0" lang="en-US" sz="1800" spc="-1" strike="noStrike">
-                <a:solidFill>
-                  <a:srgbClr val="000000"/>
-                </a:solidFill>
-                <a:latin typeface="Arial"/>
-                <a:ea typeface="DejaVu Sans"/>
-              </a:rPr>
-              <a:t>    </a:t>
-            </a:r>
+                <a:latin typeface="Arial"/>
+              </a:rPr>
+              <a:t>we can inline functions with lambda parameters only if </a:t>
+            </a:r>
+            <a:endParaRPr b="1" lang="en-US" sz="1800" spc="-1" strike="noStrike">
+              <a:latin typeface="Arial"/>
+            </a:endParaRPr>
+          </a:p>
+          <a:p>
             <a:r>
               <a:rPr b="1" lang="en-US" sz="1800" spc="-1" strike="noStrike">
-                <a:solidFill>
-                  <a:srgbClr val="182f7c"/>
-                </a:solidFill>
-                <a:latin typeface="Arial"/>
-                <a:ea typeface="DejaVu Sans"/>
-              </a:rPr>
-              <a:t>fun</a:t>
-            </a:r>
-            <a:r>
-              <a:rPr b="0" lang="en-US" sz="1800" spc="-1" strike="noStrike">
-                <a:solidFill>
-                  <a:srgbClr val="000000"/>
-                </a:solidFill>
-                <a:latin typeface="Arial"/>
-                <a:ea typeface="DejaVu Sans"/>
-              </a:rPr>
-              <a:t> deleteUser(request: Request): Int {</a:t>
-            </a:r>
-            <a:endParaRPr b="0" lang="en-US" sz="1800" spc="-1" strike="noStrike">
-              <a:latin typeface="Arial"/>
-            </a:endParaRPr>
-          </a:p>
-          <a:p>
-            <a:pPr>
-              <a:lnSpc>
-                <a:spcPct val="100000"/>
-              </a:lnSpc>
-            </a:pPr>
-            <a:r>
-              <a:rPr b="1" i="1" lang="en-US" sz="1800" spc="-1" strike="noStrike">
-                <a:solidFill>
-                  <a:srgbClr val="000000"/>
-                </a:solidFill>
-                <a:latin typeface="Arial"/>
-                <a:ea typeface="DejaVu Sans"/>
-              </a:rPr>
-              <a:t>        </a:t>
-            </a:r>
-            <a:r>
-              <a:rPr b="1" i="1" lang="en-US" sz="1800" spc="-1" strike="noStrike">
-                <a:solidFill>
-                  <a:srgbClr val="000000"/>
-                </a:solidFill>
-                <a:latin typeface="Arial"/>
-                <a:ea typeface="DejaVu Sans"/>
-              </a:rPr>
-              <a:t>if (!request.hasAccess()) {</a:t>
-            </a:r>
-            <a:endParaRPr b="0" lang="en-US" sz="1800" spc="-1" strike="noStrike">
-              <a:latin typeface="Arial"/>
-            </a:endParaRPr>
-          </a:p>
-          <a:p>
-            <a:pPr>
-              <a:lnSpc>
-                <a:spcPct val="100000"/>
-              </a:lnSpc>
-            </a:pPr>
-            <a:r>
-              <a:rPr b="1" i="1" lang="en-US" sz="1800" spc="-1" strike="noStrike">
-                <a:solidFill>
-                  <a:srgbClr val="000000"/>
-                </a:solidFill>
-                <a:latin typeface="Arial"/>
-                <a:ea typeface="DejaVu Sans"/>
-              </a:rPr>
-              <a:t>            </a:t>
-            </a:r>
-            <a:r>
-              <a:rPr b="1" i="1" lang="en-US" sz="1800" spc="-1" strike="noStrike">
-                <a:solidFill>
-                  <a:srgbClr val="000000"/>
-                </a:solidFill>
-                <a:latin typeface="Arial"/>
-                <a:ea typeface="DejaVu Sans"/>
-              </a:rPr>
-              <a:t>println("No access")</a:t>
-            </a:r>
-            <a:endParaRPr b="0" lang="en-US" sz="1800" spc="-1" strike="noStrike">
-              <a:latin typeface="Arial"/>
-            </a:endParaRPr>
-          </a:p>
-          <a:p>
-            <a:pPr>
-              <a:lnSpc>
-                <a:spcPct val="100000"/>
-              </a:lnSpc>
-            </a:pPr>
-            <a:r>
-              <a:rPr b="1" i="1" lang="en-US" sz="1800" spc="-1" strike="noStrike">
-                <a:solidFill>
-                  <a:srgbClr val="000000"/>
-                </a:solidFill>
-                <a:latin typeface="Arial"/>
-                <a:ea typeface="DejaVu Sans"/>
-              </a:rPr>
-              <a:t>            </a:t>
-            </a:r>
-            <a:r>
-              <a:rPr b="1" i="1" lang="en-US" sz="1800" spc="-1" strike="noStrike">
-                <a:solidFill>
-                  <a:srgbClr val="000000"/>
-                </a:solidFill>
-                <a:latin typeface="Arial"/>
-                <a:ea typeface="DejaVu Sans"/>
-              </a:rPr>
-              <a:t>return -1</a:t>
-            </a:r>
-            <a:endParaRPr b="0" lang="en-US" sz="1800" spc="-1" strike="noStrike">
-              <a:latin typeface="Arial"/>
-            </a:endParaRPr>
-          </a:p>
-          <a:p>
-            <a:pPr>
-              <a:lnSpc>
-                <a:spcPct val="100000"/>
-              </a:lnSpc>
-            </a:pPr>
-            <a:r>
-              <a:rPr b="1" i="1" lang="en-US" sz="1800" spc="-1" strike="noStrike">
-                <a:solidFill>
-                  <a:srgbClr val="000000"/>
-                </a:solidFill>
-                <a:latin typeface="Arial"/>
-                <a:ea typeface="DejaVu Sans"/>
-              </a:rPr>
-              <a:t>        </a:t>
-            </a:r>
-            <a:r>
-              <a:rPr b="1" i="1" lang="en-US" sz="1800" spc="-1" strike="noStrike">
-                <a:solidFill>
-                  <a:srgbClr val="000000"/>
-                </a:solidFill>
-                <a:latin typeface="Arial"/>
-                <a:ea typeface="DejaVu Sans"/>
-              </a:rPr>
-              <a:t>}</a:t>
-            </a:r>
-            <a:endParaRPr b="0" lang="en-US" sz="1800" spc="-1" strike="noStrike">
-              <a:latin typeface="Arial"/>
-            </a:endParaRPr>
-          </a:p>
-          <a:p>
-            <a:pPr>
-              <a:lnSpc>
-                <a:spcPct val="100000"/>
-              </a:lnSpc>
-            </a:pPr>
-            <a:r>
-              <a:rPr b="0" lang="en-US" sz="1800" spc="-1" strike="noStrike">
-                <a:solidFill>
-                  <a:srgbClr val="000000"/>
-                </a:solidFill>
-                <a:latin typeface="Arial"/>
-                <a:ea typeface="DejaVu Sans"/>
-              </a:rPr>
-              <a:t>        </a:t>
-            </a:r>
-            <a:r>
-              <a:rPr b="0" lang="en-US" sz="1800" spc="-1" strike="noStrike">
-                <a:solidFill>
-                  <a:srgbClr val="000000"/>
-                </a:solidFill>
-                <a:latin typeface="Arial"/>
-                <a:ea typeface="DejaVu Sans"/>
-              </a:rPr>
-              <a:t>...</a:t>
-            </a:r>
-            <a:endParaRPr b="0" lang="en-US" sz="1800" spc="-1" strike="noStrike">
-              <a:latin typeface="Arial"/>
-            </a:endParaRPr>
-          </a:p>
-          <a:p>
-            <a:pPr>
-              <a:lnSpc>
-                <a:spcPct val="100000"/>
-              </a:lnSpc>
-            </a:pPr>
-            <a:r>
-              <a:rPr b="0" lang="en-US" sz="1800" spc="-1" strike="noStrike">
-                <a:solidFill>
-                  <a:srgbClr val="000000"/>
-                </a:solidFill>
-                <a:latin typeface="Arial"/>
-                <a:ea typeface="DejaVu Sans"/>
-              </a:rPr>
-              <a:t>    </a:t>
-            </a:r>
-            <a:r>
-              <a:rPr b="0" lang="en-US" sz="1800" spc="-1" strike="noStrike">
-                <a:solidFill>
-                  <a:srgbClr val="000000"/>
-                </a:solidFill>
-                <a:latin typeface="Arial"/>
-                <a:ea typeface="DejaVu Sans"/>
-              </a:rPr>
-              <a:t>}</a:t>
-            </a:r>
-            <a:endParaRPr b="0" lang="en-US" sz="1800" spc="-1" strike="noStrike">
-              <a:latin typeface="Arial"/>
-            </a:endParaRPr>
-          </a:p>
-          <a:p>
-            <a:pPr>
-              <a:lnSpc>
-                <a:spcPct val="100000"/>
-              </a:lnSpc>
-            </a:pPr>
-            <a:r>
-              <a:rPr b="0" lang="en-US" sz="1800" spc="-1" strike="noStrike">
-                <a:solidFill>
-                  <a:srgbClr val="000000"/>
-                </a:solidFill>
-                <a:latin typeface="Arial"/>
-                <a:ea typeface="DejaVu Sans"/>
-              </a:rPr>
-              <a:t>}</a:t>
-            </a:r>
-            <a:endParaRPr b="0" lang="en-US" sz="1800" spc="-1" strike="noStrike">
+                <a:latin typeface="Arial"/>
+              </a:rPr>
+              <a:t>-  the lambda is either called directly </a:t>
+            </a:r>
+            <a:endParaRPr b="1" lang="en-US" sz="1800" spc="-1" strike="noStrike">
+              <a:latin typeface="Arial"/>
+            </a:endParaRPr>
+          </a:p>
+          <a:p>
+            <a:r>
+              <a:rPr b="1" lang="en-US" sz="1800" spc="-1" strike="noStrike">
+                <a:latin typeface="Arial"/>
+              </a:rPr>
+              <a:t>-  or passed to another inline function</a:t>
+            </a:r>
+            <a:endParaRPr b="1" lang="en-US" sz="1800" spc="-1" strike="noStrike">
               <a:latin typeface="Arial"/>
             </a:endParaRPr>
           </a:p>
@@ -9057,14 +9545,14 @@
       </p:grpSpPr>
       <p:sp>
         <p:nvSpPr>
-          <p:cNvPr id="104" name="CustomShape 1"/>
+          <p:cNvPr id="105" name="CustomShape 1"/>
           <p:cNvSpPr/>
           <p:nvPr/>
         </p:nvSpPr>
         <p:spPr>
           <a:xfrm>
             <a:off x="366840" y="276840"/>
-            <a:ext cx="6856560" cy="545760"/>
+            <a:ext cx="6856200" cy="545400"/>
           </a:xfrm>
           <a:prstGeom prst="rect">
             <a:avLst/>
@@ -9108,14 +9596,14 @@
       </p:sp>
       <p:sp>
         <p:nvSpPr>
-          <p:cNvPr id="105" name="CustomShape 2"/>
+          <p:cNvPr id="106" name="CustomShape 2"/>
           <p:cNvSpPr/>
           <p:nvPr/>
         </p:nvSpPr>
         <p:spPr>
           <a:xfrm>
             <a:off x="549720" y="1005840"/>
-            <a:ext cx="6856560" cy="5303160"/>
+            <a:ext cx="6856200" cy="4937040"/>
           </a:xfrm>
           <a:prstGeom prst="rect">
             <a:avLst/>
@@ -9141,6 +9629,16 @@
                 <a:spcPct val="100000"/>
               </a:lnSpc>
             </a:pPr>
+            <a:endParaRPr b="0" lang="en-US" sz="1800" spc="-1" strike="noStrike">
+              <a:latin typeface="Arial"/>
+            </a:endParaRPr>
+          </a:p>
+          <a:p>
+            <a:pPr>
+              <a:lnSpc>
+                <a:spcPct val="100000"/>
+              </a:lnSpc>
+            </a:pPr>
             <a:r>
               <a:rPr b="0" lang="en-US" sz="1800" spc="-1" strike="noStrike">
                 <a:solidFill>
@@ -9182,16 +9680,6 @@
               <a:t>    </a:t>
             </a:r>
             <a:r>
-              <a:rPr b="0" lang="en-US" sz="1800" spc="-1" strike="noStrike">
-                <a:solidFill>
-                  <a:srgbClr val="000000"/>
-                </a:solidFill>
-                <a:latin typeface="Arial"/>
-                <a:ea typeface="DejaVu Sans"/>
-              </a:rPr>
-              <a:t>private </a:t>
-            </a:r>
-            <a:r>
               <a:rPr b="1" lang="en-US" sz="1800" spc="-1" strike="noStrike">
                 <a:solidFill>
                   <a:srgbClr val="182f7c"/>
@@ -9209,7 +9697,7 @@
                 <a:latin typeface="Arial"/>
                 <a:ea typeface="DejaVu Sans"/>
               </a:rPr>
-              <a:t> checkAcess(request: Request): Int {</a:t>
+              <a:t> blockUser(request: Request): Int {</a:t>
             </a:r>
             <a:endParaRPr b="0" lang="en-US" sz="1800" spc="-1" strike="noStrike">
               <a:latin typeface="Arial"/>
@@ -9342,6 +9830,116 @@
               </a:lnSpc>
             </a:pPr>
             <a:r>
+              <a:rPr b="0" lang="en-US" sz="1800" spc="-1" strike="noStrike">
+                <a:solidFill>
+                  <a:srgbClr val="000000"/>
+                </a:solidFill>
+                <a:latin typeface="Arial"/>
+                <a:ea typeface="DejaVu Sans"/>
+              </a:rPr>
+              <a:t>        </a:t>
+            </a:r>
+            <a:r>
+              <a:rPr b="0" lang="en-US" sz="1800" spc="-1" strike="noStrike">
+                <a:solidFill>
+                  <a:srgbClr val="000000"/>
+                </a:solidFill>
+                <a:latin typeface="Arial"/>
+                <a:ea typeface="DejaVu Sans"/>
+              </a:rPr>
+              <a:t>...</a:t>
+            </a:r>
+            <a:endParaRPr b="0" lang="en-US" sz="1800" spc="-1" strike="noStrike">
+              <a:latin typeface="Arial"/>
+            </a:endParaRPr>
+          </a:p>
+          <a:p>
+            <a:pPr>
+              <a:lnSpc>
+                <a:spcPct val="100000"/>
+              </a:lnSpc>
+            </a:pPr>
+            <a:r>
+              <a:rPr b="0" lang="en-US" sz="1800" spc="-1" strike="noStrike">
+                <a:solidFill>
+                  <a:srgbClr val="000000"/>
+                </a:solidFill>
+                <a:latin typeface="Arial"/>
+                <a:ea typeface="DejaVu Sans"/>
+              </a:rPr>
+              <a:t>    </a:t>
+            </a:r>
+            <a:r>
+              <a:rPr b="0" lang="en-US" sz="1800" spc="-1" strike="noStrike">
+                <a:solidFill>
+                  <a:srgbClr val="000000"/>
+                </a:solidFill>
+                <a:latin typeface="Arial"/>
+                <a:ea typeface="DejaVu Sans"/>
+              </a:rPr>
+              <a:t>}</a:t>
+            </a:r>
+            <a:endParaRPr b="0" lang="en-US" sz="1800" spc="-1" strike="noStrike">
+              <a:latin typeface="Arial"/>
+            </a:endParaRPr>
+          </a:p>
+          <a:p>
+            <a:pPr>
+              <a:lnSpc>
+                <a:spcPct val="100000"/>
+              </a:lnSpc>
+            </a:pPr>
+            <a:endParaRPr b="0" lang="en-US" sz="1800" spc="-1" strike="noStrike">
+              <a:latin typeface="Arial"/>
+            </a:endParaRPr>
+          </a:p>
+          <a:p>
+            <a:pPr>
+              <a:lnSpc>
+                <a:spcPct val="100000"/>
+              </a:lnSpc>
+            </a:pPr>
+            <a:r>
+              <a:rPr b="0" lang="en-US" sz="1800" spc="-1" strike="noStrike">
+                <a:solidFill>
+                  <a:srgbClr val="000000"/>
+                </a:solidFill>
+                <a:latin typeface="Arial"/>
+                <a:ea typeface="DejaVu Sans"/>
+              </a:rPr>
+              <a:t>    </a:t>
+            </a:r>
+            <a:r>
+              <a:rPr b="1" lang="en-US" sz="1800" spc="-1" strike="noStrike">
+                <a:solidFill>
+                  <a:srgbClr val="182f7c"/>
+                </a:solidFill>
+                <a:latin typeface="Arial"/>
+                <a:ea typeface="DejaVu Sans"/>
+              </a:rPr>
+              <a:t>fun</a:t>
+            </a:r>
+            <a:r>
+              <a:rPr b="0" lang="en-US" sz="1800" spc="-1" strike="noStrike">
+                <a:solidFill>
+                  <a:srgbClr val="000000"/>
+                </a:solidFill>
+                <a:latin typeface="Arial"/>
+                <a:ea typeface="DejaVu Sans"/>
+              </a:rPr>
+              <a:t> deleteUser(request: Request): Int {</a:t>
+            </a:r>
+            <a:endParaRPr b="0" lang="en-US" sz="1800" spc="-1" strike="noStrike">
+              <a:latin typeface="Arial"/>
+            </a:endParaRPr>
+          </a:p>
+          <a:p>
+            <a:pPr>
+              <a:lnSpc>
+                <a:spcPct val="100000"/>
+              </a:lnSpc>
+            </a:pPr>
+            <a:r>
               <a:rPr b="1" i="1" lang="en-US" sz="1800" spc="-1" strike="noStrike">
                 <a:solidFill>
                   <a:srgbClr val="000000"/>
@@ -9349,7 +9947,7 @@
                 <a:latin typeface="Arial"/>
                 <a:ea typeface="DejaVu Sans"/>
               </a:rPr>
-              <a:t>	</a:t>
+              <a:t>        </a:t>
             </a:r>
             <a:r>
               <a:rPr b="1" i="1" lang="en-US" sz="1800" spc="-1" strike="noStrike">
@@ -9359,30 +9957,90 @@
                 <a:latin typeface="Arial"/>
                 <a:ea typeface="DejaVu Sans"/>
               </a:rPr>
-              <a:t>return 0</a:t>
-            </a:r>
-            <a:endParaRPr b="0" lang="en-US" sz="1800" spc="-1" strike="noStrike">
-              <a:latin typeface="Arial"/>
-            </a:endParaRPr>
-          </a:p>
-          <a:p>
-            <a:pPr>
-              <a:lnSpc>
-                <a:spcPct val="100000"/>
-              </a:lnSpc>
-            </a:pPr>
-            <a:r>
-              <a:rPr b="0" lang="en-US" sz="1800" spc="-1" strike="noStrike">
-                <a:solidFill>
-                  <a:srgbClr val="000000"/>
-                </a:solidFill>
-                <a:latin typeface="Arial"/>
-                <a:ea typeface="DejaVu Sans"/>
-              </a:rPr>
-              <a:t>    </a:t>
-            </a:r>
-            <a:r>
-              <a:rPr b="0" lang="en-US" sz="1800" spc="-1" strike="noStrike">
+              <a:t>if (!request.hasAccess()) {</a:t>
+            </a:r>
+            <a:endParaRPr b="0" lang="en-US" sz="1800" spc="-1" strike="noStrike">
+              <a:latin typeface="Arial"/>
+            </a:endParaRPr>
+          </a:p>
+          <a:p>
+            <a:pPr>
+              <a:lnSpc>
+                <a:spcPct val="100000"/>
+              </a:lnSpc>
+            </a:pPr>
+            <a:r>
+              <a:rPr b="1" i="1" lang="en-US" sz="1800" spc="-1" strike="noStrike">
+                <a:solidFill>
+                  <a:srgbClr val="000000"/>
+                </a:solidFill>
+                <a:latin typeface="Arial"/>
+                <a:ea typeface="DejaVu Sans"/>
+              </a:rPr>
+              <a:t>            </a:t>
+            </a:r>
+            <a:r>
+              <a:rPr b="1" i="1" lang="en-US" sz="1800" spc="-1" strike="noStrike">
+                <a:solidFill>
+                  <a:srgbClr val="000000"/>
+                </a:solidFill>
+                <a:latin typeface="Arial"/>
+                <a:ea typeface="DejaVu Sans"/>
+              </a:rPr>
+              <a:t>println("No access")</a:t>
+            </a:r>
+            <a:endParaRPr b="0" lang="en-US" sz="1800" spc="-1" strike="noStrike">
+              <a:latin typeface="Arial"/>
+            </a:endParaRPr>
+          </a:p>
+          <a:p>
+            <a:pPr>
+              <a:lnSpc>
+                <a:spcPct val="100000"/>
+              </a:lnSpc>
+            </a:pPr>
+            <a:r>
+              <a:rPr b="1" i="1" lang="en-US" sz="1800" spc="-1" strike="noStrike">
+                <a:solidFill>
+                  <a:srgbClr val="000000"/>
+                </a:solidFill>
+                <a:latin typeface="Arial"/>
+                <a:ea typeface="DejaVu Sans"/>
+              </a:rPr>
+              <a:t>            </a:t>
+            </a:r>
+            <a:r>
+              <a:rPr b="1" i="1" lang="en-US" sz="1800" spc="-1" strike="noStrike">
+                <a:solidFill>
+                  <a:srgbClr val="000000"/>
+                </a:solidFill>
+                <a:latin typeface="Arial"/>
+                <a:ea typeface="DejaVu Sans"/>
+              </a:rPr>
+              <a:t>return -1</a:t>
+            </a:r>
+            <a:endParaRPr b="0" lang="en-US" sz="1800" spc="-1" strike="noStrike">
+              <a:latin typeface="Arial"/>
+            </a:endParaRPr>
+          </a:p>
+          <a:p>
+            <a:pPr>
+              <a:lnSpc>
+                <a:spcPct val="100000"/>
+              </a:lnSpc>
+            </a:pPr>
+            <a:r>
+              <a:rPr b="1" i="1" lang="en-US" sz="1800" spc="-1" strike="noStrike">
+                <a:solidFill>
+                  <a:srgbClr val="000000"/>
+                </a:solidFill>
+                <a:latin typeface="Arial"/>
+                <a:ea typeface="DejaVu Sans"/>
+              </a:rPr>
+              <a:t>        </a:t>
+            </a:r>
+            <a:r>
+              <a:rPr b="1" i="1" lang="en-US" sz="1800" spc="-1" strike="noStrike">
                 <a:solidFill>
                   <a:srgbClr val="000000"/>
                 </a:solidFill>
@@ -9390,246 +10048,6 @@
                 <a:ea typeface="DejaVu Sans"/>
               </a:rPr>
               <a:t>}</a:t>
-            </a:r>
-            <a:endParaRPr b="0" lang="en-US" sz="1800" spc="-1" strike="noStrike">
-              <a:latin typeface="Arial"/>
-            </a:endParaRPr>
-          </a:p>
-          <a:p>
-            <a:pPr>
-              <a:lnSpc>
-                <a:spcPct val="100000"/>
-              </a:lnSpc>
-            </a:pPr>
-            <a:endParaRPr b="0" lang="en-US" sz="1800" spc="-1" strike="noStrike">
-              <a:latin typeface="Arial"/>
-            </a:endParaRPr>
-          </a:p>
-          <a:p>
-            <a:pPr>
-              <a:lnSpc>
-                <a:spcPct val="100000"/>
-              </a:lnSpc>
-            </a:pPr>
-            <a:r>
-              <a:rPr b="0" lang="en-US" sz="1800" spc="-1" strike="noStrike">
-                <a:solidFill>
-                  <a:srgbClr val="000000"/>
-                </a:solidFill>
-                <a:latin typeface="Arial"/>
-                <a:ea typeface="DejaVu Sans"/>
-              </a:rPr>
-              <a:t>    </a:t>
-            </a:r>
-            <a:r>
-              <a:rPr b="1" lang="en-US" sz="1800" spc="-1" strike="noStrike">
-                <a:solidFill>
-                  <a:srgbClr val="182f7c"/>
-                </a:solidFill>
-                <a:latin typeface="Arial"/>
-                <a:ea typeface="DejaVu Sans"/>
-              </a:rPr>
-              <a:t>fun</a:t>
-            </a:r>
-            <a:r>
-              <a:rPr b="0" lang="en-US" sz="1800" spc="-1" strike="noStrike">
-                <a:solidFill>
-                  <a:srgbClr val="000000"/>
-                </a:solidFill>
-                <a:latin typeface="Arial"/>
-                <a:ea typeface="DejaVu Sans"/>
-              </a:rPr>
-              <a:t> blockUser(request: Request): Int {</a:t>
-            </a:r>
-            <a:endParaRPr b="0" lang="en-US" sz="1800" spc="-1" strike="noStrike">
-              <a:latin typeface="Arial"/>
-            </a:endParaRPr>
-          </a:p>
-          <a:p>
-            <a:pPr>
-              <a:lnSpc>
-                <a:spcPct val="100000"/>
-              </a:lnSpc>
-            </a:pPr>
-            <a:r>
-              <a:rPr b="0" lang="en-US" sz="1800" spc="-1" strike="noStrike">
-                <a:solidFill>
-                  <a:srgbClr val="000000"/>
-                </a:solidFill>
-                <a:latin typeface="Arial"/>
-                <a:ea typeface="DejaVu Sans"/>
-              </a:rPr>
-              <a:t>	</a:t>
-            </a:r>
-            <a:r>
-              <a:rPr b="1" lang="en-US" sz="1800" spc="-1" strike="noStrike">
-                <a:solidFill>
-                  <a:srgbClr val="000000"/>
-                </a:solidFill>
-                <a:latin typeface="Arial"/>
-                <a:ea typeface="DejaVu Sans"/>
-              </a:rPr>
-              <a:t>checkAcess</a:t>
-            </a:r>
-            <a:r>
-              <a:rPr b="0" lang="en-US" sz="1800" spc="-1" strike="noStrike">
-                <a:solidFill>
-                  <a:srgbClr val="000000"/>
-                </a:solidFill>
-                <a:latin typeface="Arial"/>
-                <a:ea typeface="DejaVu Sans"/>
-              </a:rPr>
-              <a:t>(request)</a:t>
-            </a:r>
-            <a:endParaRPr b="0" lang="en-US" sz="1800" spc="-1" strike="noStrike">
-              <a:latin typeface="Arial"/>
-            </a:endParaRPr>
-          </a:p>
-          <a:p>
-            <a:pPr>
-              <a:lnSpc>
-                <a:spcPct val="100000"/>
-              </a:lnSpc>
-            </a:pPr>
-            <a:r>
-              <a:rPr b="0" lang="en-US" sz="1800" spc="-1" strike="noStrike">
-                <a:solidFill>
-                  <a:srgbClr val="000000"/>
-                </a:solidFill>
-                <a:latin typeface="Arial"/>
-                <a:ea typeface="DejaVu Sans"/>
-              </a:rPr>
-              <a:t>        </a:t>
-            </a:r>
-            <a:r>
-              <a:rPr b="0" lang="en-US" sz="1800" spc="-1" strike="noStrike">
-                <a:solidFill>
-                  <a:srgbClr val="000000"/>
-                </a:solidFill>
-                <a:latin typeface="Arial"/>
-                <a:ea typeface="DejaVu Sans"/>
-              </a:rPr>
-              <a:t>...</a:t>
-            </a:r>
-            <a:endParaRPr b="0" lang="en-US" sz="1800" spc="-1" strike="noStrike">
-              <a:latin typeface="Arial"/>
-            </a:endParaRPr>
-          </a:p>
-          <a:p>
-            <a:pPr>
-              <a:lnSpc>
-                <a:spcPct val="100000"/>
-              </a:lnSpc>
-            </a:pPr>
-            <a:r>
-              <a:rPr b="0" lang="en-US" sz="1800" spc="-1" strike="noStrike">
-                <a:solidFill>
-                  <a:srgbClr val="000000"/>
-                </a:solidFill>
-                <a:latin typeface="Arial"/>
-                <a:ea typeface="DejaVu Sans"/>
-              </a:rPr>
-              <a:t>    </a:t>
-            </a:r>
-            <a:r>
-              <a:rPr b="0" lang="en-US" sz="1800" spc="-1" strike="noStrike">
-                <a:solidFill>
-                  <a:srgbClr val="000000"/>
-                </a:solidFill>
-                <a:latin typeface="Arial"/>
-                <a:ea typeface="DejaVu Sans"/>
-              </a:rPr>
-              <a:t>}</a:t>
-            </a:r>
-            <a:endParaRPr b="0" lang="en-US" sz="1800" spc="-1" strike="noStrike">
-              <a:latin typeface="Arial"/>
-            </a:endParaRPr>
-          </a:p>
-          <a:p>
-            <a:pPr>
-              <a:lnSpc>
-                <a:spcPct val="100000"/>
-              </a:lnSpc>
-            </a:pPr>
-            <a:endParaRPr b="0" lang="en-US" sz="1800" spc="-1" strike="noStrike">
-              <a:latin typeface="Arial"/>
-            </a:endParaRPr>
-          </a:p>
-          <a:p>
-            <a:pPr>
-              <a:lnSpc>
-                <a:spcPct val="100000"/>
-              </a:lnSpc>
-            </a:pPr>
-            <a:r>
-              <a:rPr b="0" lang="en-US" sz="1800" spc="-1" strike="noStrike">
-                <a:solidFill>
-                  <a:srgbClr val="000000"/>
-                </a:solidFill>
-                <a:latin typeface="Arial"/>
-                <a:ea typeface="DejaVu Sans"/>
-              </a:rPr>
-              <a:t>    </a:t>
-            </a:r>
-            <a:r>
-              <a:rPr b="1" lang="en-US" sz="1800" spc="-1" strike="noStrike">
-                <a:solidFill>
-                  <a:srgbClr val="182f7c"/>
-                </a:solidFill>
-                <a:latin typeface="Arial"/>
-                <a:ea typeface="DejaVu Sans"/>
-              </a:rPr>
-              <a:t>fun</a:t>
-            </a:r>
-            <a:r>
-              <a:rPr b="0" lang="en-US" sz="1800" spc="-1" strike="noStrike">
-                <a:solidFill>
-                  <a:srgbClr val="000000"/>
-                </a:solidFill>
-                <a:latin typeface="Arial"/>
-                <a:ea typeface="DejaVu Sans"/>
-              </a:rPr>
-              <a:t> deleteUser(request: Request): Int {</a:t>
-            </a:r>
-            <a:endParaRPr b="0" lang="en-US" sz="1800" spc="-1" strike="noStrike">
-              <a:latin typeface="Arial"/>
-            </a:endParaRPr>
-          </a:p>
-          <a:p>
-            <a:pPr>
-              <a:lnSpc>
-                <a:spcPct val="100000"/>
-              </a:lnSpc>
-            </a:pPr>
-            <a:r>
-              <a:rPr b="0" lang="en-US" sz="1800" spc="-1" strike="noStrike">
-                <a:solidFill>
-                  <a:srgbClr val="000000"/>
-                </a:solidFill>
-                <a:latin typeface="Arial"/>
-                <a:ea typeface="DejaVu Sans"/>
-              </a:rPr>
-              <a:t>	</a:t>
-            </a:r>
-            <a:r>
-              <a:rPr b="1" lang="en-US" sz="1800" spc="-1" strike="noStrike">
-                <a:solidFill>
-                  <a:srgbClr val="000000"/>
-                </a:solidFill>
-                <a:latin typeface="Arial"/>
-                <a:ea typeface="DejaVu Sans"/>
-              </a:rPr>
-              <a:t>checkAcess</a:t>
-            </a:r>
-            <a:r>
-              <a:rPr b="0" lang="en-US" sz="1800" spc="-1" strike="noStrike">
-                <a:solidFill>
-                  <a:srgbClr val="000000"/>
-                </a:solidFill>
-                <a:latin typeface="Arial"/>
-                <a:ea typeface="DejaVu Sans"/>
-              </a:rPr>
-              <a:t>(request)</a:t>
             </a:r>
             <a:endParaRPr b="0" lang="en-US" sz="1800" spc="-1" strike="noStrike">
               <a:latin typeface="Arial"/>
@@ -9768,14 +10186,14 @@
       </p:grpSpPr>
       <p:sp>
         <p:nvSpPr>
-          <p:cNvPr id="106" name="CustomShape 1"/>
+          <p:cNvPr id="107" name="CustomShape 1"/>
           <p:cNvSpPr/>
           <p:nvPr/>
         </p:nvSpPr>
         <p:spPr>
           <a:xfrm>
             <a:off x="366840" y="276840"/>
-            <a:ext cx="6856560" cy="545760"/>
+            <a:ext cx="6856200" cy="545400"/>
           </a:xfrm>
           <a:prstGeom prst="rect">
             <a:avLst/>
@@ -9819,14 +10237,14 @@
       </p:sp>
       <p:sp>
         <p:nvSpPr>
-          <p:cNvPr id="107" name="CustomShape 2"/>
+          <p:cNvPr id="108" name="CustomShape 2"/>
           <p:cNvSpPr/>
           <p:nvPr/>
         </p:nvSpPr>
         <p:spPr>
           <a:xfrm>
             <a:off x="549720" y="1005840"/>
-            <a:ext cx="6856560" cy="5303160"/>
+            <a:ext cx="6856200" cy="5302800"/>
           </a:xfrm>
           <a:prstGeom prst="rect">
             <a:avLst/>
@@ -10173,16 +10591,6 @@
               <a:t>	</a:t>
             </a:r>
             <a:r>
-              <a:rPr b="0" lang="en-US" sz="1800" spc="-1" strike="noStrike">
-                <a:solidFill>
-                  <a:srgbClr val="000000"/>
-                </a:solidFill>
-                <a:latin typeface="Arial"/>
-                <a:ea typeface="DejaVu Sans"/>
-              </a:rPr>
-              <a:t>if (</a:t>
-            </a:r>
-            <a:r>
               <a:rPr b="1" lang="en-US" sz="1800" spc="-1" strike="noStrike">
                 <a:solidFill>
                   <a:srgbClr val="000000"/>
@@ -10200,7 +10608,7 @@
                 <a:latin typeface="Arial"/>
                 <a:ea typeface="DejaVu Sans"/>
               </a:rPr>
-              <a:t>(request) == -1) return -1</a:t>
+              <a:t>(request)</a:t>
             </a:r>
             <a:endParaRPr b="0" lang="en-US" sz="1800" spc="-1" strike="noStrike">
               <a:latin typeface="Arial"/>
@@ -10333,16 +10741,6 @@
               <a:t>	</a:t>
             </a:r>
             <a:r>
-              <a:rPr b="0" lang="en-US" sz="1800" spc="-1" strike="noStrike">
-                <a:solidFill>
-                  <a:srgbClr val="000000"/>
-                </a:solidFill>
-                <a:latin typeface="Arial"/>
-                <a:ea typeface="DejaVu Sans"/>
-              </a:rPr>
-              <a:t>if (</a:t>
-            </a:r>
-            <a:r>
               <a:rPr b="1" lang="en-US" sz="1800" spc="-1" strike="noStrike">
                 <a:solidFill>
                   <a:srgbClr val="000000"/>
@@ -10360,7 +10758,7 @@
                 <a:latin typeface="Arial"/>
                 <a:ea typeface="DejaVu Sans"/>
               </a:rPr>
-              <a:t>(request) == -1) return -1</a:t>
+              <a:t>(request)</a:t>
             </a:r>
             <a:endParaRPr b="0" lang="en-US" sz="1800" spc="-1" strike="noStrike">
               <a:latin typeface="Arial"/>

</xml_diff>

<commit_message>
9. More about fix slide
</commit_message>
<xml_diff>
--- a/slides/Kotlin - 9. More about Extensions.pptx
+++ b/slides/Kotlin - 9. More about Extensions.pptx
@@ -125,6 +125,11 @@
       </a:defRPr>
     </a:lvl9pPr>
   </p:defaultTextStyle>
+  <p:extLst>
+    <p:ext uri="{EFAFB233-063F-42B5-8137-9DF3F51BA10A}">
+      <p15:sldGuideLst xmlns:p15="http://schemas.microsoft.com/office/powerpoint/2012/main"/>
+    </p:ext>
+  </p:extLst>
 </p:presentation>
 </file>
 
@@ -8579,14 +8584,164 @@
               <a:t>Int</a:t>
             </a:r>
             <a:r>
-              <a:rPr lang="en-US" sz="1800" b="1" strike="noStrike" spc="-1" dirty="0">
+              <a:rPr lang="en-US" sz="1800" b="1" strike="noStrike" spc="-1" dirty="0" smtClean="0">
                 <a:solidFill>
                   <a:srgbClr val="182F7C"/>
                 </a:solidFill>
                 <a:latin typeface="Arial"/>
                 <a:ea typeface="DejaVu Sans"/>
               </a:rPr>
-              <a:t>) = </a:t>
+              <a:t>): Long { </a:t>
+            </a:r>
+          </a:p>
+          <a:p>
+            <a:r>
+              <a:rPr lang="en-US" b="1" spc="-1" dirty="0" smtClean="0">
+                <a:solidFill>
+                  <a:srgbClr val="182F7C"/>
+                </a:solidFill>
+              </a:rPr>
+              <a:t>		fun</a:t>
+            </a:r>
+            <a:r>
+              <a:rPr lang="en-US" spc="-1" dirty="0" smtClean="0">
+                <a:solidFill>
+                  <a:srgbClr val="000000"/>
+                </a:solidFill>
+              </a:rPr>
+              <a:t> </a:t>
+            </a:r>
+            <a:r>
+              <a:rPr lang="en-US" spc="-1" dirty="0" err="1">
+                <a:solidFill>
+                  <a:srgbClr val="820F71"/>
+                </a:solidFill>
+              </a:rPr>
+              <a:t>Int</a:t>
+            </a:r>
+            <a:r>
+              <a:rPr lang="en-US" spc="-1" dirty="0" err="1">
+                <a:solidFill>
+                  <a:srgbClr val="000000"/>
+                </a:solidFill>
+              </a:rPr>
+              <a:t>.hoursInMillis</a:t>
+            </a:r>
+            <a:r>
+              <a:rPr lang="en-US" spc="-1" dirty="0">
+                <a:solidFill>
+                  <a:srgbClr val="000000"/>
+                </a:solidFill>
+              </a:rPr>
+              <a:t>() = </a:t>
+            </a:r>
+            <a:r>
+              <a:rPr lang="en-US" spc="-1" dirty="0" err="1">
+                <a:solidFill>
+                  <a:srgbClr val="000000"/>
+                </a:solidFill>
+              </a:rPr>
+              <a:t>TimeUnit.HOURS.toMillis</a:t>
+            </a:r>
+            <a:r>
+              <a:rPr lang="en-US" spc="-1">
+                <a:solidFill>
+                  <a:srgbClr val="000000"/>
+                </a:solidFill>
+              </a:rPr>
+              <a:t>(this</a:t>
+            </a:r>
+            <a:r>
+              <a:rPr lang="en-US" spc="-1" smtClean="0">
+                <a:solidFill>
+                  <a:srgbClr val="000000"/>
+                </a:solidFill>
+              </a:rPr>
+              <a:t>)</a:t>
+            </a:r>
+            <a:endParaRPr lang="en-US" sz="1800" b="1" strike="noStrike" spc="-1" dirty="0" smtClean="0">
+              <a:solidFill>
+                <a:srgbClr val="182F7C"/>
+              </a:solidFill>
+              <a:latin typeface="Arial"/>
+              <a:ea typeface="DejaVu Sans"/>
+            </a:endParaRPr>
+          </a:p>
+          <a:p>
+            <a:pPr>
+              <a:lnSpc>
+                <a:spcPct val="100000"/>
+              </a:lnSpc>
+            </a:pPr>
+            <a:r>
+              <a:rPr lang="en-US" b="1" spc="-1" dirty="0">
+                <a:solidFill>
+                  <a:srgbClr val="182F7C"/>
+                </a:solidFill>
+                <a:latin typeface="Arial"/>
+                <a:ea typeface="DejaVu Sans"/>
+              </a:rPr>
+              <a:t>	</a:t>
+            </a:r>
+            <a:r>
+              <a:rPr lang="en-US" b="1" spc="-1" dirty="0" smtClean="0">
+                <a:solidFill>
+                  <a:srgbClr val="182F7C"/>
+                </a:solidFill>
+                <a:latin typeface="Arial"/>
+                <a:ea typeface="DejaVu Sans"/>
+              </a:rPr>
+              <a:t>	</a:t>
+            </a:r>
+            <a:r>
+              <a:rPr lang="en-US" sz="1800" b="0" strike="noStrike" spc="-1" dirty="0" err="1" smtClean="0">
+                <a:solidFill>
+                  <a:srgbClr val="616365"/>
+                </a:solidFill>
+                <a:latin typeface="Arial"/>
+                <a:ea typeface="DejaVu Sans"/>
+              </a:rPr>
+              <a:t>number.hoursInMillis</a:t>
+            </a:r>
+            <a:r>
+              <a:rPr lang="en-US" sz="1800" b="0" strike="noStrike" spc="-1" dirty="0">
+                <a:solidFill>
+                  <a:srgbClr val="616365"/>
+                </a:solidFill>
+                <a:latin typeface="Arial"/>
+                <a:ea typeface="DejaVu Sans"/>
+              </a:rPr>
+              <a:t>()</a:t>
+            </a:r>
+            <a:r>
+              <a:rPr lang="en-US" sz="1800" b="0" strike="noStrike" spc="-1" dirty="0">
+                <a:solidFill>
+                  <a:srgbClr val="000000"/>
+                </a:solidFill>
+                <a:latin typeface="Arial"/>
+                <a:ea typeface="DejaVu Sans"/>
+              </a:rPr>
+              <a:t> </a:t>
+            </a:r>
+            <a:r>
+              <a:rPr lang="en-US" sz="1800" b="0" strike="noStrike" spc="-1" dirty="0">
+                <a:solidFill>
+                  <a:srgbClr val="616365"/>
+                </a:solidFill>
+                <a:latin typeface="Arial"/>
+                <a:ea typeface="DejaVu Sans"/>
+              </a:rPr>
+              <a:t>*</a:t>
+            </a:r>
+            <a:r>
+              <a:rPr lang="en-US" sz="1800" b="0" strike="noStrike" spc="-1" dirty="0">
+                <a:solidFill>
+                  <a:srgbClr val="000000"/>
+                </a:solidFill>
+                <a:latin typeface="Arial"/>
+                <a:ea typeface="DejaVu Sans"/>
+              </a:rPr>
+              <a:t> </a:t>
             </a:r>
             <a:r>
               <a:rPr lang="en-US" sz="1800" b="0" strike="noStrike" spc="-1" dirty="0" err="1">
@@ -8596,10 +8751,10 @@
                 <a:latin typeface="Arial"/>
                 <a:ea typeface="DejaVu Sans"/>
               </a:rPr>
-              <a:t>number.hoursInMillis</a:t>
-            </a:r>
-            <a:r>
-              <a:rPr lang="en-US" sz="1800" b="0" strike="noStrike" spc="-1" dirty="0">
+              <a:t>getSomething</a:t>
+            </a:r>
+            <a:r>
+              <a:rPr lang="en-US" sz="1800" b="0" strike="noStrike" spc="-1" dirty="0" smtClean="0">
                 <a:solidFill>
                   <a:srgbClr val="616365"/>
                 </a:solidFill>
@@ -8608,56 +8763,6 @@
               </a:rPr>
               <a:t>()</a:t>
             </a:r>
-            <a:r>
-              <a:rPr lang="en-US" sz="1800" b="0" strike="noStrike" spc="-1" dirty="0">
-                <a:solidFill>
-                  <a:srgbClr val="000000"/>
-                </a:solidFill>
-                <a:latin typeface="Arial"/>
-                <a:ea typeface="DejaVu Sans"/>
-              </a:rPr>
-              <a:t> </a:t>
-            </a:r>
-            <a:r>
-              <a:rPr lang="en-US" sz="1800" b="0" strike="noStrike" spc="-1" dirty="0">
-                <a:solidFill>
-                  <a:srgbClr val="616365"/>
-                </a:solidFill>
-                <a:latin typeface="Arial"/>
-                <a:ea typeface="DejaVu Sans"/>
-              </a:rPr>
-              <a:t>*</a:t>
-            </a:r>
-            <a:r>
-              <a:rPr lang="en-US" sz="1800" b="0" strike="noStrike" spc="-1" dirty="0">
-                <a:solidFill>
-                  <a:srgbClr val="000000"/>
-                </a:solidFill>
-                <a:latin typeface="Arial"/>
-                <a:ea typeface="DejaVu Sans"/>
-              </a:rPr>
-              <a:t> </a:t>
-            </a:r>
-            <a:r>
-              <a:rPr lang="en-US" sz="1800" b="0" strike="noStrike" spc="-1" dirty="0" err="1">
-                <a:solidFill>
-                  <a:srgbClr val="616365"/>
-                </a:solidFill>
-                <a:latin typeface="Arial"/>
-                <a:ea typeface="DejaVu Sans"/>
-              </a:rPr>
-              <a:t>getSomething</a:t>
-            </a:r>
-            <a:r>
-              <a:rPr lang="en-US" sz="1800" b="0" strike="noStrike" spc="-1" dirty="0">
-                <a:solidFill>
-                  <a:srgbClr val="616365"/>
-                </a:solidFill>
-                <a:latin typeface="Arial"/>
-                <a:ea typeface="DejaVu Sans"/>
-              </a:rPr>
-              <a:t>()</a:t>
-            </a:r>
             <a:endParaRPr lang="en-US" sz="1800" b="0" strike="noStrike" spc="-1" dirty="0">
               <a:latin typeface="Arial"/>
             </a:endParaRPr>
@@ -8668,125 +8773,15 @@
                 <a:spcPct val="100000"/>
               </a:lnSpc>
             </a:pPr>
-            <a:endParaRPr lang="en-US" sz="1800" b="0" strike="noStrike" spc="-1" dirty="0">
-              <a:latin typeface="Arial"/>
-            </a:endParaRPr>
-          </a:p>
-          <a:p>
-            <a:pPr>
-              <a:lnSpc>
-                <a:spcPct val="100000"/>
-              </a:lnSpc>
-            </a:pPr>
-            <a:r>
-              <a:rPr lang="en-US" sz="1800" b="1" strike="noStrike" spc="-1" dirty="0">
+            <a:r>
+              <a:rPr lang="en-US" sz="1800" b="1" strike="noStrike" spc="-1" dirty="0" smtClean="0">
                 <a:solidFill>
                   <a:srgbClr val="182F7C"/>
                 </a:solidFill>
                 <a:latin typeface="Arial"/>
                 <a:ea typeface="DejaVu Sans"/>
               </a:rPr>
-              <a:t>	</a:t>
-            </a:r>
-            <a:r>
-              <a:rPr lang="en-US" sz="1800" b="0" strike="noStrike" spc="-1" dirty="0">
-                <a:solidFill>
-                  <a:srgbClr val="000000"/>
-                </a:solidFill>
-                <a:latin typeface="Arial"/>
-                <a:ea typeface="DejaVu Sans"/>
-              </a:rPr>
-              <a:t>private</a:t>
-            </a:r>
-            <a:r>
-              <a:rPr lang="en-US" sz="1800" b="1" strike="noStrike" spc="-1" dirty="0">
-                <a:solidFill>
-                  <a:srgbClr val="182F7C"/>
-                </a:solidFill>
-                <a:latin typeface="Arial"/>
-                <a:ea typeface="DejaVu Sans"/>
-              </a:rPr>
-              <a:t> fun</a:t>
-            </a:r>
-            <a:r>
-              <a:rPr lang="en-US" sz="1800" b="0" strike="noStrike" spc="-1" dirty="0">
-                <a:solidFill>
-                  <a:srgbClr val="000000"/>
-                </a:solidFill>
-                <a:latin typeface="Arial"/>
-                <a:ea typeface="DejaVu Sans"/>
-              </a:rPr>
-              <a:t> </a:t>
-            </a:r>
-            <a:r>
-              <a:rPr lang="en-US" sz="1800" b="0" strike="noStrike" spc="-1" dirty="0" err="1">
-                <a:solidFill>
-                  <a:srgbClr val="820F71"/>
-                </a:solidFill>
-                <a:latin typeface="Arial"/>
-                <a:ea typeface="DejaVu Sans"/>
-              </a:rPr>
-              <a:t>Int</a:t>
-            </a:r>
-            <a:r>
-              <a:rPr lang="en-US" sz="1800" b="0" strike="noStrike" spc="-1" dirty="0" err="1">
-                <a:solidFill>
-                  <a:srgbClr val="000000"/>
-                </a:solidFill>
-                <a:latin typeface="Arial"/>
-                <a:ea typeface="DejaVu Sans"/>
-              </a:rPr>
-              <a:t>.hoursInMillis</a:t>
-            </a:r>
-            <a:r>
-              <a:rPr lang="en-US" sz="1800" b="0" strike="noStrike" spc="-1" dirty="0">
-                <a:solidFill>
-                  <a:srgbClr val="000000"/>
-                </a:solidFill>
-                <a:latin typeface="Arial"/>
-                <a:ea typeface="DejaVu Sans"/>
-              </a:rPr>
-              <a:t>() = </a:t>
-            </a:r>
-            <a:r>
-              <a:rPr lang="en-US" sz="1800" b="0" strike="noStrike" spc="-1" dirty="0" err="1">
-                <a:solidFill>
-                  <a:srgbClr val="000000"/>
-                </a:solidFill>
-                <a:latin typeface="Arial"/>
-                <a:ea typeface="DejaVu Sans"/>
-              </a:rPr>
-              <a:t>TimeUnit.HOURS.toMillis</a:t>
-            </a:r>
-            <a:r>
-              <a:rPr lang="en-US" sz="1800" b="0" strike="noStrike" spc="-1" dirty="0">
-                <a:solidFill>
-                  <a:srgbClr val="000000"/>
-                </a:solidFill>
-                <a:latin typeface="Arial"/>
-                <a:ea typeface="DejaVu Sans"/>
-              </a:rPr>
-              <a:t>(this)</a:t>
-            </a:r>
-            <a:endParaRPr lang="en-US" sz="1800" b="0" strike="noStrike" spc="-1" dirty="0">
-              <a:latin typeface="Arial"/>
-            </a:endParaRPr>
-          </a:p>
-          <a:p>
-            <a:pPr>
-              <a:lnSpc>
-                <a:spcPct val="100000"/>
-              </a:lnSpc>
-            </a:pPr>
-            <a:r>
-              <a:rPr lang="en-US" sz="1800" b="1" strike="noStrike" spc="-1" dirty="0">
-                <a:solidFill>
-                  <a:srgbClr val="182F7C"/>
-                </a:solidFill>
-                <a:latin typeface="Arial"/>
-                <a:ea typeface="DejaVu Sans"/>
-              </a:rPr>
-              <a:t>}</a:t>
+              <a:t>	}</a:t>
             </a:r>
             <a:endParaRPr lang="en-US" sz="1800" b="0" strike="noStrike" spc="-1" dirty="0">
               <a:latin typeface="Arial"/>

</xml_diff>